<commit_message>
Architecture diagram. Added to poster
</commit_message>
<xml_diff>
--- a/poster/Poster.pptx
+++ b/poster/Poster.pptx
@@ -10,7 +10,7 @@
   <p:sldIdLst>
     <p:sldId id="257" r:id="rId2"/>
   </p:sldIdLst>
-  <p:sldSz cx="36576000" cy="27432000"/>
+  <p:sldSz cx="27432000" cy="36576000"/>
   <p:notesSz cx="20193000" cy="32027813"/>
   <p:defaultTextStyle>
     <a:defPPr>
@@ -382,8 +382,8 @@
         </p:nvSpPr>
         <p:spPr>
           <a:xfrm>
-            <a:off x="2743200" y="8521303"/>
-            <a:ext cx="31089600" cy="5880497"/>
+            <a:off x="2057400" y="11361738"/>
+            <a:ext cx="23317200" cy="7840663"/>
           </a:xfrm>
         </p:spPr>
         <p:txBody>
@@ -410,8 +410,8 @@
         </p:nvSpPr>
         <p:spPr>
           <a:xfrm>
-            <a:off x="5486400" y="15544800"/>
-            <a:ext cx="25603200" cy="7010400"/>
+            <a:off x="4114800" y="20726400"/>
+            <a:ext cx="19202400" cy="9347200"/>
           </a:xfrm>
         </p:spPr>
         <p:txBody>
@@ -748,8 +748,8 @@
         </p:nvSpPr>
         <p:spPr>
           <a:xfrm>
-            <a:off x="26062517" y="2439591"/>
-            <a:ext cx="7772400" cy="21944409"/>
+            <a:off x="19546888" y="3252789"/>
+            <a:ext cx="5829300" cy="29259212"/>
           </a:xfrm>
         </p:spPr>
         <p:txBody>
@@ -776,8 +776,8 @@
         </p:nvSpPr>
         <p:spPr>
           <a:xfrm>
-            <a:off x="2743200" y="2439591"/>
-            <a:ext cx="23116117" cy="21944409"/>
+            <a:off x="2057400" y="3252789"/>
+            <a:ext cx="17337088" cy="29259212"/>
           </a:xfrm>
         </p:spPr>
         <p:txBody>
@@ -1106,8 +1106,8 @@
         </p:nvSpPr>
         <p:spPr>
           <a:xfrm>
-            <a:off x="2889251" y="17627204"/>
-            <a:ext cx="31089600" cy="5448300"/>
+            <a:off x="2166938" y="23502939"/>
+            <a:ext cx="23317200" cy="7264400"/>
           </a:xfrm>
         </p:spPr>
         <p:txBody>
@@ -1138,8 +1138,8 @@
         </p:nvSpPr>
         <p:spPr>
           <a:xfrm>
-            <a:off x="2889251" y="11626454"/>
-            <a:ext cx="31089600" cy="6000750"/>
+            <a:off x="2166938" y="15501939"/>
+            <a:ext cx="23317200" cy="8001000"/>
           </a:xfrm>
         </p:spPr>
         <p:txBody>
@@ -1325,8 +1325,8 @@
         </p:nvSpPr>
         <p:spPr>
           <a:xfrm>
-            <a:off x="2743200" y="7925991"/>
-            <a:ext cx="15443200" cy="16458009"/>
+            <a:off x="2057400" y="10567989"/>
+            <a:ext cx="11582400" cy="21944012"/>
           </a:xfrm>
         </p:spPr>
         <p:txBody>
@@ -1410,8 +1410,8 @@
         </p:nvSpPr>
         <p:spPr>
           <a:xfrm>
-            <a:off x="18389600" y="7925991"/>
-            <a:ext cx="15445317" cy="16458009"/>
+            <a:off x="13792200" y="10567989"/>
+            <a:ext cx="11583988" cy="21944012"/>
           </a:xfrm>
         </p:spPr>
         <p:txBody>
@@ -1594,8 +1594,8 @@
         </p:nvSpPr>
         <p:spPr>
           <a:xfrm>
-            <a:off x="1828800" y="1098947"/>
-            <a:ext cx="32918400" cy="4572000"/>
+            <a:off x="1371600" y="1465263"/>
+            <a:ext cx="24688800" cy="6096000"/>
           </a:xfrm>
         </p:spPr>
         <p:txBody>
@@ -1626,8 +1626,8 @@
         </p:nvSpPr>
         <p:spPr>
           <a:xfrm>
-            <a:off x="1828801" y="6140054"/>
-            <a:ext cx="16160751" cy="2559844"/>
+            <a:off x="1371601" y="8186739"/>
+            <a:ext cx="12120563" cy="3413125"/>
           </a:xfrm>
         </p:spPr>
         <p:txBody>
@@ -1691,8 +1691,8 @@
         </p:nvSpPr>
         <p:spPr>
           <a:xfrm>
-            <a:off x="1828801" y="8699898"/>
-            <a:ext cx="16160751" cy="15804356"/>
+            <a:off x="1371601" y="11599864"/>
+            <a:ext cx="12120563" cy="21072475"/>
           </a:xfrm>
         </p:spPr>
         <p:txBody>
@@ -1776,8 +1776,8 @@
         </p:nvSpPr>
         <p:spPr>
           <a:xfrm>
-            <a:off x="18580101" y="6140054"/>
-            <a:ext cx="16167100" cy="2559844"/>
+            <a:off x="13935076" y="8186739"/>
+            <a:ext cx="12125325" cy="3413125"/>
           </a:xfrm>
         </p:spPr>
         <p:txBody>
@@ -1841,8 +1841,8 @@
         </p:nvSpPr>
         <p:spPr>
           <a:xfrm>
-            <a:off x="18580101" y="8699898"/>
-            <a:ext cx="16167100" cy="15804356"/>
+            <a:off x="13935076" y="11599864"/>
+            <a:ext cx="12125325" cy="21072475"/>
           </a:xfrm>
         </p:spPr>
         <p:txBody>
@@ -2246,8 +2246,8 @@
         </p:nvSpPr>
         <p:spPr>
           <a:xfrm>
-            <a:off x="1828800" y="1091804"/>
-            <a:ext cx="12033251" cy="4648200"/>
+            <a:off x="1371601" y="1455739"/>
+            <a:ext cx="9024938" cy="6197600"/>
           </a:xfrm>
         </p:spPr>
         <p:txBody>
@@ -2278,8 +2278,8 @@
         </p:nvSpPr>
         <p:spPr>
           <a:xfrm>
-            <a:off x="14300200" y="1091804"/>
-            <a:ext cx="20447000" cy="23412450"/>
+            <a:off x="10725150" y="1455739"/>
+            <a:ext cx="15335250" cy="31216600"/>
           </a:xfrm>
         </p:spPr>
         <p:txBody>
@@ -2363,8 +2363,8 @@
         </p:nvSpPr>
         <p:spPr>
           <a:xfrm>
-            <a:off x="1828800" y="5740004"/>
-            <a:ext cx="12033251" cy="18764250"/>
+            <a:off x="1371601" y="7653339"/>
+            <a:ext cx="9024938" cy="25019000"/>
           </a:xfrm>
         </p:spPr>
         <p:txBody>
@@ -2527,8 +2527,8 @@
         </p:nvSpPr>
         <p:spPr>
           <a:xfrm>
-            <a:off x="7169151" y="19202400"/>
-            <a:ext cx="21945600" cy="2266950"/>
+            <a:off x="5376863" y="25603200"/>
+            <a:ext cx="16459200" cy="3022600"/>
           </a:xfrm>
         </p:spPr>
         <p:txBody>
@@ -2559,8 +2559,8 @@
         </p:nvSpPr>
         <p:spPr>
           <a:xfrm>
-            <a:off x="7169151" y="2451497"/>
-            <a:ext cx="21945600" cy="16459200"/>
+            <a:off x="5376863" y="3268663"/>
+            <a:ext cx="16459200" cy="21945600"/>
           </a:xfrm>
         </p:spPr>
         <p:txBody>
@@ -2620,8 +2620,8 @@
         </p:nvSpPr>
         <p:spPr>
           <a:xfrm>
-            <a:off x="7169151" y="21469350"/>
-            <a:ext cx="21945600" cy="3219450"/>
+            <a:off x="5376863" y="28625800"/>
+            <a:ext cx="16459200" cy="4292600"/>
           </a:xfrm>
         </p:spPr>
         <p:txBody>
@@ -2792,8 +2792,8 @@
         </p:nvSpPr>
         <p:spPr bwMode="auto">
           <a:xfrm>
-            <a:off x="2743200" y="2439591"/>
-            <a:ext cx="31091717" cy="4572000"/>
+            <a:off x="2057400" y="3252788"/>
+            <a:ext cx="23318788" cy="6096000"/>
           </a:xfrm>
           <a:prstGeom prst="rect">
             <a:avLst/>
@@ -2835,8 +2835,8 @@
         </p:nvSpPr>
         <p:spPr bwMode="auto">
           <a:xfrm>
-            <a:off x="2743200" y="7925991"/>
-            <a:ext cx="31091717" cy="16458009"/>
+            <a:off x="2057400" y="10567989"/>
+            <a:ext cx="23318788" cy="21944012"/>
           </a:xfrm>
           <a:prstGeom prst="rect">
             <a:avLst/>
@@ -2906,8 +2906,8 @@
         </p:nvSpPr>
         <p:spPr bwMode="auto">
           <a:xfrm>
-            <a:off x="2743200" y="24993600"/>
-            <a:ext cx="7620000" cy="1829991"/>
+            <a:off x="2057400" y="33324801"/>
+            <a:ext cx="5715000" cy="2439988"/>
           </a:xfrm>
           <a:prstGeom prst="rect">
             <a:avLst/>
@@ -2949,8 +2949,8 @@
         </p:nvSpPr>
         <p:spPr bwMode="auto">
           <a:xfrm>
-            <a:off x="12498917" y="24993600"/>
-            <a:ext cx="11580283" cy="1829991"/>
+            <a:off x="9374188" y="33324801"/>
+            <a:ext cx="8685212" cy="2439988"/>
           </a:xfrm>
           <a:prstGeom prst="rect">
             <a:avLst/>
@@ -2992,8 +2992,8 @@
         </p:nvSpPr>
         <p:spPr bwMode="auto">
           <a:xfrm>
-            <a:off x="26214917" y="24993600"/>
-            <a:ext cx="7620000" cy="1829991"/>
+            <a:off x="19661188" y="33324801"/>
+            <a:ext cx="5715000" cy="2439988"/>
           </a:xfrm>
           <a:prstGeom prst="rect">
             <a:avLst/>
@@ -3432,77 +3432,6 @@
       </p:grpSpPr>
       <p:sp>
         <p:nvSpPr>
-          <p:cNvPr id="28" name="TextBox 27"/>
-          <p:cNvSpPr txBox="1"/>
-          <p:nvPr/>
-        </p:nvSpPr>
-        <p:spPr>
-          <a:xfrm>
-            <a:off x="29768800" y="179591"/>
-            <a:ext cx="3886201" cy="1384995"/>
-          </a:xfrm>
-          <a:prstGeom prst="rect">
-            <a:avLst/>
-          </a:prstGeom>
-          <a:noFill/>
-        </p:spPr>
-        <p:txBody>
-          <a:bodyPr wrap="square" rtlCol="0">
-            <a:spAutoFit/>
-          </a:bodyPr>
-          <a:lstStyle/>
-          <a:p>
-            <a:pPr algn="r"/>
-            <a:endParaRPr lang="en-US" sz="4800" dirty="0" smtClean="0">
-              <a:solidFill>
-                <a:schemeClr val="bg1">
-                  <a:lumMod val="75000"/>
-                </a:schemeClr>
-              </a:solidFill>
-              <a:latin typeface="Arial" pitchFamily="34" charset="0"/>
-              <a:cs typeface="Arial" pitchFamily="34" charset="0"/>
-            </a:endParaRPr>
-          </a:p>
-          <a:p>
-            <a:pPr algn="r"/>
-            <a:r>
-              <a:rPr lang="en-US" sz="3600" dirty="0" smtClean="0">
-                <a:solidFill>
-                  <a:schemeClr val="bg1">
-                    <a:lumMod val="75000"/>
-                  </a:schemeClr>
-                </a:solidFill>
-                <a:latin typeface="Arial" pitchFamily="34" charset="0"/>
-                <a:cs typeface="Arial" pitchFamily="34" charset="0"/>
-              </a:rPr>
-              <a:t>UC </a:t>
-            </a:r>
-            <a:r>
-              <a:rPr lang="en-US" sz="3600" dirty="0" smtClean="0">
-                <a:solidFill>
-                  <a:schemeClr val="bg1">
-                    <a:lumMod val="75000"/>
-                  </a:schemeClr>
-                </a:solidFill>
-                <a:latin typeface="Arial" pitchFamily="34" charset="0"/>
-                <a:cs typeface="Arial" pitchFamily="34" charset="0"/>
-              </a:rPr>
-              <a:t>Berkeley</a:t>
-            </a:r>
-            <a:endParaRPr lang="en-US" sz="3600" dirty="0" smtClean="0">
-              <a:solidFill>
-                <a:schemeClr val="bg1">
-                  <a:lumMod val="75000"/>
-                </a:schemeClr>
-              </a:solidFill>
-              <a:latin typeface="Arial" pitchFamily="34" charset="0"/>
-              <a:cs typeface="Arial" pitchFamily="34" charset="0"/>
-            </a:endParaRPr>
-          </a:p>
-        </p:txBody>
-      </p:sp>
-      <p:sp>
-        <p:nvSpPr>
           <p:cNvPr id="5137" name="Rectangle 17"/>
           <p:cNvSpPr>
             <a:spLocks noChangeArrowheads="1"/>
@@ -3511,8 +3440,8 @@
         </p:nvSpPr>
         <p:spPr bwMode="auto">
           <a:xfrm>
-            <a:off x="2199219" y="1655784"/>
-            <a:ext cx="25254153" cy="3209925"/>
+            <a:off x="1722688" y="1165709"/>
+            <a:ext cx="23630159" cy="4279900"/>
           </a:xfrm>
           <a:prstGeom prst="rect">
             <a:avLst/>
@@ -3530,9 +3459,9 @@
           <a:bodyPr lIns="386915" tIns="193458" rIns="386915" bIns="193458" anchor="ctr"/>
           <a:lstStyle/>
           <a:p>
-            <a:pPr defTabSz="3225800"/>
-            <a:r>
-              <a:rPr lang="en-US" sz="9600" dirty="0"/>
+            <a:pPr algn="ctr" defTabSz="3225800"/>
+            <a:r>
+              <a:rPr lang="en-US" sz="9600" b="1" dirty="0"/>
               <a:t>Optimizing Latency and Throughput Trade-offs in a Stream Processing System</a:t>
             </a:r>
             <a:endParaRPr lang="en-US" sz="17400" b="1" dirty="0">
@@ -3555,8 +3484,8 @@
         </p:nvSpPr>
         <p:spPr bwMode="auto">
           <a:xfrm>
-            <a:off x="29616400" y="2646284"/>
-            <a:ext cx="4038600" cy="1265316"/>
+            <a:off x="3937000" y="5547262"/>
+            <a:ext cx="20447000" cy="726347"/>
           </a:xfrm>
           <a:prstGeom prst="rect">
             <a:avLst/>
@@ -3576,41 +3505,88 @@
           </a:bodyPr>
           <a:lstStyle/>
           <a:p>
-            <a:pPr algn="r" defTabSz="1096963"/>
-            <a:r>
-              <a:rPr lang="en-US" sz="3600" b="1" dirty="0" smtClean="0">
+            <a:pPr algn="ctr" defTabSz="1096963"/>
+            <a:r>
+              <a:rPr lang="en-US" sz="4000" b="1" dirty="0" smtClean="0">
                 <a:solidFill>
                   <a:srgbClr val="003564"/>
                 </a:solidFill>
                 <a:latin typeface="Arial" pitchFamily="34" charset="0"/>
                 <a:cs typeface="Arial" pitchFamily="34" charset="0"/>
               </a:rPr>
-              <a:t>Joao Carreira</a:t>
-            </a:r>
-          </a:p>
-          <a:p>
-            <a:pPr algn="r" defTabSz="1096963"/>
-            <a:r>
-              <a:rPr lang="en-US" sz="3600" b="1" dirty="0" err="1" smtClean="0">
+              <a:t>Joao </a:t>
+            </a:r>
+            <a:r>
+              <a:rPr lang="en-US" sz="4000" b="1" dirty="0" smtClean="0">
                 <a:solidFill>
                   <a:srgbClr val="003564"/>
                 </a:solidFill>
                 <a:latin typeface="Arial" pitchFamily="34" charset="0"/>
                 <a:cs typeface="Arial" pitchFamily="34" charset="0"/>
               </a:rPr>
-              <a:t>Jianneng</a:t>
-            </a:r>
-            <a:r>
-              <a:rPr lang="en-US" sz="3600" b="1" dirty="0" smtClean="0">
+              <a:t>Carreira (</a:t>
+            </a:r>
+            <a:r>
+              <a:rPr lang="en-US" sz="4000" b="1" dirty="0" err="1" smtClean="0">
                 <a:solidFill>
                   <a:srgbClr val="003564"/>
                 </a:solidFill>
                 <a:latin typeface="Arial" pitchFamily="34" charset="0"/>
                 <a:cs typeface="Arial" pitchFamily="34" charset="0"/>
               </a:rPr>
-              <a:t> Li</a:t>
-            </a:r>
-            <a:endParaRPr lang="en-US" sz="3600" b="1" dirty="0">
+              <a:t>joao@berkeley.edu</a:t>
+            </a:r>
+            <a:r>
+              <a:rPr lang="en-US" sz="4000" b="1" dirty="0" smtClean="0">
+                <a:solidFill>
+                  <a:srgbClr val="003564"/>
+                </a:solidFill>
+                <a:latin typeface="Arial" pitchFamily="34" charset="0"/>
+                <a:cs typeface="Arial" pitchFamily="34" charset="0"/>
+              </a:rPr>
+              <a:t>)            </a:t>
+            </a:r>
+            <a:r>
+              <a:rPr lang="en-US" sz="4000" b="1" dirty="0" err="1" smtClean="0">
+                <a:solidFill>
+                  <a:srgbClr val="003564"/>
+                </a:solidFill>
+                <a:latin typeface="Arial" pitchFamily="34" charset="0"/>
+                <a:cs typeface="Arial" pitchFamily="34" charset="0"/>
+              </a:rPr>
+              <a:t>Jianneng</a:t>
+            </a:r>
+            <a:r>
+              <a:rPr lang="en-US" sz="4000" b="1" dirty="0" smtClean="0">
+                <a:solidFill>
+                  <a:srgbClr val="003564"/>
+                </a:solidFill>
+                <a:latin typeface="Arial" pitchFamily="34" charset="0"/>
+                <a:cs typeface="Arial" pitchFamily="34" charset="0"/>
+              </a:rPr>
+              <a:t> Li (</a:t>
+            </a:r>
+            <a:r>
+              <a:rPr lang="en-US" sz="4000" b="1" dirty="0" err="1" smtClean="0">
+                <a:solidFill>
+                  <a:srgbClr val="003564"/>
+                </a:solidFill>
+                <a:latin typeface="Arial" pitchFamily="34" charset="0"/>
+                <a:cs typeface="Arial" pitchFamily="34" charset="0"/>
+              </a:rPr>
+              <a:t>jianneng@berkeley.edu</a:t>
+            </a:r>
+            <a:r>
+              <a:rPr lang="en-US" sz="4000" b="1" dirty="0" smtClean="0">
+                <a:solidFill>
+                  <a:srgbClr val="003564"/>
+                </a:solidFill>
+                <a:latin typeface="Arial" pitchFamily="34" charset="0"/>
+                <a:cs typeface="Arial" pitchFamily="34" charset="0"/>
+              </a:rPr>
+              <a:t>)</a:t>
+            </a:r>
+            <a:endParaRPr lang="en-US" sz="4000" b="1" dirty="0">
               <a:solidFill>
                 <a:srgbClr val="003564"/>
               </a:solidFill>
@@ -3630,8 +3606,8 @@
         </p:nvSpPr>
         <p:spPr bwMode="auto">
           <a:xfrm>
-            <a:off x="18834101" y="12907566"/>
-            <a:ext cx="14820900" cy="2944268"/>
+            <a:off x="14125576" y="17210088"/>
+            <a:ext cx="11115675" cy="3925691"/>
           </a:xfrm>
           <a:prstGeom prst="rect">
             <a:avLst/>
@@ -4316,8 +4292,8 @@
         </p:nvSpPr>
         <p:spPr bwMode="auto">
           <a:xfrm>
-            <a:off x="0" y="26318766"/>
-            <a:ext cx="36576000" cy="0"/>
+            <a:off x="0" y="35091688"/>
+            <a:ext cx="27432000" cy="0"/>
           </a:xfrm>
           <a:prstGeom prst="line">
             <a:avLst/>
@@ -4354,8 +4330,8 @@
         </p:nvSpPr>
         <p:spPr bwMode="auto">
           <a:xfrm>
-            <a:off x="2823634" y="7116367"/>
-            <a:ext cx="6845300" cy="4203287"/>
+            <a:off x="2117726" y="9488490"/>
+            <a:ext cx="5133975" cy="4949646"/>
           </a:xfrm>
           <a:prstGeom prst="rect">
             <a:avLst/>
@@ -4400,30 +4376,6 @@
           </a:p>
           <a:p>
             <a:pPr>
-              <a:spcBef>
-                <a:spcPct val="50000"/>
-              </a:spcBef>
-            </a:pPr>
-            <a:r>
-              <a:rPr lang="en-US" sz="3600" b="1" dirty="0">
-                <a:solidFill>
-                  <a:srgbClr val="003564"/>
-                </a:solidFill>
-                <a:latin typeface="Arial" pitchFamily="34" charset="0"/>
-                <a:cs typeface="Arial" pitchFamily="34" charset="0"/>
-              </a:rPr>
-              <a:t>Motivation</a:t>
-            </a:r>
-            <a:endParaRPr lang="en-US" sz="3600" dirty="0">
-              <a:solidFill>
-                <a:srgbClr val="003564"/>
-              </a:solidFill>
-              <a:latin typeface="Arial" pitchFamily="34" charset="0"/>
-              <a:cs typeface="Arial" pitchFamily="34" charset="0"/>
-            </a:endParaRPr>
-          </a:p>
-          <a:p>
-            <a:pPr>
               <a:lnSpc>
                 <a:spcPts val="4100"/>
               </a:lnSpc>
@@ -4432,319 +4384,11 @@
               </a:spcBef>
             </a:pPr>
             <a:r>
-              <a:rPr lang="en-US" sz="2700" dirty="0" err="1">
-                <a:latin typeface="Arial" pitchFamily="34" charset="0"/>
-                <a:cs typeface="Arial" pitchFamily="34" charset="0"/>
-              </a:rPr>
-              <a:t>Phasellus</a:t>
-            </a:r>
-            <a:r>
-              <a:rPr lang="en-US" sz="2700" dirty="0">
-                <a:latin typeface="Arial" pitchFamily="34" charset="0"/>
-                <a:cs typeface="Arial" pitchFamily="34" charset="0"/>
-              </a:rPr>
-              <a:t> in </a:t>
-            </a:r>
-            <a:r>
-              <a:rPr lang="en-US" sz="2700" dirty="0" err="1">
-                <a:latin typeface="Arial" pitchFamily="34" charset="0"/>
-                <a:cs typeface="Arial" pitchFamily="34" charset="0"/>
-              </a:rPr>
-              <a:t>libero</a:t>
-            </a:r>
-            <a:r>
-              <a:rPr lang="en-US" sz="2700" dirty="0">
-                <a:latin typeface="Arial" pitchFamily="34" charset="0"/>
-                <a:cs typeface="Arial" pitchFamily="34" charset="0"/>
-              </a:rPr>
-              <a:t> et </a:t>
-            </a:r>
-            <a:r>
-              <a:rPr lang="en-US" sz="2700" dirty="0" err="1">
-                <a:latin typeface="Arial" pitchFamily="34" charset="0"/>
-                <a:cs typeface="Arial" pitchFamily="34" charset="0"/>
-              </a:rPr>
-              <a:t>elit</a:t>
-            </a:r>
-            <a:r>
-              <a:rPr lang="en-US" sz="2700" dirty="0">
-                <a:latin typeface="Arial" pitchFamily="34" charset="0"/>
-                <a:cs typeface="Arial" pitchFamily="34" charset="0"/>
-              </a:rPr>
-              <a:t> </a:t>
-            </a:r>
-            <a:r>
-              <a:rPr lang="en-US" sz="2700" dirty="0" err="1">
-                <a:latin typeface="Arial" pitchFamily="34" charset="0"/>
-                <a:cs typeface="Arial" pitchFamily="34" charset="0"/>
-              </a:rPr>
-              <a:t>imperdiet</a:t>
-            </a:r>
-            <a:r>
-              <a:rPr lang="en-US" sz="2700" dirty="0">
-                <a:latin typeface="Arial" pitchFamily="34" charset="0"/>
-                <a:cs typeface="Arial" pitchFamily="34" charset="0"/>
-              </a:rPr>
-              <a:t> </a:t>
-            </a:r>
-            <a:r>
-              <a:rPr lang="en-US" sz="2700" dirty="0" err="1">
-                <a:latin typeface="Arial" pitchFamily="34" charset="0"/>
-                <a:cs typeface="Arial" pitchFamily="34" charset="0"/>
-              </a:rPr>
-              <a:t>sagittis</a:t>
-            </a:r>
-            <a:r>
-              <a:rPr lang="en-US" sz="2700" dirty="0">
-                <a:latin typeface="Arial" pitchFamily="34" charset="0"/>
-                <a:cs typeface="Arial" pitchFamily="34" charset="0"/>
-              </a:rPr>
-              <a:t>. </a:t>
-            </a:r>
-            <a:r>
-              <a:rPr lang="en-US" sz="2700" dirty="0" err="1">
-                <a:latin typeface="Arial" pitchFamily="34" charset="0"/>
-                <a:cs typeface="Arial" pitchFamily="34" charset="0"/>
-              </a:rPr>
-              <a:t>Duis</a:t>
-            </a:r>
-            <a:r>
-              <a:rPr lang="en-US" sz="2700" dirty="0">
-                <a:latin typeface="Arial" pitchFamily="34" charset="0"/>
-                <a:cs typeface="Arial" pitchFamily="34" charset="0"/>
-              </a:rPr>
-              <a:t> </a:t>
-            </a:r>
-            <a:r>
-              <a:rPr lang="en-US" sz="2700" dirty="0" err="1">
-                <a:latin typeface="Arial" pitchFamily="34" charset="0"/>
-                <a:cs typeface="Arial" pitchFamily="34" charset="0"/>
-              </a:rPr>
-              <a:t>malesuada</a:t>
-            </a:r>
-            <a:r>
-              <a:rPr lang="en-US" sz="2700" dirty="0">
-                <a:latin typeface="Arial" pitchFamily="34" charset="0"/>
-                <a:cs typeface="Arial" pitchFamily="34" charset="0"/>
-              </a:rPr>
-              <a:t> </a:t>
-            </a:r>
-            <a:r>
-              <a:rPr lang="en-US" sz="2700" dirty="0" err="1">
-                <a:latin typeface="Arial" pitchFamily="34" charset="0"/>
-                <a:cs typeface="Arial" pitchFamily="34" charset="0"/>
-              </a:rPr>
-              <a:t>orci</a:t>
-            </a:r>
-            <a:r>
-              <a:rPr lang="en-US" sz="2700" dirty="0">
-                <a:latin typeface="Arial" pitchFamily="34" charset="0"/>
-                <a:cs typeface="Arial" pitchFamily="34" charset="0"/>
-              </a:rPr>
-              <a:t> </a:t>
-            </a:r>
-            <a:r>
-              <a:rPr lang="en-US" sz="2700" dirty="0" err="1">
-                <a:latin typeface="Arial" pitchFamily="34" charset="0"/>
-                <a:cs typeface="Arial" pitchFamily="34" charset="0"/>
-              </a:rPr>
-              <a:t>facilisis</a:t>
-            </a:r>
-            <a:r>
-              <a:rPr lang="en-US" sz="2700" dirty="0">
-                <a:latin typeface="Arial" pitchFamily="34" charset="0"/>
-                <a:cs typeface="Arial" pitchFamily="34" charset="0"/>
-              </a:rPr>
-              <a:t> magna. </a:t>
-            </a:r>
-            <a:r>
-              <a:rPr lang="en-US" sz="2700" dirty="0" err="1">
-                <a:latin typeface="Arial" pitchFamily="34" charset="0"/>
-                <a:cs typeface="Arial" pitchFamily="34" charset="0"/>
-              </a:rPr>
-              <a:t>Pellentesque</a:t>
-            </a:r>
-            <a:r>
-              <a:rPr lang="en-US" sz="2700" dirty="0">
-                <a:latin typeface="Arial" pitchFamily="34" charset="0"/>
-                <a:cs typeface="Arial" pitchFamily="34" charset="0"/>
-              </a:rPr>
-              <a:t> </a:t>
-            </a:r>
-            <a:r>
-              <a:rPr lang="en-US" sz="2700" dirty="0" err="1">
-                <a:latin typeface="Arial" pitchFamily="34" charset="0"/>
-                <a:cs typeface="Arial" pitchFamily="34" charset="0"/>
-              </a:rPr>
-              <a:t>placerat</a:t>
-            </a:r>
-            <a:r>
-              <a:rPr lang="en-US" sz="2700" dirty="0">
-                <a:latin typeface="Arial" pitchFamily="34" charset="0"/>
-                <a:cs typeface="Arial" pitchFamily="34" charset="0"/>
-              </a:rPr>
-              <a:t> </a:t>
-            </a:r>
-            <a:r>
-              <a:rPr lang="en-US" sz="2700" dirty="0" err="1">
-                <a:latin typeface="Arial" pitchFamily="34" charset="0"/>
-                <a:cs typeface="Arial" pitchFamily="34" charset="0"/>
-              </a:rPr>
-              <a:t>purus</a:t>
-            </a:r>
-            <a:r>
-              <a:rPr lang="en-US" sz="2700" dirty="0">
-                <a:latin typeface="Arial" pitchFamily="34" charset="0"/>
-                <a:cs typeface="Arial" pitchFamily="34" charset="0"/>
-              </a:rPr>
-              <a:t> et mi. </a:t>
-            </a:r>
-            <a:r>
-              <a:rPr lang="en-US" sz="2700" dirty="0" err="1">
-                <a:latin typeface="Arial" pitchFamily="34" charset="0"/>
-                <a:cs typeface="Arial" pitchFamily="34" charset="0"/>
-              </a:rPr>
-              <a:t>Sed</a:t>
-            </a:r>
-            <a:r>
-              <a:rPr lang="en-US" sz="2700" dirty="0">
-                <a:latin typeface="Arial" pitchFamily="34" charset="0"/>
-                <a:cs typeface="Arial" pitchFamily="34" charset="0"/>
-              </a:rPr>
-              <a:t> </a:t>
-            </a:r>
-            <a:r>
-              <a:rPr lang="en-US" sz="2700" dirty="0" err="1">
-                <a:latin typeface="Arial" pitchFamily="34" charset="0"/>
-                <a:cs typeface="Arial" pitchFamily="34" charset="0"/>
-              </a:rPr>
-              <a:t>dapibus</a:t>
-            </a:r>
-            <a:r>
-              <a:rPr lang="en-US" sz="2700" dirty="0">
-                <a:latin typeface="Arial" pitchFamily="34" charset="0"/>
-                <a:cs typeface="Arial" pitchFamily="34" charset="0"/>
-              </a:rPr>
-              <a:t> </a:t>
-            </a:r>
-            <a:r>
-              <a:rPr lang="en-US" sz="2700" dirty="0" err="1">
-                <a:latin typeface="Arial" pitchFamily="34" charset="0"/>
-                <a:cs typeface="Arial" pitchFamily="34" charset="0"/>
-              </a:rPr>
-              <a:t>urna</a:t>
-            </a:r>
-            <a:r>
-              <a:rPr lang="en-US" sz="2700" dirty="0">
-                <a:latin typeface="Arial" pitchFamily="34" charset="0"/>
-                <a:cs typeface="Arial" pitchFamily="34" charset="0"/>
-              </a:rPr>
-              <a:t> </a:t>
-            </a:r>
-            <a:r>
-              <a:rPr lang="en-US" sz="2700" dirty="0" err="1">
-                <a:latin typeface="Arial" pitchFamily="34" charset="0"/>
-                <a:cs typeface="Arial" pitchFamily="34" charset="0"/>
-              </a:rPr>
-              <a:t>sed</a:t>
-            </a:r>
-            <a:r>
-              <a:rPr lang="en-US" sz="2700" dirty="0">
-                <a:latin typeface="Arial" pitchFamily="34" charset="0"/>
-                <a:cs typeface="Arial" pitchFamily="34" charset="0"/>
-              </a:rPr>
-              <a:t> </a:t>
-            </a:r>
-            <a:r>
-              <a:rPr lang="en-US" sz="2700" dirty="0" err="1">
-                <a:latin typeface="Arial" pitchFamily="34" charset="0"/>
-                <a:cs typeface="Arial" pitchFamily="34" charset="0"/>
-              </a:rPr>
-              <a:t>mauris</a:t>
-            </a:r>
-            <a:r>
-              <a:rPr lang="en-US" sz="2700" dirty="0">
-                <a:latin typeface="Arial" pitchFamily="34" charset="0"/>
-                <a:cs typeface="Arial" pitchFamily="34" charset="0"/>
-              </a:rPr>
-              <a:t>. </a:t>
-            </a:r>
-            <a:r>
-              <a:rPr lang="en-US" sz="2700" dirty="0" err="1">
-                <a:latin typeface="Arial" pitchFamily="34" charset="0"/>
-                <a:cs typeface="Arial" pitchFamily="34" charset="0"/>
-              </a:rPr>
-              <a:t>Curabitur</a:t>
-            </a:r>
-            <a:r>
-              <a:rPr lang="en-US" sz="2700" dirty="0">
-                <a:latin typeface="Arial" pitchFamily="34" charset="0"/>
-                <a:cs typeface="Arial" pitchFamily="34" charset="0"/>
-              </a:rPr>
-              <a:t> </a:t>
-            </a:r>
-            <a:r>
-              <a:rPr lang="en-US" sz="2700" dirty="0" err="1">
-                <a:latin typeface="Arial" pitchFamily="34" charset="0"/>
-                <a:cs typeface="Arial" pitchFamily="34" charset="0"/>
-              </a:rPr>
-              <a:t>pretium</a:t>
-            </a:r>
-            <a:r>
-              <a:rPr lang="en-US" sz="2700" dirty="0">
-                <a:latin typeface="Arial" pitchFamily="34" charset="0"/>
-                <a:cs typeface="Arial" pitchFamily="34" charset="0"/>
-              </a:rPr>
-              <a:t> </a:t>
-            </a:r>
-            <a:r>
-              <a:rPr lang="en-US" sz="2700" dirty="0" err="1">
-                <a:latin typeface="Arial" pitchFamily="34" charset="0"/>
-                <a:cs typeface="Arial" pitchFamily="34" charset="0"/>
-              </a:rPr>
-              <a:t>pede</a:t>
-            </a:r>
-            <a:r>
-              <a:rPr lang="en-US" sz="2700" dirty="0">
-                <a:latin typeface="Arial" pitchFamily="34" charset="0"/>
-                <a:cs typeface="Arial" pitchFamily="34" charset="0"/>
-              </a:rPr>
-              <a:t> </a:t>
-            </a:r>
-            <a:r>
-              <a:rPr lang="en-US" sz="2700" dirty="0" err="1">
-                <a:latin typeface="Arial" pitchFamily="34" charset="0"/>
-                <a:cs typeface="Arial" pitchFamily="34" charset="0"/>
-              </a:rPr>
-              <a:t>ut</a:t>
-            </a:r>
-            <a:r>
-              <a:rPr lang="en-US" sz="2700" dirty="0">
-                <a:latin typeface="Arial" pitchFamily="34" charset="0"/>
-                <a:cs typeface="Arial" pitchFamily="34" charset="0"/>
-              </a:rPr>
-              <a:t> </a:t>
-            </a:r>
-            <a:r>
-              <a:rPr lang="en-US" sz="2700" dirty="0" err="1">
-                <a:latin typeface="Arial" pitchFamily="34" charset="0"/>
-                <a:cs typeface="Arial" pitchFamily="34" charset="0"/>
-              </a:rPr>
-              <a:t>odio</a:t>
-            </a:r>
-            <a:r>
-              <a:rPr lang="en-US" sz="2700" dirty="0">
-                <a:latin typeface="Arial" pitchFamily="34" charset="0"/>
-                <a:cs typeface="Arial" pitchFamily="34" charset="0"/>
-              </a:rPr>
-              <a:t>. </a:t>
-            </a:r>
-            <a:r>
-              <a:rPr lang="en-US" sz="2700" dirty="0" err="1" smtClean="0">
-                <a:latin typeface="Arial" pitchFamily="34" charset="0"/>
-                <a:cs typeface="Arial" pitchFamily="34" charset="0"/>
-              </a:rPr>
-              <a:t>Quisque</a:t>
+              <a:rPr lang="en-US" sz="2700" dirty="0" smtClean="0">
+                <a:latin typeface="Arial" pitchFamily="34" charset="0"/>
+                <a:cs typeface="Arial" pitchFamily="34" charset="0"/>
+              </a:rPr>
+              <a:t>Widely used streaming systems struggle between providing high throughput and low-latency. The common wisdom is that systems like Spark give up on latency to provide high throughput, whereas systems like Storm give up on throughput to provide low-latency</a:t>
             </a:r>
             <a:endParaRPr lang="en-US" sz="2700" dirty="0">
               <a:latin typeface="Arial" pitchFamily="34" charset="0"/>
@@ -4755,7 +4399,7 @@
       </p:sp>
       <p:sp>
         <p:nvSpPr>
-          <p:cNvPr id="5663" name="Text Box 543"/>
+          <p:cNvPr id="5670" name="Text Box 550"/>
           <p:cNvSpPr txBox="1">
             <a:spLocks noChangeArrowheads="1"/>
           </p:cNvSpPr>
@@ -4763,8 +4407,8 @@
         </p:nvSpPr>
         <p:spPr bwMode="auto">
           <a:xfrm>
-            <a:off x="18768485" y="11275457"/>
-            <a:ext cx="14886516" cy="392415"/>
+            <a:off x="1978979" y="33514348"/>
+            <a:ext cx="5184775" cy="697114"/>
           </a:xfrm>
           <a:prstGeom prst="rect">
             <a:avLst/>
@@ -4793,38 +4437,21 @@
               </a:spcBef>
             </a:pPr>
             <a:r>
-              <a:rPr lang="en-US" sz="1800" dirty="0">
+              <a:rPr lang="en-US" sz="1800">
                 <a:solidFill>
                   <a:srgbClr val="131313"/>
                 </a:solidFill>
                 <a:latin typeface="Arial" pitchFamily="34" charset="0"/>
                 <a:cs typeface="Arial" pitchFamily="34" charset="0"/>
               </a:rPr>
-              <a:t>Caption here. </a:t>
-            </a:r>
-            <a:r>
-              <a:rPr lang="en-US" sz="1800" dirty="0" smtClean="0">
-                <a:solidFill>
-                  <a:srgbClr val="131313"/>
-                </a:solidFill>
-                <a:latin typeface="Arial" pitchFamily="34" charset="0"/>
-                <a:cs typeface="Arial" pitchFamily="34" charset="0"/>
-              </a:rPr>
-              <a:t>Each figure should have a caption that explains the image. Write in full sentences.</a:t>
-            </a:r>
-            <a:endParaRPr lang="en-US" sz="1800" dirty="0">
-              <a:solidFill>
-                <a:srgbClr val="131313"/>
-              </a:solidFill>
-              <a:latin typeface="Arial" pitchFamily="34" charset="0"/>
-              <a:cs typeface="Arial" pitchFamily="34" charset="0"/>
-            </a:endParaRPr>
-          </a:p>
-        </p:txBody>
-      </p:sp>
-      <p:sp>
-        <p:nvSpPr>
-          <p:cNvPr id="5670" name="Text Box 550"/>
+              <a:t>Caption here. Hooray! I am a caption, and I am happy to be a caption. </a:t>
+            </a:r>
+          </a:p>
+        </p:txBody>
+      </p:sp>
+      <p:sp>
+        <p:nvSpPr>
+          <p:cNvPr id="5671" name="Text Box 551"/>
           <p:cNvSpPr txBox="1">
             <a:spLocks noChangeArrowheads="1"/>
           </p:cNvSpPr>
@@ -4832,8 +4459,8 @@
         </p:nvSpPr>
         <p:spPr bwMode="auto">
           <a:xfrm>
-            <a:off x="2638638" y="25135761"/>
-            <a:ext cx="6913033" cy="697114"/>
+            <a:off x="8009892" y="33514348"/>
+            <a:ext cx="5184775" cy="697114"/>
           </a:xfrm>
           <a:prstGeom prst="rect">
             <a:avLst/>
@@ -4862,7 +4489,7 @@
               </a:spcBef>
             </a:pPr>
             <a:r>
-              <a:rPr lang="en-US" sz="1800">
+              <a:rPr lang="en-US" sz="1800" dirty="0">
                 <a:solidFill>
                   <a:srgbClr val="131313"/>
                 </a:solidFill>
@@ -4876,7 +4503,7 @@
       </p:sp>
       <p:sp>
         <p:nvSpPr>
-          <p:cNvPr id="5671" name="Text Box 551"/>
+          <p:cNvPr id="29" name="Text Box 532"/>
           <p:cNvSpPr txBox="1">
             <a:spLocks noChangeArrowheads="1"/>
           </p:cNvSpPr>
@@ -4884,8 +4511,8 @@
         </p:nvSpPr>
         <p:spPr bwMode="auto">
           <a:xfrm>
-            <a:off x="10679856" y="25135761"/>
-            <a:ext cx="6913033" cy="697114"/>
+            <a:off x="8097839" y="9488489"/>
+            <a:ext cx="5133975" cy="5890929"/>
           </a:xfrm>
           <a:prstGeom prst="rect">
             <a:avLst/>
@@ -4900,70 +4527,131 @@
           <a:effectLst/>
         </p:spPr>
         <p:txBody>
-          <a:bodyPr>
+          <a:bodyPr lIns="0" tIns="0" rIns="0" bIns="0">
             <a:spAutoFit/>
           </a:bodyPr>
           <a:lstStyle/>
           <a:p>
             <a:pPr>
+              <a:spcBef>
+                <a:spcPct val="50000"/>
+              </a:spcBef>
+            </a:pPr>
+            <a:r>
+              <a:rPr lang="en-US" sz="3600" b="1" dirty="0" smtClean="0">
+                <a:solidFill>
+                  <a:srgbClr val="003564"/>
+                </a:solidFill>
+                <a:latin typeface="Arial" pitchFamily="34" charset="0"/>
+                <a:cs typeface="Arial" pitchFamily="34" charset="0"/>
+              </a:rPr>
+              <a:t>Contribution</a:t>
+            </a:r>
+            <a:endParaRPr lang="en-US" sz="3600" dirty="0">
+              <a:solidFill>
+                <a:srgbClr val="003564"/>
+              </a:solidFill>
+              <a:latin typeface="Arial" pitchFamily="34" charset="0"/>
+              <a:cs typeface="Arial" pitchFamily="34" charset="0"/>
+            </a:endParaRPr>
+          </a:p>
+          <a:p>
+            <a:pPr>
               <a:lnSpc>
-                <a:spcPct val="110000"/>
+                <a:spcPts val="4100"/>
               </a:lnSpc>
               <a:spcBef>
                 <a:spcPct val="50000"/>
               </a:spcBef>
             </a:pPr>
             <a:r>
-              <a:rPr lang="en-US" sz="1800" dirty="0">
-                <a:solidFill>
-                  <a:srgbClr val="131313"/>
-                </a:solidFill>
-                <a:latin typeface="Arial" pitchFamily="34" charset="0"/>
-                <a:cs typeface="Arial" pitchFamily="34" charset="0"/>
-              </a:rPr>
-              <a:t>Caption here. Hooray! I am a caption, and I am happy to be a caption. </a:t>
-            </a:r>
-          </a:p>
-        </p:txBody>
-      </p:sp>
-      <p:pic>
-        <p:nvPicPr>
-          <p:cNvPr id="5676" name="Picture 556" descr="C:\Users\bjoern\Documents\My Dropbox\berkeley\cs160\final-presentations\ucseal_540_139.png"/>
-          <p:cNvPicPr>
-            <a:picLocks noChangeAspect="1" noChangeArrowheads="1"/>
-          </p:cNvPicPr>
+              <a:rPr lang="en-US" sz="2700" dirty="0" smtClean="0">
+                <a:latin typeface="Arial" pitchFamily="34" charset="0"/>
+                <a:cs typeface="Arial" pitchFamily="34" charset="0"/>
+              </a:rPr>
+              <a:t>1) We provide an evaluation of the performance of Spark </a:t>
+            </a:r>
+            <a:r>
+              <a:rPr lang="en-US" sz="2700" dirty="0" err="1" smtClean="0">
+                <a:latin typeface="Arial" pitchFamily="34" charset="0"/>
+                <a:cs typeface="Arial" pitchFamily="34" charset="0"/>
+              </a:rPr>
+              <a:t>Straming</a:t>
+            </a:r>
+            <a:r>
+              <a:rPr lang="en-US" sz="2700" dirty="0" smtClean="0">
+                <a:latin typeface="Arial" pitchFamily="34" charset="0"/>
+                <a:cs typeface="Arial" pitchFamily="34" charset="0"/>
+              </a:rPr>
+              <a:t> across two major metrics: latency and throughput</a:t>
+            </a:r>
+          </a:p>
+          <a:p>
+            <a:pPr>
+              <a:lnSpc>
+                <a:spcPts val="4100"/>
+              </a:lnSpc>
+              <a:spcBef>
+                <a:spcPct val="50000"/>
+              </a:spcBef>
+            </a:pPr>
+            <a:r>
+              <a:rPr lang="en-US" sz="2700" dirty="0" smtClean="0">
+                <a:latin typeface="Arial" pitchFamily="34" charset="0"/>
+                <a:cs typeface="Arial" pitchFamily="34" charset="0"/>
+              </a:rPr>
+              <a:t>2) We show </a:t>
+            </a:r>
+            <a:r>
+              <a:rPr lang="en-US" sz="2700" dirty="0" err="1" smtClean="0">
+                <a:latin typeface="Arial" pitchFamily="34" charset="0"/>
+                <a:cs typeface="Arial" pitchFamily="34" charset="0"/>
+              </a:rPr>
+              <a:t>tha</a:t>
+            </a:r>
+            <a:r>
+              <a:rPr lang="en-US" sz="2700" dirty="0" smtClean="0">
+                <a:latin typeface="Arial" pitchFamily="34" charset="0"/>
+                <a:cs typeface="Arial" pitchFamily="34" charset="0"/>
+              </a:rPr>
+              <a:t> Spark Streaming’s architecture cannot provide high throughput and low latency</a:t>
+            </a:r>
+          </a:p>
+          <a:p>
+            <a:pPr>
+              <a:lnSpc>
+                <a:spcPts val="4100"/>
+              </a:lnSpc>
+              <a:spcBef>
+                <a:spcPct val="50000"/>
+              </a:spcBef>
+            </a:pPr>
+            <a:r>
+              <a:rPr lang="en-US" sz="2700" dirty="0" smtClean="0">
+                <a:latin typeface="Arial" pitchFamily="34" charset="0"/>
+                <a:cs typeface="Arial" pitchFamily="34" charset="0"/>
+              </a:rPr>
+              <a:t>3) We propose </a:t>
+            </a:r>
+            <a:endParaRPr lang="en-US" sz="2700" dirty="0">
+              <a:latin typeface="Arial" pitchFamily="34" charset="0"/>
+              <a:cs typeface="Arial" pitchFamily="34" charset="0"/>
+            </a:endParaRPr>
+          </a:p>
+        </p:txBody>
+      </p:sp>
+      <p:sp>
+        <p:nvSpPr>
+          <p:cNvPr id="32" name="Text Box 512"/>
+          <p:cNvSpPr txBox="1">
+            <a:spLocks noChangeArrowheads="1"/>
+          </p:cNvSpPr>
           <p:nvPr/>
-        </p:nvPicPr>
-        <p:blipFill>
-          <a:blip r:embed="rId2" cstate="print"/>
-          <a:srcRect/>
-          <a:stretch>
-            <a:fillRect/>
-          </a:stretch>
-        </p:blipFill>
+        </p:nvSpPr>
         <p:spPr bwMode="auto">
           <a:xfrm>
-            <a:off x="28186039" y="571970"/>
-            <a:ext cx="2235612" cy="1257532"/>
-          </a:xfrm>
-          <a:prstGeom prst="rect">
-            <a:avLst/>
-          </a:prstGeom>
-          <a:noFill/>
-        </p:spPr>
-      </p:pic>
-      <p:sp>
-        <p:nvSpPr>
-          <p:cNvPr id="29" name="Text Box 532"/>
-          <p:cNvSpPr txBox="1">
-            <a:spLocks noChangeArrowheads="1"/>
-          </p:cNvSpPr>
-          <p:nvPr/>
-        </p:nvSpPr>
-        <p:spPr bwMode="auto">
-          <a:xfrm>
-            <a:off x="10797118" y="7116367"/>
-            <a:ext cx="6845300" cy="3898076"/>
+            <a:off x="14076364" y="22752051"/>
+            <a:ext cx="11115675" cy="3381524"/>
           </a:xfrm>
           <a:prstGeom prst="rect">
             <a:avLst/>
@@ -4978,7 +4666,7 @@
           <a:effectLst/>
         </p:spPr>
         <p:txBody>
-          <a:bodyPr lIns="0" tIns="0" rIns="0" bIns="0">
+          <a:bodyPr wrap="square">
             <a:spAutoFit/>
           </a:bodyPr>
           <a:lstStyle/>
@@ -4996,7 +4684,7 @@
                 <a:latin typeface="Arial" pitchFamily="34" charset="0"/>
                 <a:cs typeface="Arial" pitchFamily="34" charset="0"/>
               </a:rPr>
-              <a:t>Motivation</a:t>
+              <a:t>Evaluation</a:t>
             </a:r>
             <a:endParaRPr lang="en-US" sz="3600" dirty="0">
               <a:solidFill>
@@ -5012,421 +4700,565 @@
                 <a:spcPts val="4100"/>
               </a:lnSpc>
               <a:spcBef>
-                <a:spcPct val="50000"/>
+                <a:spcPct val="30000"/>
               </a:spcBef>
             </a:pPr>
             <a:r>
-              <a:rPr lang="en-US" sz="2700" dirty="0" err="1">
+              <a:rPr lang="en-US" sz="2700" dirty="0" err="1" smtClean="0">
+                <a:latin typeface="Arial" pitchFamily="34" charset="0"/>
+                <a:cs typeface="Arial" pitchFamily="34" charset="0"/>
+              </a:rPr>
+              <a:t>Lorem</a:t>
+            </a:r>
+            <a:r>
+              <a:rPr lang="en-US" sz="2700" dirty="0" smtClean="0">
+                <a:latin typeface="Arial" pitchFamily="34" charset="0"/>
+                <a:cs typeface="Arial" pitchFamily="34" charset="0"/>
+              </a:rPr>
+              <a:t> </a:t>
+            </a:r>
+            <a:r>
+              <a:rPr lang="en-US" sz="2700" dirty="0" err="1" smtClean="0">
+                <a:latin typeface="Arial" pitchFamily="34" charset="0"/>
+                <a:cs typeface="Arial" pitchFamily="34" charset="0"/>
+              </a:rPr>
+              <a:t>ipsum</a:t>
+            </a:r>
+            <a:r>
+              <a:rPr lang="en-US" sz="2700" dirty="0" smtClean="0">
+                <a:latin typeface="Arial" pitchFamily="34" charset="0"/>
+                <a:cs typeface="Arial" pitchFamily="34" charset="0"/>
+              </a:rPr>
+              <a:t> dolor sit </a:t>
+            </a:r>
+            <a:r>
+              <a:rPr lang="en-US" sz="2700" dirty="0" err="1" smtClean="0">
+                <a:latin typeface="Arial" pitchFamily="34" charset="0"/>
+                <a:cs typeface="Arial" pitchFamily="34" charset="0"/>
+              </a:rPr>
+              <a:t>amet</a:t>
+            </a:r>
+            <a:r>
+              <a:rPr lang="en-US" sz="2700" dirty="0" smtClean="0">
+                <a:latin typeface="Arial" pitchFamily="34" charset="0"/>
+                <a:cs typeface="Arial" pitchFamily="34" charset="0"/>
+              </a:rPr>
+              <a:t>, </a:t>
+            </a:r>
+            <a:r>
+              <a:rPr lang="en-US" sz="2700" dirty="0" err="1" smtClean="0">
+                <a:latin typeface="Arial" pitchFamily="34" charset="0"/>
+                <a:cs typeface="Arial" pitchFamily="34" charset="0"/>
+              </a:rPr>
+              <a:t>consectetur</a:t>
+            </a:r>
+            <a:r>
+              <a:rPr lang="en-US" sz="2700" dirty="0" smtClean="0">
+                <a:latin typeface="Arial" pitchFamily="34" charset="0"/>
+                <a:cs typeface="Arial" pitchFamily="34" charset="0"/>
+              </a:rPr>
+              <a:t> </a:t>
+            </a:r>
+            <a:r>
+              <a:rPr lang="en-US" sz="2700" dirty="0" err="1" smtClean="0">
+                <a:latin typeface="Arial" pitchFamily="34" charset="0"/>
+                <a:cs typeface="Arial" pitchFamily="34" charset="0"/>
+              </a:rPr>
+              <a:t>adipiscing</a:t>
+            </a:r>
+            <a:r>
+              <a:rPr lang="en-US" sz="2700" dirty="0" smtClean="0">
+                <a:latin typeface="Arial" pitchFamily="34" charset="0"/>
+                <a:cs typeface="Arial" pitchFamily="34" charset="0"/>
+              </a:rPr>
+              <a:t> </a:t>
+            </a:r>
+            <a:r>
+              <a:rPr lang="en-US" sz="2700" dirty="0" err="1" smtClean="0">
+                <a:latin typeface="Arial" pitchFamily="34" charset="0"/>
+                <a:cs typeface="Arial" pitchFamily="34" charset="0"/>
+              </a:rPr>
+              <a:t>elit</a:t>
+            </a:r>
+            <a:r>
+              <a:rPr lang="en-US" sz="2700" dirty="0" smtClean="0">
+                <a:latin typeface="Arial" pitchFamily="34" charset="0"/>
+                <a:cs typeface="Arial" pitchFamily="34" charset="0"/>
+              </a:rPr>
+              <a:t>. </a:t>
+            </a:r>
+            <a:r>
+              <a:rPr lang="en-US" sz="2700" dirty="0" err="1" smtClean="0">
+                <a:latin typeface="Arial" pitchFamily="34" charset="0"/>
+                <a:cs typeface="Arial" pitchFamily="34" charset="0"/>
+              </a:rPr>
+              <a:t>Duis</a:t>
+            </a:r>
+            <a:r>
+              <a:rPr lang="en-US" sz="2700" dirty="0" smtClean="0">
+                <a:latin typeface="Arial" pitchFamily="34" charset="0"/>
+                <a:cs typeface="Arial" pitchFamily="34" charset="0"/>
+              </a:rPr>
+              <a:t> id </a:t>
+            </a:r>
+            <a:r>
+              <a:rPr lang="en-US" sz="2700" dirty="0" err="1" smtClean="0">
+                <a:latin typeface="Arial" pitchFamily="34" charset="0"/>
+                <a:cs typeface="Arial" pitchFamily="34" charset="0"/>
+              </a:rPr>
+              <a:t>sem</a:t>
+            </a:r>
+            <a:r>
+              <a:rPr lang="en-US" sz="2700" dirty="0" smtClean="0">
+                <a:latin typeface="Arial" pitchFamily="34" charset="0"/>
+                <a:cs typeface="Arial" pitchFamily="34" charset="0"/>
+              </a:rPr>
+              <a:t> </a:t>
+            </a:r>
+            <a:r>
+              <a:rPr lang="en-US" sz="2700" dirty="0" err="1" smtClean="0">
+                <a:latin typeface="Arial" pitchFamily="34" charset="0"/>
+                <a:cs typeface="Arial" pitchFamily="34" charset="0"/>
+              </a:rPr>
+              <a:t>vel</a:t>
+            </a:r>
+            <a:r>
+              <a:rPr lang="en-US" sz="2700" dirty="0" smtClean="0">
+                <a:latin typeface="Arial" pitchFamily="34" charset="0"/>
+                <a:cs typeface="Arial" pitchFamily="34" charset="0"/>
+              </a:rPr>
+              <a:t> </a:t>
+            </a:r>
+            <a:r>
+              <a:rPr lang="en-US" sz="2700" dirty="0" err="1" smtClean="0">
+                <a:latin typeface="Arial" pitchFamily="34" charset="0"/>
+                <a:cs typeface="Arial" pitchFamily="34" charset="0"/>
+              </a:rPr>
+              <a:t>lorem</a:t>
+            </a:r>
+            <a:r>
+              <a:rPr lang="en-US" sz="2700" dirty="0" smtClean="0">
+                <a:latin typeface="Arial" pitchFamily="34" charset="0"/>
+                <a:cs typeface="Arial" pitchFamily="34" charset="0"/>
+              </a:rPr>
+              <a:t> </a:t>
+            </a:r>
+            <a:r>
+              <a:rPr lang="en-US" sz="2700" dirty="0" err="1" smtClean="0">
+                <a:latin typeface="Arial" pitchFamily="34" charset="0"/>
+                <a:cs typeface="Arial" pitchFamily="34" charset="0"/>
+              </a:rPr>
+              <a:t>pulvinar</a:t>
+            </a:r>
+            <a:r>
+              <a:rPr lang="en-US" sz="2700" dirty="0" smtClean="0">
+                <a:latin typeface="Arial" pitchFamily="34" charset="0"/>
+                <a:cs typeface="Arial" pitchFamily="34" charset="0"/>
+              </a:rPr>
+              <a:t> </a:t>
+            </a:r>
+            <a:r>
+              <a:rPr lang="en-US" sz="2700" dirty="0" err="1" smtClean="0">
+                <a:latin typeface="Arial" pitchFamily="34" charset="0"/>
+                <a:cs typeface="Arial" pitchFamily="34" charset="0"/>
+              </a:rPr>
+              <a:t>hendrerit</a:t>
+            </a:r>
+            <a:r>
+              <a:rPr lang="en-US" sz="2700" dirty="0" smtClean="0">
+                <a:latin typeface="Arial" pitchFamily="34" charset="0"/>
+                <a:cs typeface="Arial" pitchFamily="34" charset="0"/>
+              </a:rPr>
+              <a:t> ac at </a:t>
+            </a:r>
+            <a:r>
+              <a:rPr lang="en-US" sz="2700" dirty="0" err="1" smtClean="0">
+                <a:latin typeface="Arial" pitchFamily="34" charset="0"/>
+                <a:cs typeface="Arial" pitchFamily="34" charset="0"/>
+              </a:rPr>
+              <a:t>neque</a:t>
+            </a:r>
+            <a:r>
+              <a:rPr lang="en-US" sz="2700" dirty="0" smtClean="0">
+                <a:latin typeface="Arial" pitchFamily="34" charset="0"/>
+                <a:cs typeface="Arial" pitchFamily="34" charset="0"/>
+              </a:rPr>
+              <a:t>. </a:t>
+            </a:r>
+            <a:r>
+              <a:rPr lang="en-US" sz="2700" dirty="0" err="1" smtClean="0">
                 <a:latin typeface="Arial" pitchFamily="34" charset="0"/>
                 <a:cs typeface="Arial" pitchFamily="34" charset="0"/>
               </a:rPr>
               <a:t>Phasellus</a:t>
             </a:r>
             <a:r>
-              <a:rPr lang="en-US" sz="2700" dirty="0">
-                <a:latin typeface="Arial" pitchFamily="34" charset="0"/>
-                <a:cs typeface="Arial" pitchFamily="34" charset="0"/>
-              </a:rPr>
-              <a:t> in </a:t>
-            </a:r>
-            <a:r>
-              <a:rPr lang="en-US" sz="2700" dirty="0" err="1">
+              <a:rPr lang="en-US" sz="2700" dirty="0" smtClean="0">
+                <a:latin typeface="Arial" pitchFamily="34" charset="0"/>
+                <a:cs typeface="Arial" pitchFamily="34" charset="0"/>
+              </a:rPr>
+              <a:t> </a:t>
+            </a:r>
+            <a:r>
+              <a:rPr lang="en-US" sz="2700" dirty="0" err="1" smtClean="0">
+                <a:latin typeface="Arial" pitchFamily="34" charset="0"/>
+                <a:cs typeface="Arial" pitchFamily="34" charset="0"/>
+              </a:rPr>
+              <a:t>ornare</a:t>
+            </a:r>
+            <a:r>
+              <a:rPr lang="en-US" sz="2700" dirty="0" smtClean="0">
+                <a:latin typeface="Arial" pitchFamily="34" charset="0"/>
+                <a:cs typeface="Arial" pitchFamily="34" charset="0"/>
+              </a:rPr>
+              <a:t> </a:t>
+            </a:r>
+            <a:r>
+              <a:rPr lang="en-US" sz="2700" dirty="0" err="1" smtClean="0">
+                <a:latin typeface="Arial" pitchFamily="34" charset="0"/>
+                <a:cs typeface="Arial" pitchFamily="34" charset="0"/>
+              </a:rPr>
+              <a:t>erat</a:t>
+            </a:r>
+            <a:r>
+              <a:rPr lang="en-US" sz="2700" dirty="0" smtClean="0">
+                <a:latin typeface="Arial" pitchFamily="34" charset="0"/>
+                <a:cs typeface="Arial" pitchFamily="34" charset="0"/>
+              </a:rPr>
+              <a:t> sit </a:t>
+            </a:r>
+            <a:r>
+              <a:rPr lang="en-US" sz="2700" dirty="0" err="1" smtClean="0">
+                <a:latin typeface="Arial" pitchFamily="34" charset="0"/>
+                <a:cs typeface="Arial" pitchFamily="34" charset="0"/>
+              </a:rPr>
+              <a:t>amet</a:t>
+            </a:r>
+            <a:r>
+              <a:rPr lang="en-US" sz="2700" dirty="0" smtClean="0">
+                <a:latin typeface="Arial" pitchFamily="34" charset="0"/>
+                <a:cs typeface="Arial" pitchFamily="34" charset="0"/>
+              </a:rPr>
+              <a:t> </a:t>
+            </a:r>
+            <a:r>
+              <a:rPr lang="en-US" sz="2700" dirty="0" err="1" smtClean="0">
                 <a:latin typeface="Arial" pitchFamily="34" charset="0"/>
                 <a:cs typeface="Arial" pitchFamily="34" charset="0"/>
               </a:rPr>
               <a:t>libero</a:t>
             </a:r>
             <a:r>
-              <a:rPr lang="en-US" sz="2700" dirty="0">
-                <a:latin typeface="Arial" pitchFamily="34" charset="0"/>
-                <a:cs typeface="Arial" pitchFamily="34" charset="0"/>
-              </a:rPr>
-              <a:t> et </a:t>
-            </a:r>
-            <a:r>
-              <a:rPr lang="en-US" sz="2700" dirty="0" err="1">
-                <a:latin typeface="Arial" pitchFamily="34" charset="0"/>
-                <a:cs typeface="Arial" pitchFamily="34" charset="0"/>
-              </a:rPr>
-              <a:t>elit</a:t>
-            </a:r>
-            <a:r>
-              <a:rPr lang="en-US" sz="2700" dirty="0">
+              <a:rPr lang="en-US" sz="2700" dirty="0" smtClean="0">
                 <a:latin typeface="Arial" pitchFamily="34" charset="0"/>
                 <a:cs typeface="Arial" pitchFamily="34" charset="0"/>
               </a:rPr>
               <a:t> </a:t>
             </a:r>
             <a:r>
-              <a:rPr lang="en-US" sz="2700" dirty="0" err="1">
-                <a:latin typeface="Arial" pitchFamily="34" charset="0"/>
-                <a:cs typeface="Arial" pitchFamily="34" charset="0"/>
-              </a:rPr>
-              <a:t>imperdiet</a:t>
-            </a:r>
-            <a:r>
-              <a:rPr lang="en-US" sz="2700" dirty="0">
+              <a:rPr lang="en-US" sz="2700" dirty="0" err="1" smtClean="0">
+                <a:latin typeface="Arial" pitchFamily="34" charset="0"/>
+                <a:cs typeface="Arial" pitchFamily="34" charset="0"/>
+              </a:rPr>
+              <a:t>ullamcorper</a:t>
+            </a:r>
+            <a:r>
+              <a:rPr lang="en-US" sz="2700" dirty="0" smtClean="0">
                 <a:latin typeface="Arial" pitchFamily="34" charset="0"/>
                 <a:cs typeface="Arial" pitchFamily="34" charset="0"/>
               </a:rPr>
               <a:t> </a:t>
             </a:r>
             <a:r>
-              <a:rPr lang="en-US" sz="2700" dirty="0" err="1">
+              <a:rPr lang="en-US" sz="2700" dirty="0" err="1" smtClean="0">
+                <a:latin typeface="Arial" pitchFamily="34" charset="0"/>
+                <a:cs typeface="Arial" pitchFamily="34" charset="0"/>
+              </a:rPr>
+              <a:t>condimentum</a:t>
+            </a:r>
+            <a:r>
+              <a:rPr lang="en-US" sz="2700" dirty="0" smtClean="0">
+                <a:latin typeface="Arial" pitchFamily="34" charset="0"/>
+                <a:cs typeface="Arial" pitchFamily="34" charset="0"/>
+              </a:rPr>
+              <a:t>. </a:t>
+            </a:r>
+            <a:r>
+              <a:rPr lang="en-US" sz="2700" dirty="0" err="1" smtClean="0">
+                <a:latin typeface="Arial" pitchFamily="34" charset="0"/>
+                <a:cs typeface="Arial" pitchFamily="34" charset="0"/>
+              </a:rPr>
+              <a:t>Pellentesque</a:t>
+            </a:r>
+            <a:r>
+              <a:rPr lang="en-US" sz="2700" dirty="0" smtClean="0">
+                <a:latin typeface="Arial" pitchFamily="34" charset="0"/>
+                <a:cs typeface="Arial" pitchFamily="34" charset="0"/>
+              </a:rPr>
+              <a:t> </a:t>
+            </a:r>
+            <a:r>
+              <a:rPr lang="en-US" sz="2700" dirty="0" err="1" smtClean="0">
+                <a:latin typeface="Arial" pitchFamily="34" charset="0"/>
+                <a:cs typeface="Arial" pitchFamily="34" charset="0"/>
+              </a:rPr>
+              <a:t>luctus</a:t>
+            </a:r>
+            <a:r>
+              <a:rPr lang="en-US" sz="2700" dirty="0" smtClean="0">
+                <a:latin typeface="Arial" pitchFamily="34" charset="0"/>
+                <a:cs typeface="Arial" pitchFamily="34" charset="0"/>
+              </a:rPr>
+              <a:t> </a:t>
+            </a:r>
+            <a:r>
+              <a:rPr lang="en-US" sz="2700" dirty="0" err="1" smtClean="0">
+                <a:latin typeface="Arial" pitchFamily="34" charset="0"/>
+                <a:cs typeface="Arial" pitchFamily="34" charset="0"/>
+              </a:rPr>
+              <a:t>ornare</a:t>
+            </a:r>
+            <a:r>
+              <a:rPr lang="en-US" sz="2700" dirty="0" smtClean="0">
+                <a:latin typeface="Arial" pitchFamily="34" charset="0"/>
+                <a:cs typeface="Arial" pitchFamily="34" charset="0"/>
+              </a:rPr>
+              <a:t> </a:t>
+            </a:r>
+            <a:r>
+              <a:rPr lang="en-US" sz="2700" dirty="0" err="1" smtClean="0">
+                <a:latin typeface="Arial" pitchFamily="34" charset="0"/>
+                <a:cs typeface="Arial" pitchFamily="34" charset="0"/>
+              </a:rPr>
+              <a:t>commodo</a:t>
+            </a:r>
+            <a:r>
+              <a:rPr lang="en-US" sz="2700" dirty="0" smtClean="0">
+                <a:latin typeface="Arial" pitchFamily="34" charset="0"/>
+                <a:cs typeface="Arial" pitchFamily="34" charset="0"/>
+              </a:rPr>
+              <a:t>. </a:t>
+            </a:r>
+            <a:r>
+              <a:rPr lang="en-US" sz="2700" dirty="0" err="1" smtClean="0">
+                <a:latin typeface="Arial" pitchFamily="34" charset="0"/>
+                <a:cs typeface="Arial" pitchFamily="34" charset="0"/>
+              </a:rPr>
+              <a:t>Sed</a:t>
+            </a:r>
+            <a:r>
+              <a:rPr lang="en-US" sz="2700" dirty="0" smtClean="0">
+                <a:latin typeface="Arial" pitchFamily="34" charset="0"/>
+                <a:cs typeface="Arial" pitchFamily="34" charset="0"/>
+              </a:rPr>
+              <a:t> </a:t>
+            </a:r>
+            <a:r>
+              <a:rPr lang="en-US" sz="2700" dirty="0" err="1" smtClean="0">
+                <a:latin typeface="Arial" pitchFamily="34" charset="0"/>
+                <a:cs typeface="Arial" pitchFamily="34" charset="0"/>
+              </a:rPr>
+              <a:t>convallis</a:t>
+            </a:r>
+            <a:r>
+              <a:rPr lang="en-US" sz="2700" dirty="0" smtClean="0">
+                <a:latin typeface="Arial" pitchFamily="34" charset="0"/>
+                <a:cs typeface="Arial" pitchFamily="34" charset="0"/>
+              </a:rPr>
+              <a:t> quam sit </a:t>
+            </a:r>
+            <a:r>
+              <a:rPr lang="en-US" sz="2700" dirty="0" err="1" smtClean="0">
+                <a:latin typeface="Arial" pitchFamily="34" charset="0"/>
+                <a:cs typeface="Arial" pitchFamily="34" charset="0"/>
+              </a:rPr>
+              <a:t>amet</a:t>
+            </a:r>
+            <a:r>
+              <a:rPr lang="en-US" sz="2700" dirty="0" smtClean="0">
+                <a:latin typeface="Arial" pitchFamily="34" charset="0"/>
+                <a:cs typeface="Arial" pitchFamily="34" charset="0"/>
+              </a:rPr>
+              <a:t> </a:t>
+            </a:r>
+            <a:r>
+              <a:rPr lang="en-US" sz="2700" dirty="0" err="1" smtClean="0">
+                <a:latin typeface="Arial" pitchFamily="34" charset="0"/>
+                <a:cs typeface="Arial" pitchFamily="34" charset="0"/>
+              </a:rPr>
+              <a:t>neque</a:t>
+            </a:r>
+            <a:r>
+              <a:rPr lang="en-US" sz="2700" dirty="0" smtClean="0">
+                <a:latin typeface="Arial" pitchFamily="34" charset="0"/>
+                <a:cs typeface="Arial" pitchFamily="34" charset="0"/>
+              </a:rPr>
+              <a:t> </a:t>
+            </a:r>
+            <a:r>
+              <a:rPr lang="en-US" sz="2700" dirty="0" err="1" smtClean="0">
+                <a:latin typeface="Arial" pitchFamily="34" charset="0"/>
+                <a:cs typeface="Arial" pitchFamily="34" charset="0"/>
+              </a:rPr>
+              <a:t>lacinia</a:t>
+            </a:r>
+            <a:r>
+              <a:rPr lang="en-US" sz="2700" dirty="0" smtClean="0">
+                <a:latin typeface="Arial" pitchFamily="34" charset="0"/>
+                <a:cs typeface="Arial" pitchFamily="34" charset="0"/>
+              </a:rPr>
+              <a:t> </a:t>
+            </a:r>
+            <a:r>
+              <a:rPr lang="en-US" sz="2700" dirty="0" err="1" smtClean="0">
+                <a:latin typeface="Arial" pitchFamily="34" charset="0"/>
+                <a:cs typeface="Arial" pitchFamily="34" charset="0"/>
+              </a:rPr>
+              <a:t>viverra</a:t>
+            </a:r>
+            <a:r>
+              <a:rPr lang="en-US" sz="2700" dirty="0" smtClean="0">
+                <a:latin typeface="Arial" pitchFamily="34" charset="0"/>
+                <a:cs typeface="Arial" pitchFamily="34" charset="0"/>
+              </a:rPr>
+              <a:t>. Maecenas </a:t>
+            </a:r>
+            <a:r>
+              <a:rPr lang="en-US" sz="2700" dirty="0" err="1" smtClean="0">
+                <a:latin typeface="Arial" pitchFamily="34" charset="0"/>
+                <a:cs typeface="Arial" pitchFamily="34" charset="0"/>
+              </a:rPr>
+              <a:t>vestibulum</a:t>
+            </a:r>
+            <a:r>
+              <a:rPr lang="en-US" sz="2700" dirty="0" smtClean="0">
+                <a:latin typeface="Arial" pitchFamily="34" charset="0"/>
+                <a:cs typeface="Arial" pitchFamily="34" charset="0"/>
+              </a:rPr>
+              <a:t>, </a:t>
+            </a:r>
+            <a:r>
+              <a:rPr lang="en-US" sz="2700" dirty="0" err="1" smtClean="0">
+                <a:latin typeface="Arial" pitchFamily="34" charset="0"/>
+                <a:cs typeface="Arial" pitchFamily="34" charset="0"/>
+              </a:rPr>
+              <a:t>purus</a:t>
+            </a:r>
+            <a:r>
+              <a:rPr lang="en-US" sz="2700" dirty="0" smtClean="0">
+                <a:latin typeface="Arial" pitchFamily="34" charset="0"/>
+                <a:cs typeface="Arial" pitchFamily="34" charset="0"/>
+              </a:rPr>
+              <a:t> sit </a:t>
+            </a:r>
+            <a:r>
+              <a:rPr lang="en-US" sz="2700" dirty="0" err="1" smtClean="0">
+                <a:latin typeface="Arial" pitchFamily="34" charset="0"/>
+                <a:cs typeface="Arial" pitchFamily="34" charset="0"/>
+              </a:rPr>
+              <a:t>amet</a:t>
+            </a:r>
+            <a:r>
+              <a:rPr lang="en-US" sz="2700" dirty="0" smtClean="0">
+                <a:latin typeface="Arial" pitchFamily="34" charset="0"/>
+                <a:cs typeface="Arial" pitchFamily="34" charset="0"/>
+              </a:rPr>
+              <a:t> </a:t>
+            </a:r>
+            <a:r>
+              <a:rPr lang="en-US" sz="2700" dirty="0" err="1" smtClean="0">
+                <a:latin typeface="Arial" pitchFamily="34" charset="0"/>
+                <a:cs typeface="Arial" pitchFamily="34" charset="0"/>
+              </a:rPr>
+              <a:t>mollis</a:t>
+            </a:r>
+            <a:r>
+              <a:rPr lang="en-US" sz="2700" dirty="0" smtClean="0">
+                <a:latin typeface="Arial" pitchFamily="34" charset="0"/>
+                <a:cs typeface="Arial" pitchFamily="34" charset="0"/>
+              </a:rPr>
+              <a:t> </a:t>
+            </a:r>
+            <a:r>
+              <a:rPr lang="en-US" sz="2700" dirty="0" err="1" smtClean="0">
                 <a:latin typeface="Arial" pitchFamily="34" charset="0"/>
                 <a:cs typeface="Arial" pitchFamily="34" charset="0"/>
               </a:rPr>
               <a:t>sagittis</a:t>
             </a:r>
             <a:r>
-              <a:rPr lang="en-US" sz="2700" dirty="0">
-                <a:latin typeface="Arial" pitchFamily="34" charset="0"/>
-                <a:cs typeface="Arial" pitchFamily="34" charset="0"/>
-              </a:rPr>
-              <a:t>. </a:t>
-            </a:r>
-            <a:r>
-              <a:rPr lang="en-US" sz="2700" dirty="0" err="1">
-                <a:latin typeface="Arial" pitchFamily="34" charset="0"/>
-                <a:cs typeface="Arial" pitchFamily="34" charset="0"/>
-              </a:rPr>
-              <a:t>Duis</a:t>
-            </a:r>
-            <a:r>
-              <a:rPr lang="en-US" sz="2700" dirty="0">
+              <a:rPr lang="en-US" sz="2700" dirty="0" smtClean="0">
+                <a:latin typeface="Arial" pitchFamily="34" charset="0"/>
+                <a:cs typeface="Arial" pitchFamily="34" charset="0"/>
+              </a:rPr>
+              <a:t>, </a:t>
+            </a:r>
+            <a:r>
+              <a:rPr lang="en-US" sz="2700" dirty="0" err="1" smtClean="0">
+                <a:latin typeface="Arial" pitchFamily="34" charset="0"/>
+                <a:cs typeface="Arial" pitchFamily="34" charset="0"/>
+              </a:rPr>
+              <a:t>orci</a:t>
+            </a:r>
+            <a:r>
+              <a:rPr lang="en-US" sz="2700" dirty="0" smtClean="0">
                 <a:latin typeface="Arial" pitchFamily="34" charset="0"/>
                 <a:cs typeface="Arial" pitchFamily="34" charset="0"/>
               </a:rPr>
               <a:t> </a:t>
             </a:r>
             <a:r>
-              <a:rPr lang="en-US" sz="2700" dirty="0" err="1">
-                <a:latin typeface="Arial" pitchFamily="34" charset="0"/>
-                <a:cs typeface="Arial" pitchFamily="34" charset="0"/>
-              </a:rPr>
-              <a:t>malesuada</a:t>
-            </a:r>
-            <a:r>
-              <a:rPr lang="en-US" sz="2700" dirty="0">
+              <a:rPr lang="en-US" sz="2700" dirty="0" err="1" smtClean="0">
+                <a:latin typeface="Arial" pitchFamily="34" charset="0"/>
+                <a:cs typeface="Arial" pitchFamily="34" charset="0"/>
+              </a:rPr>
+              <a:t>libero</a:t>
+            </a:r>
+            <a:r>
+              <a:rPr lang="en-US" sz="2700" dirty="0" smtClean="0">
                 <a:latin typeface="Arial" pitchFamily="34" charset="0"/>
                 <a:cs typeface="Arial" pitchFamily="34" charset="0"/>
               </a:rPr>
               <a:t> </a:t>
             </a:r>
             <a:r>
-              <a:rPr lang="en-US" sz="2700" dirty="0" err="1">
-                <a:latin typeface="Arial" pitchFamily="34" charset="0"/>
-                <a:cs typeface="Arial" pitchFamily="34" charset="0"/>
-              </a:rPr>
-              <a:t>orci</a:t>
-            </a:r>
-            <a:r>
-              <a:rPr lang="en-US" sz="2700" dirty="0">
+              <a:rPr lang="en-US" sz="2700" dirty="0" err="1" smtClean="0">
+                <a:latin typeface="Arial" pitchFamily="34" charset="0"/>
+                <a:cs typeface="Arial" pitchFamily="34" charset="0"/>
+              </a:rPr>
+              <a:t>feugiat</a:t>
+            </a:r>
+            <a:r>
+              <a:rPr lang="en-US" sz="2700" dirty="0" smtClean="0">
                 <a:latin typeface="Arial" pitchFamily="34" charset="0"/>
                 <a:cs typeface="Arial" pitchFamily="34" charset="0"/>
               </a:rPr>
               <a:t> </a:t>
             </a:r>
             <a:r>
-              <a:rPr lang="en-US" sz="2700" dirty="0" err="1">
-                <a:latin typeface="Arial" pitchFamily="34" charset="0"/>
-                <a:cs typeface="Arial" pitchFamily="34" charset="0"/>
-              </a:rPr>
-              <a:t>facilisis</a:t>
-            </a:r>
-            <a:r>
-              <a:rPr lang="en-US" sz="2700" dirty="0">
-                <a:latin typeface="Arial" pitchFamily="34" charset="0"/>
-                <a:cs typeface="Arial" pitchFamily="34" charset="0"/>
-              </a:rPr>
-              <a:t> magna. </a:t>
-            </a:r>
-            <a:r>
-              <a:rPr lang="en-US" sz="2700" dirty="0" err="1">
-                <a:latin typeface="Arial" pitchFamily="34" charset="0"/>
-                <a:cs typeface="Arial" pitchFamily="34" charset="0"/>
-              </a:rPr>
-              <a:t>Pellentesque</a:t>
-            </a:r>
-            <a:r>
-              <a:rPr lang="en-US" sz="2700" dirty="0">
-                <a:latin typeface="Arial" pitchFamily="34" charset="0"/>
-                <a:cs typeface="Arial" pitchFamily="34" charset="0"/>
-              </a:rPr>
-              <a:t> </a:t>
-            </a:r>
-            <a:r>
-              <a:rPr lang="en-US" sz="2700" dirty="0" err="1">
-                <a:latin typeface="Arial" pitchFamily="34" charset="0"/>
-                <a:cs typeface="Arial" pitchFamily="34" charset="0"/>
-              </a:rPr>
-              <a:t>placerat</a:t>
-            </a:r>
-            <a:r>
-              <a:rPr lang="en-US" sz="2700" dirty="0">
-                <a:latin typeface="Arial" pitchFamily="34" charset="0"/>
-                <a:cs typeface="Arial" pitchFamily="34" charset="0"/>
-              </a:rPr>
-              <a:t> </a:t>
-            </a:r>
-            <a:r>
-              <a:rPr lang="en-US" sz="2700" dirty="0" err="1">
-                <a:latin typeface="Arial" pitchFamily="34" charset="0"/>
-                <a:cs typeface="Arial" pitchFamily="34" charset="0"/>
-              </a:rPr>
-              <a:t>purus</a:t>
-            </a:r>
-            <a:r>
-              <a:rPr lang="en-US" sz="2700" dirty="0">
-                <a:latin typeface="Arial" pitchFamily="34" charset="0"/>
-                <a:cs typeface="Arial" pitchFamily="34" charset="0"/>
-              </a:rPr>
-              <a:t> et mi. </a:t>
-            </a:r>
-            <a:r>
-              <a:rPr lang="en-US" sz="2700" dirty="0" err="1">
-                <a:latin typeface="Arial" pitchFamily="34" charset="0"/>
-                <a:cs typeface="Arial" pitchFamily="34" charset="0"/>
-              </a:rPr>
-              <a:t>Sed</a:t>
-            </a:r>
-            <a:r>
-              <a:rPr lang="en-US" sz="2700" dirty="0">
-                <a:latin typeface="Arial" pitchFamily="34" charset="0"/>
-                <a:cs typeface="Arial" pitchFamily="34" charset="0"/>
-              </a:rPr>
-              <a:t> </a:t>
-            </a:r>
-            <a:r>
-              <a:rPr lang="en-US" sz="2700" dirty="0" err="1">
-                <a:latin typeface="Arial" pitchFamily="34" charset="0"/>
-                <a:cs typeface="Arial" pitchFamily="34" charset="0"/>
-              </a:rPr>
-              <a:t>dapibus</a:t>
-            </a:r>
-            <a:r>
-              <a:rPr lang="en-US" sz="2700" dirty="0">
-                <a:latin typeface="Arial" pitchFamily="34" charset="0"/>
-                <a:cs typeface="Arial" pitchFamily="34" charset="0"/>
-              </a:rPr>
-              <a:t> </a:t>
-            </a:r>
-            <a:r>
-              <a:rPr lang="en-US" sz="2700" dirty="0" err="1">
-                <a:latin typeface="Arial" pitchFamily="34" charset="0"/>
-                <a:cs typeface="Arial" pitchFamily="34" charset="0"/>
-              </a:rPr>
-              <a:t>urna</a:t>
-            </a:r>
-            <a:r>
-              <a:rPr lang="en-US" sz="2700" dirty="0">
-                <a:latin typeface="Arial" pitchFamily="34" charset="0"/>
-                <a:cs typeface="Arial" pitchFamily="34" charset="0"/>
-              </a:rPr>
-              <a:t> </a:t>
-            </a:r>
-            <a:r>
-              <a:rPr lang="en-US" sz="2700" dirty="0" err="1">
-                <a:latin typeface="Arial" pitchFamily="34" charset="0"/>
-                <a:cs typeface="Arial" pitchFamily="34" charset="0"/>
-              </a:rPr>
-              <a:t>sed</a:t>
-            </a:r>
-            <a:r>
-              <a:rPr lang="en-US" sz="2700" dirty="0">
-                <a:latin typeface="Arial" pitchFamily="34" charset="0"/>
-                <a:cs typeface="Arial" pitchFamily="34" charset="0"/>
-              </a:rPr>
-              <a:t> </a:t>
-            </a:r>
-            <a:r>
-              <a:rPr lang="en-US" sz="2700" dirty="0" err="1">
-                <a:latin typeface="Arial" pitchFamily="34" charset="0"/>
-                <a:cs typeface="Arial" pitchFamily="34" charset="0"/>
-              </a:rPr>
-              <a:t>mauris</a:t>
-            </a:r>
-            <a:r>
-              <a:rPr lang="en-US" sz="2700" dirty="0">
-                <a:latin typeface="Arial" pitchFamily="34" charset="0"/>
-                <a:cs typeface="Arial" pitchFamily="34" charset="0"/>
-              </a:rPr>
-              <a:t>. </a:t>
-            </a:r>
-            <a:r>
-              <a:rPr lang="en-US" sz="2700" dirty="0" err="1">
-                <a:latin typeface="Arial" pitchFamily="34" charset="0"/>
-                <a:cs typeface="Arial" pitchFamily="34" charset="0"/>
-              </a:rPr>
-              <a:t>Curabitur</a:t>
-            </a:r>
-            <a:r>
-              <a:rPr lang="en-US" sz="2700" dirty="0">
-                <a:latin typeface="Arial" pitchFamily="34" charset="0"/>
-                <a:cs typeface="Arial" pitchFamily="34" charset="0"/>
-              </a:rPr>
-              <a:t> </a:t>
-            </a:r>
-            <a:r>
-              <a:rPr lang="en-US" sz="2700" dirty="0" err="1">
-                <a:latin typeface="Arial" pitchFamily="34" charset="0"/>
-                <a:cs typeface="Arial" pitchFamily="34" charset="0"/>
-              </a:rPr>
-              <a:t>pretium</a:t>
-            </a:r>
-            <a:r>
-              <a:rPr lang="en-US" sz="2700" dirty="0">
-                <a:latin typeface="Arial" pitchFamily="34" charset="0"/>
-                <a:cs typeface="Arial" pitchFamily="34" charset="0"/>
-              </a:rPr>
-              <a:t> </a:t>
-            </a:r>
-            <a:r>
-              <a:rPr lang="en-US" sz="2700" dirty="0" err="1">
-                <a:latin typeface="Arial" pitchFamily="34" charset="0"/>
-                <a:cs typeface="Arial" pitchFamily="34" charset="0"/>
-              </a:rPr>
-              <a:t>pede</a:t>
-            </a:r>
-            <a:r>
-              <a:rPr lang="en-US" sz="2700" dirty="0">
-                <a:latin typeface="Arial" pitchFamily="34" charset="0"/>
-                <a:cs typeface="Arial" pitchFamily="34" charset="0"/>
-              </a:rPr>
-              <a:t> </a:t>
-            </a:r>
-            <a:r>
-              <a:rPr lang="en-US" sz="2700" dirty="0" err="1">
-                <a:latin typeface="Arial" pitchFamily="34" charset="0"/>
-                <a:cs typeface="Arial" pitchFamily="34" charset="0"/>
-              </a:rPr>
-              <a:t>ut</a:t>
-            </a:r>
-            <a:r>
-              <a:rPr lang="en-US" sz="2700" dirty="0">
-                <a:latin typeface="Arial" pitchFamily="34" charset="0"/>
-                <a:cs typeface="Arial" pitchFamily="34" charset="0"/>
-              </a:rPr>
-              <a:t> </a:t>
-            </a:r>
-            <a:r>
-              <a:rPr lang="en-US" sz="2700" dirty="0" err="1">
-                <a:latin typeface="Arial" pitchFamily="34" charset="0"/>
-                <a:cs typeface="Arial" pitchFamily="34" charset="0"/>
-              </a:rPr>
-              <a:t>odio</a:t>
-            </a:r>
-            <a:r>
-              <a:rPr lang="en-US" sz="2700" dirty="0">
-                <a:latin typeface="Arial" pitchFamily="34" charset="0"/>
-                <a:cs typeface="Arial" pitchFamily="34" charset="0"/>
-              </a:rPr>
-              <a:t>. </a:t>
-            </a:r>
-            <a:r>
-              <a:rPr lang="en-US" sz="2700" dirty="0" err="1">
-                <a:latin typeface="Arial" pitchFamily="34" charset="0"/>
-                <a:cs typeface="Arial" pitchFamily="34" charset="0"/>
-              </a:rPr>
-              <a:t>Quisque</a:t>
-            </a:r>
-            <a:r>
-              <a:rPr lang="en-US" sz="2700" dirty="0">
-                <a:latin typeface="Arial" pitchFamily="34" charset="0"/>
-                <a:cs typeface="Arial" pitchFamily="34" charset="0"/>
-              </a:rPr>
-              <a:t> </a:t>
-            </a:r>
-            <a:r>
-              <a:rPr lang="en-US" sz="2700" dirty="0" err="1">
-                <a:latin typeface="Arial" pitchFamily="34" charset="0"/>
-                <a:cs typeface="Arial" pitchFamily="34" charset="0"/>
-              </a:rPr>
-              <a:t>pretium</a:t>
-            </a:r>
-            <a:r>
-              <a:rPr lang="en-US" sz="2700" dirty="0">
-                <a:latin typeface="Arial" pitchFamily="34" charset="0"/>
-                <a:cs typeface="Arial" pitchFamily="34" charset="0"/>
-              </a:rPr>
-              <a:t> </a:t>
-            </a:r>
-            <a:r>
-              <a:rPr lang="en-US" sz="2700" dirty="0" err="1">
-                <a:latin typeface="Arial" pitchFamily="34" charset="0"/>
-                <a:cs typeface="Arial" pitchFamily="34" charset="0"/>
-              </a:rPr>
-              <a:t>nunc</a:t>
-            </a:r>
-            <a:r>
-              <a:rPr lang="en-US" sz="2700" dirty="0">
-                <a:latin typeface="Arial" pitchFamily="34" charset="0"/>
-                <a:cs typeface="Arial" pitchFamily="34" charset="0"/>
-              </a:rPr>
-              <a:t> ac sem. </a:t>
-            </a:r>
-            <a:r>
-              <a:rPr lang="en-US" sz="2700" dirty="0" err="1">
-                <a:latin typeface="Arial" pitchFamily="34" charset="0"/>
-                <a:cs typeface="Arial" pitchFamily="34" charset="0"/>
-              </a:rPr>
-              <a:t>Ut</a:t>
-            </a:r>
-            <a:r>
-              <a:rPr lang="en-US" sz="2700" dirty="0">
-                <a:latin typeface="Arial" pitchFamily="34" charset="0"/>
-                <a:cs typeface="Arial" pitchFamily="34" charset="0"/>
-              </a:rPr>
-              <a:t> </a:t>
-            </a:r>
-            <a:r>
-              <a:rPr lang="en-US" sz="2700" dirty="0" err="1">
-                <a:latin typeface="Arial" pitchFamily="34" charset="0"/>
-                <a:cs typeface="Arial" pitchFamily="34" charset="0"/>
-              </a:rPr>
-              <a:t>aliquam</a:t>
-            </a:r>
-            <a:r>
-              <a:rPr lang="en-US" sz="2700" dirty="0">
-                <a:latin typeface="Arial" pitchFamily="34" charset="0"/>
-                <a:cs typeface="Arial" pitchFamily="34" charset="0"/>
-              </a:rPr>
-              <a:t> </a:t>
-            </a:r>
-            <a:r>
-              <a:rPr lang="en-US" sz="2700" dirty="0" err="1">
-                <a:latin typeface="Arial" pitchFamily="34" charset="0"/>
-                <a:cs typeface="Arial" pitchFamily="34" charset="0"/>
-              </a:rPr>
-              <a:t>consequat</a:t>
-            </a:r>
-            <a:r>
-              <a:rPr lang="en-US" sz="2700" dirty="0">
-                <a:latin typeface="Arial" pitchFamily="34" charset="0"/>
-                <a:cs typeface="Arial" pitchFamily="34" charset="0"/>
-              </a:rPr>
-              <a:t> </a:t>
-            </a:r>
-            <a:r>
-              <a:rPr lang="en-US" sz="2700" dirty="0" err="1">
-                <a:latin typeface="Arial" pitchFamily="34" charset="0"/>
-                <a:cs typeface="Arial" pitchFamily="34" charset="0"/>
-              </a:rPr>
-              <a:t>mauris</a:t>
-            </a:r>
-            <a:r>
-              <a:rPr lang="en-US" sz="2700" dirty="0">
-                <a:latin typeface="Arial" pitchFamily="34" charset="0"/>
-                <a:cs typeface="Arial" pitchFamily="34" charset="0"/>
-              </a:rPr>
-              <a:t>. </a:t>
-            </a:r>
-          </a:p>
-        </p:txBody>
-      </p:sp>
-      <p:sp>
-        <p:nvSpPr>
-          <p:cNvPr id="32" name="Text Box 512"/>
+              <a:rPr lang="en-US" sz="2700" dirty="0" err="1" smtClean="0">
+                <a:latin typeface="Arial" pitchFamily="34" charset="0"/>
+                <a:cs typeface="Arial" pitchFamily="34" charset="0"/>
+              </a:rPr>
+              <a:t>eros</a:t>
+            </a:r>
+            <a:r>
+              <a:rPr lang="en-US" sz="2700" dirty="0" smtClean="0">
+                <a:latin typeface="Arial" pitchFamily="34" charset="0"/>
+                <a:cs typeface="Arial" pitchFamily="34" charset="0"/>
+              </a:rPr>
+              <a:t>, non</a:t>
+            </a:r>
+            <a:endParaRPr lang="en-US" sz="2700" dirty="0">
+              <a:latin typeface="Arial" pitchFamily="34" charset="0"/>
+              <a:cs typeface="Arial" pitchFamily="34" charset="0"/>
+            </a:endParaRPr>
+          </a:p>
+        </p:txBody>
+      </p:sp>
+      <p:sp>
+        <p:nvSpPr>
+          <p:cNvPr id="33" name="Text Box 512"/>
           <p:cNvSpPr txBox="1">
             <a:spLocks noChangeArrowheads="1"/>
           </p:cNvSpPr>
@@ -5434,8 +5266,8 @@
         </p:nvSpPr>
         <p:spPr bwMode="auto">
           <a:xfrm>
-            <a:off x="18768485" y="17064038"/>
-            <a:ext cx="14820900" cy="2855739"/>
+            <a:off x="14125576" y="30062488"/>
+            <a:ext cx="11115675" cy="2855739"/>
           </a:xfrm>
           <a:prstGeom prst="rect">
             <a:avLst/>
@@ -5468,7 +5300,7 @@
                 <a:latin typeface="Arial" pitchFamily="34" charset="0"/>
                 <a:cs typeface="Arial" pitchFamily="34" charset="0"/>
               </a:rPr>
-              <a:t>Evaluation</a:t>
+              <a:t>Future Work</a:t>
             </a:r>
             <a:endParaRPr lang="en-US" sz="3600" dirty="0">
               <a:solidFill>
@@ -5488,550 +5320,389 @@
               </a:spcBef>
             </a:pPr>
             <a:r>
-              <a:rPr lang="en-US" sz="2700" dirty="0" err="1" smtClean="0">
+              <a:rPr lang="en-US" sz="2700" dirty="0" err="1">
                 <a:latin typeface="Arial" pitchFamily="34" charset="0"/>
                 <a:cs typeface="Arial" pitchFamily="34" charset="0"/>
               </a:rPr>
               <a:t>Lorem</a:t>
             </a:r>
             <a:r>
-              <a:rPr lang="en-US" sz="2700" dirty="0" smtClean="0">
+              <a:rPr lang="en-US" sz="2700" dirty="0">
                 <a:latin typeface="Arial" pitchFamily="34" charset="0"/>
                 <a:cs typeface="Arial" pitchFamily="34" charset="0"/>
               </a:rPr>
               <a:t> </a:t>
             </a:r>
             <a:r>
-              <a:rPr lang="en-US" sz="2700" dirty="0" err="1" smtClean="0">
+              <a:rPr lang="en-US" sz="2700" dirty="0" err="1">
                 <a:latin typeface="Arial" pitchFamily="34" charset="0"/>
                 <a:cs typeface="Arial" pitchFamily="34" charset="0"/>
               </a:rPr>
               <a:t>ipsum</a:t>
             </a:r>
             <a:r>
-              <a:rPr lang="en-US" sz="2700" dirty="0" smtClean="0">
+              <a:rPr lang="en-US" sz="2700" dirty="0">
                 <a:latin typeface="Arial" pitchFamily="34" charset="0"/>
                 <a:cs typeface="Arial" pitchFamily="34" charset="0"/>
               </a:rPr>
               <a:t> dolor sit </a:t>
             </a:r>
             <a:r>
-              <a:rPr lang="en-US" sz="2700" dirty="0" err="1" smtClean="0">
+              <a:rPr lang="en-US" sz="2700" dirty="0" err="1">
                 <a:latin typeface="Arial" pitchFamily="34" charset="0"/>
                 <a:cs typeface="Arial" pitchFamily="34" charset="0"/>
               </a:rPr>
               <a:t>amet</a:t>
             </a:r>
             <a:r>
-              <a:rPr lang="en-US" sz="2700" dirty="0" smtClean="0">
+              <a:rPr lang="en-US" sz="2700" dirty="0">
                 <a:latin typeface="Arial" pitchFamily="34" charset="0"/>
                 <a:cs typeface="Arial" pitchFamily="34" charset="0"/>
               </a:rPr>
               <a:t>, </a:t>
             </a:r>
             <a:r>
-              <a:rPr lang="en-US" sz="2700" dirty="0" err="1" smtClean="0">
-                <a:latin typeface="Arial" pitchFamily="34" charset="0"/>
-                <a:cs typeface="Arial" pitchFamily="34" charset="0"/>
-              </a:rPr>
-              <a:t>consectetur</a:t>
-            </a:r>
-            <a:r>
-              <a:rPr lang="en-US" sz="2700" dirty="0" smtClean="0">
+              <a:rPr lang="en-US" sz="2700" dirty="0" err="1">
+                <a:latin typeface="Arial" pitchFamily="34" charset="0"/>
+                <a:cs typeface="Arial" pitchFamily="34" charset="0"/>
+              </a:rPr>
+              <a:t>consectetuer</a:t>
+            </a:r>
+            <a:r>
+              <a:rPr lang="en-US" sz="2700" dirty="0">
                 <a:latin typeface="Arial" pitchFamily="34" charset="0"/>
                 <a:cs typeface="Arial" pitchFamily="34" charset="0"/>
               </a:rPr>
               <a:t> </a:t>
             </a:r>
             <a:r>
-              <a:rPr lang="en-US" sz="2700" dirty="0" err="1" smtClean="0">
+              <a:rPr lang="en-US" sz="2700" dirty="0" err="1">
                 <a:latin typeface="Arial" pitchFamily="34" charset="0"/>
                 <a:cs typeface="Arial" pitchFamily="34" charset="0"/>
               </a:rPr>
               <a:t>adipiscing</a:t>
             </a:r>
             <a:r>
-              <a:rPr lang="en-US" sz="2700" dirty="0" smtClean="0">
+              <a:rPr lang="en-US" sz="2700" dirty="0">
                 <a:latin typeface="Arial" pitchFamily="34" charset="0"/>
                 <a:cs typeface="Arial" pitchFamily="34" charset="0"/>
               </a:rPr>
               <a:t> </a:t>
             </a:r>
             <a:r>
-              <a:rPr lang="en-US" sz="2700" dirty="0" err="1" smtClean="0">
+              <a:rPr lang="en-US" sz="2700" dirty="0" err="1">
                 <a:latin typeface="Arial" pitchFamily="34" charset="0"/>
                 <a:cs typeface="Arial" pitchFamily="34" charset="0"/>
               </a:rPr>
               <a:t>elit</a:t>
             </a:r>
             <a:r>
-              <a:rPr lang="en-US" sz="2700" dirty="0" smtClean="0">
+              <a:rPr lang="en-US" sz="2700" dirty="0">
+                <a:latin typeface="Arial" pitchFamily="34" charset="0"/>
+                <a:cs typeface="Arial" pitchFamily="34" charset="0"/>
+              </a:rPr>
+              <a:t>. Integer in sem. </a:t>
+            </a:r>
+            <a:r>
+              <a:rPr lang="en-US" sz="2700" dirty="0" err="1">
+                <a:latin typeface="Arial" pitchFamily="34" charset="0"/>
+                <a:cs typeface="Arial" pitchFamily="34" charset="0"/>
+              </a:rPr>
+              <a:t>Proin</a:t>
+            </a:r>
+            <a:r>
+              <a:rPr lang="en-US" sz="2700" dirty="0">
+                <a:latin typeface="Arial" pitchFamily="34" charset="0"/>
+                <a:cs typeface="Arial" pitchFamily="34" charset="0"/>
+              </a:rPr>
+              <a:t> </a:t>
+            </a:r>
+            <a:r>
+              <a:rPr lang="en-US" sz="2700" dirty="0" err="1">
+                <a:latin typeface="Arial" pitchFamily="34" charset="0"/>
+                <a:cs typeface="Arial" pitchFamily="34" charset="0"/>
+              </a:rPr>
+              <a:t>nec</a:t>
+            </a:r>
+            <a:r>
+              <a:rPr lang="en-US" sz="2700" dirty="0">
+                <a:latin typeface="Arial" pitchFamily="34" charset="0"/>
+                <a:cs typeface="Arial" pitchFamily="34" charset="0"/>
+              </a:rPr>
+              <a:t> </a:t>
+            </a:r>
+            <a:r>
+              <a:rPr lang="en-US" sz="2700" dirty="0" err="1">
+                <a:latin typeface="Arial" pitchFamily="34" charset="0"/>
+                <a:cs typeface="Arial" pitchFamily="34" charset="0"/>
+              </a:rPr>
+              <a:t>lorem</a:t>
+            </a:r>
+            <a:r>
+              <a:rPr lang="en-US" sz="2700" dirty="0">
                 <a:latin typeface="Arial" pitchFamily="34" charset="0"/>
                 <a:cs typeface="Arial" pitchFamily="34" charset="0"/>
               </a:rPr>
               <a:t>. </a:t>
             </a:r>
             <a:r>
-              <a:rPr lang="en-US" sz="2700" dirty="0" err="1" smtClean="0">
-                <a:latin typeface="Arial" pitchFamily="34" charset="0"/>
-                <a:cs typeface="Arial" pitchFamily="34" charset="0"/>
-              </a:rPr>
-              <a:t>Duis</a:t>
-            </a:r>
-            <a:r>
-              <a:rPr lang="en-US" sz="2700" dirty="0" smtClean="0">
-                <a:latin typeface="Arial" pitchFamily="34" charset="0"/>
-                <a:cs typeface="Arial" pitchFamily="34" charset="0"/>
-              </a:rPr>
-              <a:t> id </a:t>
-            </a:r>
-            <a:r>
-              <a:rPr lang="en-US" sz="2700" dirty="0" err="1" smtClean="0">
-                <a:latin typeface="Arial" pitchFamily="34" charset="0"/>
-                <a:cs typeface="Arial" pitchFamily="34" charset="0"/>
-              </a:rPr>
-              <a:t>sem</a:t>
-            </a:r>
-            <a:r>
-              <a:rPr lang="en-US" sz="2700" dirty="0" smtClean="0">
+              <a:rPr lang="en-US" sz="2700" dirty="0" err="1">
+                <a:latin typeface="Arial" pitchFamily="34" charset="0"/>
+                <a:cs typeface="Arial" pitchFamily="34" charset="0"/>
+              </a:rPr>
+              <a:t>Fusce</a:t>
+            </a:r>
+            <a:r>
+              <a:rPr lang="en-US" sz="2700" dirty="0">
                 <a:latin typeface="Arial" pitchFamily="34" charset="0"/>
                 <a:cs typeface="Arial" pitchFamily="34" charset="0"/>
               </a:rPr>
               <a:t> </a:t>
             </a:r>
             <a:r>
-              <a:rPr lang="en-US" sz="2700" dirty="0" err="1" smtClean="0">
-                <a:latin typeface="Arial" pitchFamily="34" charset="0"/>
-                <a:cs typeface="Arial" pitchFamily="34" charset="0"/>
-              </a:rPr>
-              <a:t>vel</a:t>
-            </a:r>
-            <a:r>
-              <a:rPr lang="en-US" sz="2700" dirty="0" smtClean="0">
+              <a:rPr lang="en-US" sz="2700" dirty="0" err="1">
+                <a:latin typeface="Arial" pitchFamily="34" charset="0"/>
+                <a:cs typeface="Arial" pitchFamily="34" charset="0"/>
+              </a:rPr>
+              <a:t>tincidunt</a:t>
+            </a:r>
+            <a:r>
+              <a:rPr lang="en-US" sz="2700" dirty="0">
                 <a:latin typeface="Arial" pitchFamily="34" charset="0"/>
                 <a:cs typeface="Arial" pitchFamily="34" charset="0"/>
               </a:rPr>
               <a:t> </a:t>
             </a:r>
             <a:r>
-              <a:rPr lang="en-US" sz="2700" dirty="0" err="1" smtClean="0">
-                <a:latin typeface="Arial" pitchFamily="34" charset="0"/>
-                <a:cs typeface="Arial" pitchFamily="34" charset="0"/>
-              </a:rPr>
-              <a:t>lorem</a:t>
-            </a:r>
-            <a:r>
-              <a:rPr lang="en-US" sz="2700" dirty="0" smtClean="0">
+              <a:rPr lang="en-US" sz="2700" dirty="0" err="1">
+                <a:latin typeface="Arial" pitchFamily="34" charset="0"/>
+                <a:cs typeface="Arial" pitchFamily="34" charset="0"/>
+              </a:rPr>
+              <a:t>feugiat</a:t>
+            </a:r>
+            <a:r>
+              <a:rPr lang="en-US" sz="2700" dirty="0">
                 <a:latin typeface="Arial" pitchFamily="34" charset="0"/>
                 <a:cs typeface="Arial" pitchFamily="34" charset="0"/>
               </a:rPr>
               <a:t> </a:t>
             </a:r>
             <a:r>
-              <a:rPr lang="en-US" sz="2700" dirty="0" err="1" smtClean="0">
-                <a:latin typeface="Arial" pitchFamily="34" charset="0"/>
-                <a:cs typeface="Arial" pitchFamily="34" charset="0"/>
-              </a:rPr>
-              <a:t>pulvinar</a:t>
-            </a:r>
-            <a:r>
-              <a:rPr lang="en-US" sz="2700" dirty="0" smtClean="0">
+              <a:rPr lang="en-US" sz="2700" dirty="0" err="1">
+                <a:latin typeface="Arial" pitchFamily="34" charset="0"/>
+                <a:cs typeface="Arial" pitchFamily="34" charset="0"/>
+              </a:rPr>
+              <a:t>sapien</a:t>
+            </a:r>
+            <a:r>
+              <a:rPr lang="en-US" sz="2700" dirty="0">
+                <a:latin typeface="Arial" pitchFamily="34" charset="0"/>
+                <a:cs typeface="Arial" pitchFamily="34" charset="0"/>
+              </a:rPr>
+              <a:t>. </a:t>
+            </a:r>
+            <a:r>
+              <a:rPr lang="en-US" sz="2700" dirty="0" err="1">
+                <a:latin typeface="Arial" pitchFamily="34" charset="0"/>
+                <a:cs typeface="Arial" pitchFamily="34" charset="0"/>
+              </a:rPr>
+              <a:t>Donec</a:t>
+            </a:r>
+            <a:r>
+              <a:rPr lang="en-US" sz="2700" dirty="0">
                 <a:latin typeface="Arial" pitchFamily="34" charset="0"/>
                 <a:cs typeface="Arial" pitchFamily="34" charset="0"/>
               </a:rPr>
               <a:t> </a:t>
             </a:r>
             <a:r>
-              <a:rPr lang="en-US" sz="2700" dirty="0" err="1" smtClean="0">
-                <a:latin typeface="Arial" pitchFamily="34" charset="0"/>
-                <a:cs typeface="Arial" pitchFamily="34" charset="0"/>
-              </a:rPr>
-              <a:t>hendrerit</a:t>
-            </a:r>
-            <a:r>
-              <a:rPr lang="en-US" sz="2700" dirty="0" smtClean="0">
-                <a:latin typeface="Arial" pitchFamily="34" charset="0"/>
-                <a:cs typeface="Arial" pitchFamily="34" charset="0"/>
-              </a:rPr>
-              <a:t> ac at </a:t>
-            </a:r>
-            <a:r>
-              <a:rPr lang="en-US" sz="2700" dirty="0" err="1" smtClean="0">
-                <a:latin typeface="Arial" pitchFamily="34" charset="0"/>
-                <a:cs typeface="Arial" pitchFamily="34" charset="0"/>
-              </a:rPr>
-              <a:t>neque</a:t>
-            </a:r>
-            <a:r>
-              <a:rPr lang="en-US" sz="2700" dirty="0" smtClean="0">
+              <a:rPr lang="en-US" sz="2700" dirty="0" err="1">
+                <a:latin typeface="Arial" pitchFamily="34" charset="0"/>
+                <a:cs typeface="Arial" pitchFamily="34" charset="0"/>
+              </a:rPr>
+              <a:t>suscipit</a:t>
+            </a:r>
+            <a:r>
+              <a:rPr lang="en-US" sz="2700" dirty="0">
+                <a:latin typeface="Arial" pitchFamily="34" charset="0"/>
+                <a:cs typeface="Arial" pitchFamily="34" charset="0"/>
+              </a:rPr>
+              <a:t> </a:t>
+            </a:r>
+            <a:r>
+              <a:rPr lang="en-US" sz="2700" dirty="0" err="1">
+                <a:latin typeface="Arial" pitchFamily="34" charset="0"/>
+                <a:cs typeface="Arial" pitchFamily="34" charset="0"/>
+              </a:rPr>
+              <a:t>tellus</a:t>
+            </a:r>
+            <a:r>
+              <a:rPr lang="en-US" sz="2700" dirty="0">
+                <a:latin typeface="Arial" pitchFamily="34" charset="0"/>
+                <a:cs typeface="Arial" pitchFamily="34" charset="0"/>
+              </a:rPr>
+              <a:t> </a:t>
+            </a:r>
+            <a:r>
+              <a:rPr lang="en-US" sz="2700" dirty="0" err="1">
+                <a:latin typeface="Arial" pitchFamily="34" charset="0"/>
+                <a:cs typeface="Arial" pitchFamily="34" charset="0"/>
+              </a:rPr>
+              <a:t>eu</a:t>
+            </a:r>
+            <a:r>
+              <a:rPr lang="en-US" sz="2700" dirty="0">
+                <a:latin typeface="Arial" pitchFamily="34" charset="0"/>
+                <a:cs typeface="Arial" pitchFamily="34" charset="0"/>
+              </a:rPr>
+              <a:t> </a:t>
+            </a:r>
+            <a:r>
+              <a:rPr lang="en-US" sz="2700" dirty="0" err="1">
+                <a:latin typeface="Arial" pitchFamily="34" charset="0"/>
+                <a:cs typeface="Arial" pitchFamily="34" charset="0"/>
+              </a:rPr>
+              <a:t>ipsum</a:t>
+            </a:r>
+            <a:r>
+              <a:rPr lang="en-US" sz="2700" dirty="0">
                 <a:latin typeface="Arial" pitchFamily="34" charset="0"/>
                 <a:cs typeface="Arial" pitchFamily="34" charset="0"/>
               </a:rPr>
               <a:t>. </a:t>
             </a:r>
             <a:r>
-              <a:rPr lang="en-US" sz="2700" dirty="0" err="1" smtClean="0">
-                <a:latin typeface="Arial" pitchFamily="34" charset="0"/>
-                <a:cs typeface="Arial" pitchFamily="34" charset="0"/>
-              </a:rPr>
-              <a:t>Phasellus</a:t>
-            </a:r>
-            <a:r>
-              <a:rPr lang="en-US" sz="2700" dirty="0" smtClean="0">
+              <a:rPr lang="en-US" sz="2700" dirty="0" err="1">
+                <a:latin typeface="Arial" pitchFamily="34" charset="0"/>
+                <a:cs typeface="Arial" pitchFamily="34" charset="0"/>
+              </a:rPr>
+              <a:t>Sed</a:t>
+            </a:r>
+            <a:r>
+              <a:rPr lang="en-US" sz="2700" dirty="0">
                 <a:latin typeface="Arial" pitchFamily="34" charset="0"/>
                 <a:cs typeface="Arial" pitchFamily="34" charset="0"/>
               </a:rPr>
               <a:t> </a:t>
             </a:r>
             <a:r>
-              <a:rPr lang="en-US" sz="2700" dirty="0" err="1" smtClean="0">
-                <a:latin typeface="Arial" pitchFamily="34" charset="0"/>
-                <a:cs typeface="Arial" pitchFamily="34" charset="0"/>
-              </a:rPr>
-              <a:t>ornare</a:t>
-            </a:r>
-            <a:r>
-              <a:rPr lang="en-US" sz="2700" dirty="0" smtClean="0">
+              <a:rPr lang="en-US" sz="2700" dirty="0" err="1">
+                <a:latin typeface="Arial" pitchFamily="34" charset="0"/>
+                <a:cs typeface="Arial" pitchFamily="34" charset="0"/>
+              </a:rPr>
+              <a:t>ultrices</a:t>
+            </a:r>
+            <a:r>
+              <a:rPr lang="en-US" sz="2700" dirty="0">
+                <a:latin typeface="Arial" pitchFamily="34" charset="0"/>
+                <a:cs typeface="Arial" pitchFamily="34" charset="0"/>
+              </a:rPr>
+              <a:t>, </a:t>
+            </a:r>
+            <a:r>
+              <a:rPr lang="en-US" sz="2700" dirty="0" err="1">
+                <a:latin typeface="Arial" pitchFamily="34" charset="0"/>
+                <a:cs typeface="Arial" pitchFamily="34" charset="0"/>
+              </a:rPr>
+              <a:t>risus</a:t>
+            </a:r>
+            <a:r>
+              <a:rPr lang="en-US" sz="2700" dirty="0">
+                <a:latin typeface="Arial" pitchFamily="34" charset="0"/>
+                <a:cs typeface="Arial" pitchFamily="34" charset="0"/>
+              </a:rPr>
+              <a:t> at </a:t>
+            </a:r>
+            <a:r>
+              <a:rPr lang="en-US" sz="2700" dirty="0" err="1">
+                <a:latin typeface="Arial" pitchFamily="34" charset="0"/>
+                <a:cs typeface="Arial" pitchFamily="34" charset="0"/>
+              </a:rPr>
+              <a:t>faucibus</a:t>
+            </a:r>
+            <a:r>
+              <a:rPr lang="en-US" sz="2700" dirty="0">
                 <a:latin typeface="Arial" pitchFamily="34" charset="0"/>
                 <a:cs typeface="Arial" pitchFamily="34" charset="0"/>
               </a:rPr>
               <a:t> </a:t>
             </a:r>
             <a:r>
-              <a:rPr lang="en-US" sz="2700" dirty="0" err="1" smtClean="0">
-                <a:latin typeface="Arial" pitchFamily="34" charset="0"/>
-                <a:cs typeface="Arial" pitchFamily="34" charset="0"/>
-              </a:rPr>
-              <a:t>erat</a:t>
-            </a:r>
-            <a:r>
-              <a:rPr lang="en-US" sz="2700" dirty="0" smtClean="0">
-                <a:latin typeface="Arial" pitchFamily="34" charset="0"/>
-                <a:cs typeface="Arial" pitchFamily="34" charset="0"/>
-              </a:rPr>
-              <a:t> sit </a:t>
-            </a:r>
-            <a:r>
-              <a:rPr lang="en-US" sz="2700" dirty="0" err="1" smtClean="0">
-                <a:latin typeface="Arial" pitchFamily="34" charset="0"/>
-                <a:cs typeface="Arial" pitchFamily="34" charset="0"/>
-              </a:rPr>
-              <a:t>amet</a:t>
-            </a:r>
-            <a:r>
-              <a:rPr lang="en-US" sz="2700" dirty="0" smtClean="0">
+              <a:rPr lang="en-US" sz="2700" dirty="0" err="1">
+                <a:latin typeface="Arial" pitchFamily="34" charset="0"/>
+                <a:cs typeface="Arial" pitchFamily="34" charset="0"/>
+              </a:rPr>
+              <a:t>mattis</a:t>
+            </a:r>
+            <a:r>
+              <a:rPr lang="en-US" sz="2700" dirty="0">
+                <a:latin typeface="Arial" pitchFamily="34" charset="0"/>
+                <a:cs typeface="Arial" pitchFamily="34" charset="0"/>
+              </a:rPr>
+              <a:t>, </a:t>
+            </a:r>
+            <a:r>
+              <a:rPr lang="en-US" sz="2700" dirty="0" err="1">
+                <a:latin typeface="Arial" pitchFamily="34" charset="0"/>
+                <a:cs typeface="Arial" pitchFamily="34" charset="0"/>
+              </a:rPr>
+              <a:t>ligula</a:t>
+            </a:r>
+            <a:r>
+              <a:rPr lang="en-US" sz="2700" dirty="0">
                 <a:latin typeface="Arial" pitchFamily="34" charset="0"/>
                 <a:cs typeface="Arial" pitchFamily="34" charset="0"/>
               </a:rPr>
               <a:t> </a:t>
             </a:r>
             <a:r>
-              <a:rPr lang="en-US" sz="2700" dirty="0" err="1" smtClean="0">
-                <a:latin typeface="Arial" pitchFamily="34" charset="0"/>
-                <a:cs typeface="Arial" pitchFamily="34" charset="0"/>
-              </a:rPr>
-              <a:t>libero</a:t>
-            </a:r>
-            <a:r>
-              <a:rPr lang="en-US" sz="2700" dirty="0" smtClean="0">
+              <a:rPr lang="en-US" sz="2700" dirty="0" err="1">
+                <a:latin typeface="Arial" pitchFamily="34" charset="0"/>
+                <a:cs typeface="Arial" pitchFamily="34" charset="0"/>
+              </a:rPr>
+              <a:t>odio</a:t>
+            </a:r>
+            <a:r>
+              <a:rPr lang="en-US" sz="2700" dirty="0">
                 <a:latin typeface="Arial" pitchFamily="34" charset="0"/>
                 <a:cs typeface="Arial" pitchFamily="34" charset="0"/>
               </a:rPr>
               <a:t> </a:t>
             </a:r>
             <a:r>
-              <a:rPr lang="en-US" sz="2700" dirty="0" err="1" smtClean="0">
-                <a:latin typeface="Arial" pitchFamily="34" charset="0"/>
-                <a:cs typeface="Arial" pitchFamily="34" charset="0"/>
-              </a:rPr>
-              <a:t>ullamcorper</a:t>
-            </a:r>
-            <a:r>
-              <a:rPr lang="en-US" sz="2700" dirty="0" smtClean="0">
+              <a:rPr lang="en-US" sz="2700" dirty="0" err="1">
+                <a:latin typeface="Arial" pitchFamily="34" charset="0"/>
+                <a:cs typeface="Arial" pitchFamily="34" charset="0"/>
+              </a:rPr>
+              <a:t>porttitor</a:t>
+            </a:r>
+            <a:r>
+              <a:rPr lang="en-US" sz="2700" dirty="0">
                 <a:latin typeface="Arial" pitchFamily="34" charset="0"/>
                 <a:cs typeface="Arial" pitchFamily="34" charset="0"/>
               </a:rPr>
               <a:t> </a:t>
             </a:r>
             <a:r>
-              <a:rPr lang="en-US" sz="2700" dirty="0" err="1" smtClean="0">
-                <a:latin typeface="Arial" pitchFamily="34" charset="0"/>
-                <a:cs typeface="Arial" pitchFamily="34" charset="0"/>
-              </a:rPr>
-              <a:t>condimentum</a:t>
-            </a:r>
-            <a:r>
-              <a:rPr lang="en-US" sz="2700" dirty="0" smtClean="0">
-                <a:latin typeface="Arial" pitchFamily="34" charset="0"/>
-                <a:cs typeface="Arial" pitchFamily="34" charset="0"/>
-              </a:rPr>
-              <a:t>. </a:t>
-            </a:r>
-            <a:r>
-              <a:rPr lang="en-US" sz="2700" dirty="0" err="1" smtClean="0">
-                <a:latin typeface="Arial" pitchFamily="34" charset="0"/>
-                <a:cs typeface="Arial" pitchFamily="34" charset="0"/>
-              </a:rPr>
-              <a:t>Pellentesque</a:t>
-            </a:r>
-            <a:r>
-              <a:rPr lang="en-US" sz="2700" dirty="0" smtClean="0">
-                <a:latin typeface="Arial" pitchFamily="34" charset="0"/>
-                <a:cs typeface="Arial" pitchFamily="34" charset="0"/>
-              </a:rPr>
-              <a:t> </a:t>
-            </a:r>
-            <a:r>
-              <a:rPr lang="en-US" sz="2700" dirty="0" err="1" smtClean="0">
-                <a:latin typeface="Arial" pitchFamily="34" charset="0"/>
-                <a:cs typeface="Arial" pitchFamily="34" charset="0"/>
-              </a:rPr>
-              <a:t>luctus</a:t>
-            </a:r>
-            <a:r>
-              <a:rPr lang="en-US" sz="2700" dirty="0" smtClean="0">
-                <a:latin typeface="Arial" pitchFamily="34" charset="0"/>
-                <a:cs typeface="Arial" pitchFamily="34" charset="0"/>
-              </a:rPr>
-              <a:t> </a:t>
-            </a:r>
-            <a:r>
-              <a:rPr lang="en-US" sz="2700" dirty="0" err="1" smtClean="0">
-                <a:latin typeface="Arial" pitchFamily="34" charset="0"/>
-                <a:cs typeface="Arial" pitchFamily="34" charset="0"/>
-              </a:rPr>
-              <a:t>ornare</a:t>
-            </a:r>
-            <a:r>
-              <a:rPr lang="en-US" sz="2700" dirty="0" smtClean="0">
-                <a:latin typeface="Arial" pitchFamily="34" charset="0"/>
-                <a:cs typeface="Arial" pitchFamily="34" charset="0"/>
-              </a:rPr>
-              <a:t> </a:t>
-            </a:r>
-            <a:r>
-              <a:rPr lang="en-US" sz="2700" dirty="0" err="1" smtClean="0">
-                <a:latin typeface="Arial" pitchFamily="34" charset="0"/>
-                <a:cs typeface="Arial" pitchFamily="34" charset="0"/>
-              </a:rPr>
-              <a:t>commodo</a:t>
-            </a:r>
-            <a:r>
-              <a:rPr lang="en-US" sz="2700" dirty="0" smtClean="0">
-                <a:latin typeface="Arial" pitchFamily="34" charset="0"/>
-                <a:cs typeface="Arial" pitchFamily="34" charset="0"/>
-              </a:rPr>
-              <a:t>. </a:t>
-            </a:r>
-            <a:r>
-              <a:rPr lang="en-US" sz="2700" dirty="0" err="1" smtClean="0">
-                <a:latin typeface="Arial" pitchFamily="34" charset="0"/>
-                <a:cs typeface="Arial" pitchFamily="34" charset="0"/>
-              </a:rPr>
-              <a:t>Sed</a:t>
-            </a:r>
-            <a:r>
-              <a:rPr lang="en-US" sz="2700" dirty="0" smtClean="0">
-                <a:latin typeface="Arial" pitchFamily="34" charset="0"/>
-                <a:cs typeface="Arial" pitchFamily="34" charset="0"/>
-              </a:rPr>
-              <a:t> </a:t>
-            </a:r>
-            <a:r>
-              <a:rPr lang="en-US" sz="2700" dirty="0" err="1" smtClean="0">
-                <a:latin typeface="Arial" pitchFamily="34" charset="0"/>
-                <a:cs typeface="Arial" pitchFamily="34" charset="0"/>
-              </a:rPr>
-              <a:t>convallis</a:t>
-            </a:r>
-            <a:r>
-              <a:rPr lang="en-US" sz="2700" dirty="0" smtClean="0">
-                <a:latin typeface="Arial" pitchFamily="34" charset="0"/>
-                <a:cs typeface="Arial" pitchFamily="34" charset="0"/>
-              </a:rPr>
-              <a:t> quam sit </a:t>
-            </a:r>
-            <a:r>
-              <a:rPr lang="en-US" sz="2700" dirty="0" err="1" smtClean="0">
-                <a:latin typeface="Arial" pitchFamily="34" charset="0"/>
-                <a:cs typeface="Arial" pitchFamily="34" charset="0"/>
-              </a:rPr>
-              <a:t>amet</a:t>
-            </a:r>
-            <a:r>
-              <a:rPr lang="en-US" sz="2700" dirty="0" smtClean="0">
-                <a:latin typeface="Arial" pitchFamily="34" charset="0"/>
-                <a:cs typeface="Arial" pitchFamily="34" charset="0"/>
-              </a:rPr>
-              <a:t> </a:t>
-            </a:r>
-            <a:r>
-              <a:rPr lang="en-US" sz="2700" dirty="0" err="1" smtClean="0">
-                <a:latin typeface="Arial" pitchFamily="34" charset="0"/>
-                <a:cs typeface="Arial" pitchFamily="34" charset="0"/>
-              </a:rPr>
-              <a:t>neque</a:t>
-            </a:r>
-            <a:r>
-              <a:rPr lang="en-US" sz="2700" dirty="0" smtClean="0">
-                <a:latin typeface="Arial" pitchFamily="34" charset="0"/>
-                <a:cs typeface="Arial" pitchFamily="34" charset="0"/>
-              </a:rPr>
-              <a:t> </a:t>
-            </a:r>
-            <a:r>
-              <a:rPr lang="en-US" sz="2700" dirty="0" err="1" smtClean="0">
-                <a:latin typeface="Arial" pitchFamily="34" charset="0"/>
-                <a:cs typeface="Arial" pitchFamily="34" charset="0"/>
-              </a:rPr>
-              <a:t>lacinia</a:t>
-            </a:r>
-            <a:r>
-              <a:rPr lang="en-US" sz="2700" dirty="0" smtClean="0">
-                <a:latin typeface="Arial" pitchFamily="34" charset="0"/>
-                <a:cs typeface="Arial" pitchFamily="34" charset="0"/>
-              </a:rPr>
-              <a:t> </a:t>
-            </a:r>
-            <a:r>
-              <a:rPr lang="en-US" sz="2700" dirty="0" err="1" smtClean="0">
-                <a:latin typeface="Arial" pitchFamily="34" charset="0"/>
-                <a:cs typeface="Arial" pitchFamily="34" charset="0"/>
-              </a:rPr>
-              <a:t>viverra</a:t>
-            </a:r>
-            <a:r>
-              <a:rPr lang="en-US" sz="2700" dirty="0" smtClean="0">
-                <a:latin typeface="Arial" pitchFamily="34" charset="0"/>
-                <a:cs typeface="Arial" pitchFamily="34" charset="0"/>
-              </a:rPr>
-              <a:t>. Maecenas </a:t>
-            </a:r>
-            <a:r>
-              <a:rPr lang="en-US" sz="2700" dirty="0" err="1" smtClean="0">
-                <a:latin typeface="Arial" pitchFamily="34" charset="0"/>
-                <a:cs typeface="Arial" pitchFamily="34" charset="0"/>
-              </a:rPr>
-              <a:t>vestibulum</a:t>
-            </a:r>
-            <a:r>
-              <a:rPr lang="en-US" sz="2700" dirty="0" smtClean="0">
-                <a:latin typeface="Arial" pitchFamily="34" charset="0"/>
-                <a:cs typeface="Arial" pitchFamily="34" charset="0"/>
-              </a:rPr>
-              <a:t>, </a:t>
-            </a:r>
-            <a:r>
-              <a:rPr lang="en-US" sz="2700" dirty="0" err="1" smtClean="0">
-                <a:latin typeface="Arial" pitchFamily="34" charset="0"/>
-                <a:cs typeface="Arial" pitchFamily="34" charset="0"/>
-              </a:rPr>
-              <a:t>purus</a:t>
-            </a:r>
-            <a:r>
-              <a:rPr lang="en-US" sz="2700" dirty="0" smtClean="0">
-                <a:latin typeface="Arial" pitchFamily="34" charset="0"/>
-                <a:cs typeface="Arial" pitchFamily="34" charset="0"/>
-              </a:rPr>
-              <a:t> sit </a:t>
-            </a:r>
-            <a:r>
-              <a:rPr lang="en-US" sz="2700" dirty="0" err="1" smtClean="0">
-                <a:latin typeface="Arial" pitchFamily="34" charset="0"/>
-                <a:cs typeface="Arial" pitchFamily="34" charset="0"/>
-              </a:rPr>
-              <a:t>amet</a:t>
-            </a:r>
-            <a:r>
-              <a:rPr lang="en-US" sz="2700" dirty="0" smtClean="0">
-                <a:latin typeface="Arial" pitchFamily="34" charset="0"/>
-                <a:cs typeface="Arial" pitchFamily="34" charset="0"/>
-              </a:rPr>
-              <a:t> </a:t>
-            </a:r>
-            <a:r>
-              <a:rPr lang="en-US" sz="2700" dirty="0" err="1" smtClean="0">
-                <a:latin typeface="Arial" pitchFamily="34" charset="0"/>
-                <a:cs typeface="Arial" pitchFamily="34" charset="0"/>
-              </a:rPr>
-              <a:t>mollis</a:t>
-            </a:r>
-            <a:r>
-              <a:rPr lang="en-US" sz="2700" dirty="0" smtClean="0">
-                <a:latin typeface="Arial" pitchFamily="34" charset="0"/>
-                <a:cs typeface="Arial" pitchFamily="34" charset="0"/>
-              </a:rPr>
-              <a:t> </a:t>
-            </a:r>
-            <a:r>
-              <a:rPr lang="en-US" sz="2700" dirty="0" err="1" smtClean="0">
-                <a:latin typeface="Arial" pitchFamily="34" charset="0"/>
-                <a:cs typeface="Arial" pitchFamily="34" charset="0"/>
-              </a:rPr>
-              <a:t>sagittis</a:t>
-            </a:r>
-            <a:r>
-              <a:rPr lang="en-US" sz="2700" dirty="0" smtClean="0">
-                <a:latin typeface="Arial" pitchFamily="34" charset="0"/>
-                <a:cs typeface="Arial" pitchFamily="34" charset="0"/>
-              </a:rPr>
-              <a:t>, </a:t>
-            </a:r>
-            <a:r>
-              <a:rPr lang="en-US" sz="2700" dirty="0" err="1" smtClean="0">
-                <a:latin typeface="Arial" pitchFamily="34" charset="0"/>
-                <a:cs typeface="Arial" pitchFamily="34" charset="0"/>
-              </a:rPr>
-              <a:t>orci</a:t>
-            </a:r>
-            <a:r>
-              <a:rPr lang="en-US" sz="2700" dirty="0" smtClean="0">
-                <a:latin typeface="Arial" pitchFamily="34" charset="0"/>
-                <a:cs typeface="Arial" pitchFamily="34" charset="0"/>
-              </a:rPr>
-              <a:t> </a:t>
-            </a:r>
-            <a:r>
-              <a:rPr lang="en-US" sz="2700" dirty="0" err="1" smtClean="0">
-                <a:latin typeface="Arial" pitchFamily="34" charset="0"/>
-                <a:cs typeface="Arial" pitchFamily="34" charset="0"/>
-              </a:rPr>
-              <a:t>libero</a:t>
-            </a:r>
-            <a:r>
-              <a:rPr lang="en-US" sz="2700" dirty="0" smtClean="0">
-                <a:latin typeface="Arial" pitchFamily="34" charset="0"/>
-                <a:cs typeface="Arial" pitchFamily="34" charset="0"/>
-              </a:rPr>
-              <a:t> </a:t>
-            </a:r>
-            <a:r>
-              <a:rPr lang="en-US" sz="2700" dirty="0" err="1" smtClean="0">
-                <a:latin typeface="Arial" pitchFamily="34" charset="0"/>
-                <a:cs typeface="Arial" pitchFamily="34" charset="0"/>
-              </a:rPr>
-              <a:t>feugiat</a:t>
-            </a:r>
-            <a:r>
-              <a:rPr lang="en-US" sz="2700" dirty="0" smtClean="0">
-                <a:latin typeface="Arial" pitchFamily="34" charset="0"/>
-                <a:cs typeface="Arial" pitchFamily="34" charset="0"/>
-              </a:rPr>
-              <a:t> </a:t>
-            </a:r>
-            <a:r>
-              <a:rPr lang="en-US" sz="2700" dirty="0" err="1" smtClean="0">
-                <a:latin typeface="Arial" pitchFamily="34" charset="0"/>
-                <a:cs typeface="Arial" pitchFamily="34" charset="0"/>
-              </a:rPr>
-              <a:t>eros</a:t>
-            </a:r>
-            <a:r>
-              <a:rPr lang="en-US" sz="2700" dirty="0" smtClean="0">
-                <a:latin typeface="Arial" pitchFamily="34" charset="0"/>
-                <a:cs typeface="Arial" pitchFamily="34" charset="0"/>
-              </a:rPr>
-              <a:t>, non</a:t>
+              <a:rPr lang="en-US" sz="2700" dirty="0" err="1">
+                <a:latin typeface="Arial" pitchFamily="34" charset="0"/>
+                <a:cs typeface="Arial" pitchFamily="34" charset="0"/>
+              </a:rPr>
+              <a:t>nulla</a:t>
+            </a:r>
+            <a:r>
+              <a:rPr lang="en-US" sz="2700" dirty="0">
+                <a:latin typeface="Arial" pitchFamily="34" charset="0"/>
+                <a:cs typeface="Arial" pitchFamily="34" charset="0"/>
+              </a:rPr>
+              <a:t>, a </a:t>
+            </a:r>
+            <a:r>
+              <a:rPr lang="en-US" sz="2700" dirty="0" err="1" smtClean="0">
+                <a:latin typeface="Arial" pitchFamily="34" charset="0"/>
+                <a:cs typeface="Arial" pitchFamily="34" charset="0"/>
+              </a:rPr>
+              <a:t>dignissim</a:t>
             </a:r>
             <a:endParaRPr lang="en-US" sz="2700" dirty="0">
               <a:latin typeface="Arial" pitchFamily="34" charset="0"/>
@@ -6042,7 +5713,7 @@
       </p:sp>
       <p:sp>
         <p:nvSpPr>
-          <p:cNvPr id="33" name="Text Box 512"/>
+          <p:cNvPr id="34" name="Text Box 543"/>
           <p:cNvSpPr txBox="1">
             <a:spLocks noChangeArrowheads="1"/>
           </p:cNvSpPr>
@@ -6050,8 +5721,8 @@
         </p:nvSpPr>
         <p:spPr bwMode="auto">
           <a:xfrm>
-            <a:off x="18834101" y="22546866"/>
-            <a:ext cx="14820900" cy="2329954"/>
+            <a:off x="2021207" y="27658457"/>
+            <a:ext cx="11164887" cy="392415"/>
           </a:xfrm>
           <a:prstGeom prst="rect">
             <a:avLst/>
@@ -6066,461 +5737,6 @@
           <a:effectLst/>
         </p:spPr>
         <p:txBody>
-          <a:bodyPr wrap="square">
-            <a:spAutoFit/>
-          </a:bodyPr>
-          <a:lstStyle/>
-          <a:p>
-            <a:pPr>
-              <a:spcBef>
-                <a:spcPct val="50000"/>
-              </a:spcBef>
-            </a:pPr>
-            <a:r>
-              <a:rPr lang="en-US" sz="3600" b="1" dirty="0" smtClean="0">
-                <a:solidFill>
-                  <a:srgbClr val="003564"/>
-                </a:solidFill>
-                <a:latin typeface="Arial" pitchFamily="34" charset="0"/>
-                <a:cs typeface="Arial" pitchFamily="34" charset="0"/>
-              </a:rPr>
-              <a:t>Future Work</a:t>
-            </a:r>
-            <a:endParaRPr lang="en-US" sz="3600" dirty="0">
-              <a:solidFill>
-                <a:srgbClr val="003564"/>
-              </a:solidFill>
-              <a:latin typeface="Arial" pitchFamily="34" charset="0"/>
-              <a:cs typeface="Arial" pitchFamily="34" charset="0"/>
-            </a:endParaRPr>
-          </a:p>
-          <a:p>
-            <a:pPr>
-              <a:lnSpc>
-                <a:spcPts val="4100"/>
-              </a:lnSpc>
-              <a:spcBef>
-                <a:spcPct val="30000"/>
-              </a:spcBef>
-            </a:pPr>
-            <a:r>
-              <a:rPr lang="en-US" sz="2700" dirty="0" err="1">
-                <a:latin typeface="Arial" pitchFamily="34" charset="0"/>
-                <a:cs typeface="Arial" pitchFamily="34" charset="0"/>
-              </a:rPr>
-              <a:t>Lorem</a:t>
-            </a:r>
-            <a:r>
-              <a:rPr lang="en-US" sz="2700" dirty="0">
-                <a:latin typeface="Arial" pitchFamily="34" charset="0"/>
-                <a:cs typeface="Arial" pitchFamily="34" charset="0"/>
-              </a:rPr>
-              <a:t> </a:t>
-            </a:r>
-            <a:r>
-              <a:rPr lang="en-US" sz="2700" dirty="0" err="1">
-                <a:latin typeface="Arial" pitchFamily="34" charset="0"/>
-                <a:cs typeface="Arial" pitchFamily="34" charset="0"/>
-              </a:rPr>
-              <a:t>ipsum</a:t>
-            </a:r>
-            <a:r>
-              <a:rPr lang="en-US" sz="2700" dirty="0">
-                <a:latin typeface="Arial" pitchFamily="34" charset="0"/>
-                <a:cs typeface="Arial" pitchFamily="34" charset="0"/>
-              </a:rPr>
-              <a:t> dolor sit </a:t>
-            </a:r>
-            <a:r>
-              <a:rPr lang="en-US" sz="2700" dirty="0" err="1">
-                <a:latin typeface="Arial" pitchFamily="34" charset="0"/>
-                <a:cs typeface="Arial" pitchFamily="34" charset="0"/>
-              </a:rPr>
-              <a:t>amet</a:t>
-            </a:r>
-            <a:r>
-              <a:rPr lang="en-US" sz="2700" dirty="0">
-                <a:latin typeface="Arial" pitchFamily="34" charset="0"/>
-                <a:cs typeface="Arial" pitchFamily="34" charset="0"/>
-              </a:rPr>
-              <a:t>, </a:t>
-            </a:r>
-            <a:r>
-              <a:rPr lang="en-US" sz="2700" dirty="0" err="1">
-                <a:latin typeface="Arial" pitchFamily="34" charset="0"/>
-                <a:cs typeface="Arial" pitchFamily="34" charset="0"/>
-              </a:rPr>
-              <a:t>consectetuer</a:t>
-            </a:r>
-            <a:r>
-              <a:rPr lang="en-US" sz="2700" dirty="0">
-                <a:latin typeface="Arial" pitchFamily="34" charset="0"/>
-                <a:cs typeface="Arial" pitchFamily="34" charset="0"/>
-              </a:rPr>
-              <a:t> </a:t>
-            </a:r>
-            <a:r>
-              <a:rPr lang="en-US" sz="2700" dirty="0" err="1">
-                <a:latin typeface="Arial" pitchFamily="34" charset="0"/>
-                <a:cs typeface="Arial" pitchFamily="34" charset="0"/>
-              </a:rPr>
-              <a:t>adipiscing</a:t>
-            </a:r>
-            <a:r>
-              <a:rPr lang="en-US" sz="2700" dirty="0">
-                <a:latin typeface="Arial" pitchFamily="34" charset="0"/>
-                <a:cs typeface="Arial" pitchFamily="34" charset="0"/>
-              </a:rPr>
-              <a:t> </a:t>
-            </a:r>
-            <a:r>
-              <a:rPr lang="en-US" sz="2700" dirty="0" err="1">
-                <a:latin typeface="Arial" pitchFamily="34" charset="0"/>
-                <a:cs typeface="Arial" pitchFamily="34" charset="0"/>
-              </a:rPr>
-              <a:t>elit</a:t>
-            </a:r>
-            <a:r>
-              <a:rPr lang="en-US" sz="2700" dirty="0">
-                <a:latin typeface="Arial" pitchFamily="34" charset="0"/>
-                <a:cs typeface="Arial" pitchFamily="34" charset="0"/>
-              </a:rPr>
-              <a:t>. Integer in sem. </a:t>
-            </a:r>
-            <a:r>
-              <a:rPr lang="en-US" sz="2700" dirty="0" err="1">
-                <a:latin typeface="Arial" pitchFamily="34" charset="0"/>
-                <a:cs typeface="Arial" pitchFamily="34" charset="0"/>
-              </a:rPr>
-              <a:t>Proin</a:t>
-            </a:r>
-            <a:r>
-              <a:rPr lang="en-US" sz="2700" dirty="0">
-                <a:latin typeface="Arial" pitchFamily="34" charset="0"/>
-                <a:cs typeface="Arial" pitchFamily="34" charset="0"/>
-              </a:rPr>
-              <a:t> </a:t>
-            </a:r>
-            <a:r>
-              <a:rPr lang="en-US" sz="2700" dirty="0" err="1">
-                <a:latin typeface="Arial" pitchFamily="34" charset="0"/>
-                <a:cs typeface="Arial" pitchFamily="34" charset="0"/>
-              </a:rPr>
-              <a:t>nec</a:t>
-            </a:r>
-            <a:r>
-              <a:rPr lang="en-US" sz="2700" dirty="0">
-                <a:latin typeface="Arial" pitchFamily="34" charset="0"/>
-                <a:cs typeface="Arial" pitchFamily="34" charset="0"/>
-              </a:rPr>
-              <a:t> </a:t>
-            </a:r>
-            <a:r>
-              <a:rPr lang="en-US" sz="2700" dirty="0" err="1">
-                <a:latin typeface="Arial" pitchFamily="34" charset="0"/>
-                <a:cs typeface="Arial" pitchFamily="34" charset="0"/>
-              </a:rPr>
-              <a:t>lorem</a:t>
-            </a:r>
-            <a:r>
-              <a:rPr lang="en-US" sz="2700" dirty="0">
-                <a:latin typeface="Arial" pitchFamily="34" charset="0"/>
-                <a:cs typeface="Arial" pitchFamily="34" charset="0"/>
-              </a:rPr>
-              <a:t>. </a:t>
-            </a:r>
-            <a:r>
-              <a:rPr lang="en-US" sz="2700" dirty="0" err="1">
-                <a:latin typeface="Arial" pitchFamily="34" charset="0"/>
-                <a:cs typeface="Arial" pitchFamily="34" charset="0"/>
-              </a:rPr>
-              <a:t>Fusce</a:t>
-            </a:r>
-            <a:r>
-              <a:rPr lang="en-US" sz="2700" dirty="0">
-                <a:latin typeface="Arial" pitchFamily="34" charset="0"/>
-                <a:cs typeface="Arial" pitchFamily="34" charset="0"/>
-              </a:rPr>
-              <a:t> </a:t>
-            </a:r>
-            <a:r>
-              <a:rPr lang="en-US" sz="2700" dirty="0" err="1">
-                <a:latin typeface="Arial" pitchFamily="34" charset="0"/>
-                <a:cs typeface="Arial" pitchFamily="34" charset="0"/>
-              </a:rPr>
-              <a:t>tincidunt</a:t>
-            </a:r>
-            <a:r>
-              <a:rPr lang="en-US" sz="2700" dirty="0">
-                <a:latin typeface="Arial" pitchFamily="34" charset="0"/>
-                <a:cs typeface="Arial" pitchFamily="34" charset="0"/>
-              </a:rPr>
-              <a:t> </a:t>
-            </a:r>
-            <a:r>
-              <a:rPr lang="en-US" sz="2700" dirty="0" err="1">
-                <a:latin typeface="Arial" pitchFamily="34" charset="0"/>
-                <a:cs typeface="Arial" pitchFamily="34" charset="0"/>
-              </a:rPr>
-              <a:t>feugiat</a:t>
-            </a:r>
-            <a:r>
-              <a:rPr lang="en-US" sz="2700" dirty="0">
-                <a:latin typeface="Arial" pitchFamily="34" charset="0"/>
-                <a:cs typeface="Arial" pitchFamily="34" charset="0"/>
-              </a:rPr>
-              <a:t> </a:t>
-            </a:r>
-            <a:r>
-              <a:rPr lang="en-US" sz="2700" dirty="0" err="1">
-                <a:latin typeface="Arial" pitchFamily="34" charset="0"/>
-                <a:cs typeface="Arial" pitchFamily="34" charset="0"/>
-              </a:rPr>
-              <a:t>sapien</a:t>
-            </a:r>
-            <a:r>
-              <a:rPr lang="en-US" sz="2700" dirty="0">
-                <a:latin typeface="Arial" pitchFamily="34" charset="0"/>
-                <a:cs typeface="Arial" pitchFamily="34" charset="0"/>
-              </a:rPr>
-              <a:t>. </a:t>
-            </a:r>
-            <a:r>
-              <a:rPr lang="en-US" sz="2700" dirty="0" err="1">
-                <a:latin typeface="Arial" pitchFamily="34" charset="0"/>
-                <a:cs typeface="Arial" pitchFamily="34" charset="0"/>
-              </a:rPr>
-              <a:t>Donec</a:t>
-            </a:r>
-            <a:r>
-              <a:rPr lang="en-US" sz="2700" dirty="0">
-                <a:latin typeface="Arial" pitchFamily="34" charset="0"/>
-                <a:cs typeface="Arial" pitchFamily="34" charset="0"/>
-              </a:rPr>
-              <a:t> </a:t>
-            </a:r>
-            <a:r>
-              <a:rPr lang="en-US" sz="2700" dirty="0" err="1">
-                <a:latin typeface="Arial" pitchFamily="34" charset="0"/>
-                <a:cs typeface="Arial" pitchFamily="34" charset="0"/>
-              </a:rPr>
-              <a:t>suscipit</a:t>
-            </a:r>
-            <a:r>
-              <a:rPr lang="en-US" sz="2700" dirty="0">
-                <a:latin typeface="Arial" pitchFamily="34" charset="0"/>
-                <a:cs typeface="Arial" pitchFamily="34" charset="0"/>
-              </a:rPr>
-              <a:t> </a:t>
-            </a:r>
-            <a:r>
-              <a:rPr lang="en-US" sz="2700" dirty="0" err="1">
-                <a:latin typeface="Arial" pitchFamily="34" charset="0"/>
-                <a:cs typeface="Arial" pitchFamily="34" charset="0"/>
-              </a:rPr>
-              <a:t>tellus</a:t>
-            </a:r>
-            <a:r>
-              <a:rPr lang="en-US" sz="2700" dirty="0">
-                <a:latin typeface="Arial" pitchFamily="34" charset="0"/>
-                <a:cs typeface="Arial" pitchFamily="34" charset="0"/>
-              </a:rPr>
-              <a:t> </a:t>
-            </a:r>
-            <a:r>
-              <a:rPr lang="en-US" sz="2700" dirty="0" err="1">
-                <a:latin typeface="Arial" pitchFamily="34" charset="0"/>
-                <a:cs typeface="Arial" pitchFamily="34" charset="0"/>
-              </a:rPr>
-              <a:t>eu</a:t>
-            </a:r>
-            <a:r>
-              <a:rPr lang="en-US" sz="2700" dirty="0">
-                <a:latin typeface="Arial" pitchFamily="34" charset="0"/>
-                <a:cs typeface="Arial" pitchFamily="34" charset="0"/>
-              </a:rPr>
-              <a:t> </a:t>
-            </a:r>
-            <a:r>
-              <a:rPr lang="en-US" sz="2700" dirty="0" err="1">
-                <a:latin typeface="Arial" pitchFamily="34" charset="0"/>
-                <a:cs typeface="Arial" pitchFamily="34" charset="0"/>
-              </a:rPr>
-              <a:t>ipsum</a:t>
-            </a:r>
-            <a:r>
-              <a:rPr lang="en-US" sz="2700" dirty="0">
-                <a:latin typeface="Arial" pitchFamily="34" charset="0"/>
-                <a:cs typeface="Arial" pitchFamily="34" charset="0"/>
-              </a:rPr>
-              <a:t>. </a:t>
-            </a:r>
-            <a:r>
-              <a:rPr lang="en-US" sz="2700" dirty="0" err="1">
-                <a:latin typeface="Arial" pitchFamily="34" charset="0"/>
-                <a:cs typeface="Arial" pitchFamily="34" charset="0"/>
-              </a:rPr>
-              <a:t>Sed</a:t>
-            </a:r>
-            <a:r>
-              <a:rPr lang="en-US" sz="2700" dirty="0">
-                <a:latin typeface="Arial" pitchFamily="34" charset="0"/>
-                <a:cs typeface="Arial" pitchFamily="34" charset="0"/>
-              </a:rPr>
-              <a:t> </a:t>
-            </a:r>
-            <a:r>
-              <a:rPr lang="en-US" sz="2700" dirty="0" err="1">
-                <a:latin typeface="Arial" pitchFamily="34" charset="0"/>
-                <a:cs typeface="Arial" pitchFamily="34" charset="0"/>
-              </a:rPr>
-              <a:t>ultrices</a:t>
-            </a:r>
-            <a:r>
-              <a:rPr lang="en-US" sz="2700" dirty="0">
-                <a:latin typeface="Arial" pitchFamily="34" charset="0"/>
-                <a:cs typeface="Arial" pitchFamily="34" charset="0"/>
-              </a:rPr>
-              <a:t>, </a:t>
-            </a:r>
-            <a:r>
-              <a:rPr lang="en-US" sz="2700" dirty="0" err="1">
-                <a:latin typeface="Arial" pitchFamily="34" charset="0"/>
-                <a:cs typeface="Arial" pitchFamily="34" charset="0"/>
-              </a:rPr>
-              <a:t>risus</a:t>
-            </a:r>
-            <a:r>
-              <a:rPr lang="en-US" sz="2700" dirty="0">
-                <a:latin typeface="Arial" pitchFamily="34" charset="0"/>
-                <a:cs typeface="Arial" pitchFamily="34" charset="0"/>
-              </a:rPr>
-              <a:t> at </a:t>
-            </a:r>
-            <a:r>
-              <a:rPr lang="en-US" sz="2700" dirty="0" err="1">
-                <a:latin typeface="Arial" pitchFamily="34" charset="0"/>
-                <a:cs typeface="Arial" pitchFamily="34" charset="0"/>
-              </a:rPr>
-              <a:t>faucibus</a:t>
-            </a:r>
-            <a:r>
-              <a:rPr lang="en-US" sz="2700" dirty="0">
-                <a:latin typeface="Arial" pitchFamily="34" charset="0"/>
-                <a:cs typeface="Arial" pitchFamily="34" charset="0"/>
-              </a:rPr>
-              <a:t> </a:t>
-            </a:r>
-            <a:r>
-              <a:rPr lang="en-US" sz="2700" dirty="0" err="1">
-                <a:latin typeface="Arial" pitchFamily="34" charset="0"/>
-                <a:cs typeface="Arial" pitchFamily="34" charset="0"/>
-              </a:rPr>
-              <a:t>mattis</a:t>
-            </a:r>
-            <a:r>
-              <a:rPr lang="en-US" sz="2700" dirty="0">
-                <a:latin typeface="Arial" pitchFamily="34" charset="0"/>
-                <a:cs typeface="Arial" pitchFamily="34" charset="0"/>
-              </a:rPr>
-              <a:t>, </a:t>
-            </a:r>
-            <a:r>
-              <a:rPr lang="en-US" sz="2700" dirty="0" err="1">
-                <a:latin typeface="Arial" pitchFamily="34" charset="0"/>
-                <a:cs typeface="Arial" pitchFamily="34" charset="0"/>
-              </a:rPr>
-              <a:t>ligula</a:t>
-            </a:r>
-            <a:r>
-              <a:rPr lang="en-US" sz="2700" dirty="0">
-                <a:latin typeface="Arial" pitchFamily="34" charset="0"/>
-                <a:cs typeface="Arial" pitchFamily="34" charset="0"/>
-              </a:rPr>
-              <a:t> </a:t>
-            </a:r>
-            <a:r>
-              <a:rPr lang="en-US" sz="2700" dirty="0" err="1">
-                <a:latin typeface="Arial" pitchFamily="34" charset="0"/>
-                <a:cs typeface="Arial" pitchFamily="34" charset="0"/>
-              </a:rPr>
-              <a:t>odio</a:t>
-            </a:r>
-            <a:r>
-              <a:rPr lang="en-US" sz="2700" dirty="0">
-                <a:latin typeface="Arial" pitchFamily="34" charset="0"/>
-                <a:cs typeface="Arial" pitchFamily="34" charset="0"/>
-              </a:rPr>
-              <a:t> </a:t>
-            </a:r>
-            <a:r>
-              <a:rPr lang="en-US" sz="2700" dirty="0" err="1">
-                <a:latin typeface="Arial" pitchFamily="34" charset="0"/>
-                <a:cs typeface="Arial" pitchFamily="34" charset="0"/>
-              </a:rPr>
-              <a:t>porttitor</a:t>
-            </a:r>
-            <a:r>
-              <a:rPr lang="en-US" sz="2700" dirty="0">
-                <a:latin typeface="Arial" pitchFamily="34" charset="0"/>
-                <a:cs typeface="Arial" pitchFamily="34" charset="0"/>
-              </a:rPr>
-              <a:t> </a:t>
-            </a:r>
-            <a:r>
-              <a:rPr lang="en-US" sz="2700" dirty="0" err="1">
-                <a:latin typeface="Arial" pitchFamily="34" charset="0"/>
-                <a:cs typeface="Arial" pitchFamily="34" charset="0"/>
-              </a:rPr>
-              <a:t>nulla</a:t>
-            </a:r>
-            <a:r>
-              <a:rPr lang="en-US" sz="2700" dirty="0">
-                <a:latin typeface="Arial" pitchFamily="34" charset="0"/>
-                <a:cs typeface="Arial" pitchFamily="34" charset="0"/>
-              </a:rPr>
-              <a:t>, a </a:t>
-            </a:r>
-            <a:r>
-              <a:rPr lang="en-US" sz="2700" dirty="0" err="1" smtClean="0">
-                <a:latin typeface="Arial" pitchFamily="34" charset="0"/>
-                <a:cs typeface="Arial" pitchFamily="34" charset="0"/>
-              </a:rPr>
-              <a:t>dignissim</a:t>
-            </a:r>
-            <a:endParaRPr lang="en-US" sz="2700" dirty="0">
-              <a:latin typeface="Arial" pitchFamily="34" charset="0"/>
-              <a:cs typeface="Arial" pitchFamily="34" charset="0"/>
-            </a:endParaRPr>
-          </a:p>
-        </p:txBody>
-      </p:sp>
-      <p:sp>
-        <p:nvSpPr>
-          <p:cNvPr id="34" name="Text Box 543"/>
-          <p:cNvSpPr txBox="1">
-            <a:spLocks noChangeArrowheads="1"/>
-          </p:cNvSpPr>
-          <p:nvPr/>
-        </p:nvSpPr>
-        <p:spPr bwMode="auto">
-          <a:xfrm>
-            <a:off x="2694942" y="20743842"/>
-            <a:ext cx="14886516" cy="392415"/>
-          </a:xfrm>
-          <a:prstGeom prst="rect">
-            <a:avLst/>
-          </a:prstGeom>
-          <a:noFill/>
-          <a:ln w="9525">
-            <a:noFill/>
-            <a:miter lim="800000"/>
-            <a:headEnd/>
-            <a:tailEnd/>
-          </a:ln>
-          <a:effectLst/>
-        </p:spPr>
-        <p:txBody>
           <a:bodyPr>
             <a:spAutoFit/>
           </a:bodyPr>
@@ -6572,8 +5788,8 @@
         </p:nvSpPr>
         <p:spPr bwMode="auto">
           <a:xfrm>
-            <a:off x="2821517" y="22546866"/>
-            <a:ext cx="6847416" cy="2556801"/>
+            <a:off x="2116138" y="30062489"/>
+            <a:ext cx="5135562" cy="3409068"/>
           </a:xfrm>
           <a:prstGeom prst="rect">
             <a:avLst/>
@@ -6645,8 +5861,8 @@
         </p:nvSpPr>
         <p:spPr bwMode="auto">
           <a:xfrm>
-            <a:off x="10795001" y="22546866"/>
-            <a:ext cx="6847416" cy="2556801"/>
+            <a:off x="8096251" y="30062489"/>
+            <a:ext cx="5135562" cy="3409068"/>
           </a:xfrm>
           <a:prstGeom prst="rect">
             <a:avLst/>
@@ -6710,162 +5926,30 @@
           </a:p>
         </p:txBody>
       </p:sp>
-      <p:sp>
-        <p:nvSpPr>
-          <p:cNvPr id="23" name="Rectangle 22"/>
-          <p:cNvSpPr/>
+      <p:pic>
+        <p:nvPicPr>
+          <p:cNvPr id="4" name="Picture 3"/>
+          <p:cNvPicPr>
+            <a:picLocks noChangeAspect="1"/>
+          </p:cNvPicPr>
           <p:nvPr/>
-        </p:nvSpPr>
-        <p:spPr bwMode="auto">
+        </p:nvPicPr>
+        <p:blipFill>
+          <a:blip r:embed="rId2"/>
+          <a:stretch>
+            <a:fillRect/>
+          </a:stretch>
+        </p:blipFill>
+        <p:spPr>
           <a:xfrm>
-            <a:off x="2919795" y="11568330"/>
-            <a:ext cx="15003873" cy="8847666"/>
+            <a:off x="14127727" y="7758145"/>
+            <a:ext cx="11775014" cy="8989527"/>
           </a:xfrm>
           <a:prstGeom prst="rect">
             <a:avLst/>
           </a:prstGeom>
-          <a:ln>
-            <a:headEnd type="none" w="med" len="med"/>
-            <a:tailEnd type="none" w="med" len="med"/>
-          </a:ln>
         </p:spPr>
-        <p:style>
-          <a:lnRef idx="1">
-            <a:schemeClr val="dk1"/>
-          </a:lnRef>
-          <a:fillRef idx="2">
-            <a:schemeClr val="dk1"/>
-          </a:fillRef>
-          <a:effectRef idx="1">
-            <a:schemeClr val="dk1"/>
-          </a:effectRef>
-          <a:fontRef idx="minor">
-            <a:schemeClr val="dk1"/>
-          </a:fontRef>
-        </p:style>
-        <p:txBody>
-          <a:bodyPr vert="horz" wrap="square" lIns="91440" tIns="45720" rIns="91440" bIns="45720" numCol="1" rtlCol="0" anchor="t" anchorCtr="0" compatLnSpc="1">
-            <a:prstTxWarp prst="textNoShape">
-              <a:avLst/>
-            </a:prstTxWarp>
-          </a:bodyPr>
-          <a:lstStyle/>
-          <a:p>
-            <a:pPr marL="0" marR="0" indent="0" algn="l" defTabSz="1096963" rtl="0" eaLnBrk="0" fontAlgn="base" latinLnBrk="0" hangingPunct="0">
-              <a:lnSpc>
-                <a:spcPct val="100000"/>
-              </a:lnSpc>
-              <a:spcBef>
-                <a:spcPct val="0"/>
-              </a:spcBef>
-              <a:spcAft>
-                <a:spcPct val="0"/>
-              </a:spcAft>
-              <a:buClrTx/>
-              <a:buSzTx/>
-              <a:buFontTx/>
-              <a:buNone/>
-              <a:tabLst/>
-            </a:pPr>
-            <a:r>
-              <a:rPr kumimoji="0" lang="en-US" sz="2900" b="0" i="0" u="none" strike="noStrike" cap="none" normalizeH="0" baseline="0" dirty="0" smtClean="0">
-                <a:ln>
-                  <a:noFill/>
-                </a:ln>
-                <a:solidFill>
-                  <a:schemeClr val="tx1"/>
-                </a:solidFill>
-                <a:effectLst/>
-                <a:latin typeface="Myriad Pro" pitchFamily="34" charset="0"/>
-              </a:rPr>
-              <a:t>Image placeholder</a:t>
-            </a:r>
-          </a:p>
-        </p:txBody>
-      </p:sp>
-      <p:sp>
-        <p:nvSpPr>
-          <p:cNvPr id="24" name="Rectangle 23"/>
-          <p:cNvSpPr/>
-          <p:nvPr/>
-        </p:nvSpPr>
-        <p:spPr bwMode="auto">
-          <a:xfrm>
-            <a:off x="18868438" y="6290733"/>
-            <a:ext cx="14815724" cy="4288367"/>
-          </a:xfrm>
-          <a:prstGeom prst="rect">
-            <a:avLst/>
-          </a:prstGeom>
-          <a:ln>
-            <a:headEnd type="none" w="med" len="med"/>
-            <a:tailEnd type="none" w="med" len="med"/>
-          </a:ln>
-        </p:spPr>
-        <p:style>
-          <a:lnRef idx="1">
-            <a:schemeClr val="dk1"/>
-          </a:lnRef>
-          <a:fillRef idx="2">
-            <a:schemeClr val="dk1"/>
-          </a:fillRef>
-          <a:effectRef idx="1">
-            <a:schemeClr val="dk1"/>
-          </a:effectRef>
-          <a:fontRef idx="minor">
-            <a:schemeClr val="dk1"/>
-          </a:fontRef>
-        </p:style>
-        <p:txBody>
-          <a:bodyPr vert="horz" wrap="square" lIns="91440" tIns="45720" rIns="91440" bIns="45720" numCol="1" rtlCol="0" anchor="t" anchorCtr="0" compatLnSpc="1">
-            <a:prstTxWarp prst="textNoShape">
-              <a:avLst/>
-            </a:prstTxWarp>
-          </a:bodyPr>
-          <a:lstStyle/>
-          <a:p>
-            <a:pPr marL="0" marR="0" indent="0" algn="l" defTabSz="1096963" rtl="0" eaLnBrk="0" fontAlgn="base" latinLnBrk="0" hangingPunct="0">
-              <a:lnSpc>
-                <a:spcPct val="100000"/>
-              </a:lnSpc>
-              <a:spcBef>
-                <a:spcPct val="0"/>
-              </a:spcBef>
-              <a:spcAft>
-                <a:spcPct val="0"/>
-              </a:spcAft>
-              <a:buClrTx/>
-              <a:buSzTx/>
-              <a:buFontTx/>
-              <a:buNone/>
-              <a:tabLst/>
-            </a:pPr>
-            <a:r>
-              <a:rPr kumimoji="0" lang="en-US" sz="2900" b="0" i="0" u="none" strike="noStrike" cap="none" normalizeH="0" baseline="0" dirty="0" smtClean="0">
-                <a:ln>
-                  <a:noFill/>
-                </a:ln>
-                <a:solidFill>
-                  <a:schemeClr val="tx1"/>
-                </a:solidFill>
-                <a:effectLst/>
-                <a:latin typeface="Myriad Pro" pitchFamily="34" charset="0"/>
-              </a:rPr>
-              <a:t>Motivation graph</a:t>
-            </a:r>
-            <a:endParaRPr kumimoji="0" lang="en-US" sz="2900" b="0" i="0" u="none" strike="noStrike" cap="none" normalizeH="0" baseline="0" dirty="0" smtClean="0">
-              <a:ln>
-                <a:noFill/>
-              </a:ln>
-              <a:solidFill>
-                <a:schemeClr val="tx1"/>
-              </a:solidFill>
-              <a:effectLst/>
-              <a:latin typeface="Myriad Pro" pitchFamily="34" charset="0"/>
-            </a:endParaRPr>
-          </a:p>
-        </p:txBody>
-      </p:sp>
+      </p:pic>
     </p:spTree>
   </p:cSld>
   <p:clrMapOvr>

</xml_diff>

<commit_message>
correct email, minor formatting
</commit_message>
<xml_diff>
--- a/poster/Poster.pptx
+++ b/poster/Poster.pptx
@@ -3440,8 +3440,8 @@
         </p:nvSpPr>
         <p:spPr bwMode="auto">
           <a:xfrm>
-            <a:off x="891932" y="783560"/>
-            <a:ext cx="26141763" cy="3209925"/>
+            <a:off x="1522553" y="783560"/>
+            <a:ext cx="25594136" cy="3209925"/>
           </a:xfrm>
           <a:prstGeom prst="rect">
             <a:avLst/>
@@ -3466,7 +3466,7 @@
             </a:r>
             <a:r>
               <a:rPr lang="en-US" sz="9600" b="1" dirty="0" smtClean="0"/>
-              <a:t>Tradeoffs </a:t>
+              <a:t>Trade-offs </a:t>
             </a:r>
             <a:r>
               <a:rPr lang="en-US" sz="9600" b="1" dirty="0"/>
@@ -3522,7 +3522,17 @@
                 <a:latin typeface="Arial" pitchFamily="34" charset="0"/>
                 <a:cs typeface="Arial" pitchFamily="34" charset="0"/>
               </a:rPr>
-              <a:t>Joao </a:t>
+              <a:t>Joao Carreira (joao@berkeley.edu)            </a:t>
+            </a:r>
+            <a:r>
+              <a:rPr lang="en-US" sz="4000" b="1" dirty="0" err="1" smtClean="0">
+                <a:solidFill>
+                  <a:srgbClr val="003564"/>
+                </a:solidFill>
+                <a:latin typeface="Arial" pitchFamily="34" charset="0"/>
+                <a:cs typeface="Arial" pitchFamily="34" charset="0"/>
+              </a:rPr>
+              <a:t>Jianneng</a:t>
             </a:r>
             <a:r>
               <a:rPr lang="en-US" sz="4000" b="1" dirty="0" smtClean="0">
@@ -3532,17 +3542,7 @@
                 <a:latin typeface="Arial" pitchFamily="34" charset="0"/>
                 <a:cs typeface="Arial" pitchFamily="34" charset="0"/>
               </a:rPr>
-              <a:t>Carreira (</a:t>
-            </a:r>
-            <a:r>
-              <a:rPr lang="en-US" sz="4000" b="1" dirty="0" err="1" smtClean="0">
-                <a:solidFill>
-                  <a:srgbClr val="003564"/>
-                </a:solidFill>
-                <a:latin typeface="Arial" pitchFamily="34" charset="0"/>
-                <a:cs typeface="Arial" pitchFamily="34" charset="0"/>
-              </a:rPr>
-              <a:t>joao@berkeley.edu</a:t>
+              <a:t> Li (</a:t>
             </a:r>
             <a:r>
               <a:rPr lang="en-US" sz="4000" b="1" dirty="0" smtClean="0">
@@ -3552,37 +3552,7 @@
                 <a:latin typeface="Arial" pitchFamily="34" charset="0"/>
                 <a:cs typeface="Arial" pitchFamily="34" charset="0"/>
               </a:rPr>
-              <a:t>)            </a:t>
-            </a:r>
-            <a:r>
-              <a:rPr lang="en-US" sz="4000" b="1" dirty="0" err="1" smtClean="0">
-                <a:solidFill>
-                  <a:srgbClr val="003564"/>
-                </a:solidFill>
-                <a:latin typeface="Arial" pitchFamily="34" charset="0"/>
-                <a:cs typeface="Arial" pitchFamily="34" charset="0"/>
-              </a:rPr>
-              <a:t>Jianneng</a:t>
-            </a:r>
-            <a:r>
-              <a:rPr lang="en-US" sz="4000" b="1" dirty="0" smtClean="0">
-                <a:solidFill>
-                  <a:srgbClr val="003564"/>
-                </a:solidFill>
-                <a:latin typeface="Arial" pitchFamily="34" charset="0"/>
-                <a:cs typeface="Arial" pitchFamily="34" charset="0"/>
-              </a:rPr>
-              <a:t> Li (</a:t>
-            </a:r>
-            <a:r>
-              <a:rPr lang="en-US" sz="4000" b="1" dirty="0" err="1" smtClean="0">
-                <a:solidFill>
-                  <a:srgbClr val="003564"/>
-                </a:solidFill>
-                <a:latin typeface="Arial" pitchFamily="34" charset="0"/>
-                <a:cs typeface="Arial" pitchFamily="34" charset="0"/>
-              </a:rPr>
-              <a:t>jianneng@berkeley.edu</a:t>
+              <a:t>jiannengli@berkeley.edu</a:t>
             </a:r>
             <a:r>
               <a:rPr lang="en-US" sz="4000" b="1" dirty="0" smtClean="0">
@@ -4566,10 +4536,6 @@
               </a:rPr>
               <a:t>a) </a:t>
             </a:r>
-            <a:endParaRPr lang="en-US" sz="2700" dirty="0" smtClean="0">
-              <a:latin typeface="Arial" pitchFamily="34" charset="0"/>
-              <a:cs typeface="Arial" pitchFamily="34" charset="0"/>
-            </a:endParaRPr>
           </a:p>
         </p:txBody>
       </p:sp>
@@ -4991,15 +4957,14 @@
         </p:nvPicPr>
         <p:blipFill>
           <a:blip r:embed="rId4" cstate="print"/>
-          <a:srcRect/>
           <a:stretch>
             <a:fillRect/>
           </a:stretch>
         </p:blipFill>
         <p:spPr bwMode="auto">
           <a:xfrm>
-            <a:off x="30863667" y="2490993"/>
-            <a:ext cx="2235612" cy="1772929"/>
+            <a:off x="30863667" y="2490992"/>
+            <a:ext cx="2791335" cy="2791335"/>
           </a:xfrm>
           <a:prstGeom prst="rect">
             <a:avLst/>
@@ -5259,7 +5224,7 @@
   <p:timing>
     <p:tnLst>
       <p:par>
-        <p:cTn xmlns:p14="http://schemas.microsoft.com/office/powerpoint/2010/main" id="1" dur="indefinite" restart="never" nodeType="tmRoot"/>
+        <p:cTn id="1" dur="indefinite" restart="never" nodeType="tmRoot"/>
       </p:par>
     </p:tnLst>
   </p:timing>

</xml_diff>

<commit_message>
new title layout and motivation
</commit_message>
<xml_diff>
--- a/poster/Poster.pptx
+++ b/poster/Poster.pptx
@@ -3430,18 +3430,240 @@
           <a:chExt cx="0" cy="0"/>
         </a:xfrm>
       </p:grpSpPr>
-      <p:sp>
-        <p:nvSpPr>
-          <p:cNvPr id="5137" name="Rectangle 17"/>
-          <p:cNvSpPr>
-            <a:spLocks noChangeArrowheads="1"/>
-          </p:cNvSpPr>
+      <p:pic>
+        <p:nvPicPr>
+          <p:cNvPr id="1026" name="Picture 2" descr="http://www.eecs.berkeley.edu/Research/Projects/Images/107112-1.gif"/>
+          <p:cNvPicPr>
+            <a:picLocks noChangeAspect="1" noChangeArrowheads="1"/>
+          </p:cNvPicPr>
           <p:nvPr/>
-        </p:nvSpPr>
+        </p:nvPicPr>
+        <p:blipFill>
+          <a:blip r:embed="rId2" cstate="print">
+            <a:extLst>
+              <a:ext uri="{28A0092B-C50C-407E-A947-70E740481C1C}">
+                <a14:useLocalDpi xmlns:a14="http://schemas.microsoft.com/office/drawing/2010/main" val="0"/>
+              </a:ext>
+            </a:extLst>
+          </a:blip>
+          <a:srcRect/>
+          <a:stretch>
+            <a:fillRect/>
+          </a:stretch>
+        </p:blipFill>
         <p:spPr bwMode="auto">
           <a:xfrm>
-            <a:off x="1522553" y="783562"/>
-            <a:ext cx="25594136" cy="3209925"/>
+            <a:off x="30697714" y="25025830"/>
+            <a:ext cx="5515812" cy="2097085"/>
+          </a:xfrm>
+          <a:prstGeom prst="rect">
+            <a:avLst/>
+          </a:prstGeom>
+          <a:noFill/>
+          <a:extLst>
+            <a:ext uri="{909E8E84-426E-40DD-AFC4-6F175D3DCCD1}">
+              <a14:hiddenFill xmlns:a14="http://schemas.microsoft.com/office/drawing/2010/main">
+                <a:solidFill>
+                  <a:srgbClr val="FFFFFF"/>
+                </a:solidFill>
+              </a14:hiddenFill>
+            </a:ext>
+          </a:extLst>
+        </p:spPr>
+      </p:pic>
+      <p:grpSp>
+        <p:nvGrpSpPr>
+          <p:cNvPr id="2" name="Group 1"/>
+          <p:cNvGrpSpPr/>
+          <p:nvPr/>
+        </p:nvGrpSpPr>
+        <p:grpSpPr>
+          <a:xfrm>
+            <a:off x="5446407" y="224513"/>
+            <a:ext cx="25594136" cy="4090160"/>
+            <a:chOff x="5321231" y="440545"/>
+            <a:chExt cx="25594136" cy="4090160"/>
+          </a:xfrm>
+        </p:grpSpPr>
+        <p:sp>
+          <p:nvSpPr>
+            <p:cNvPr id="5137" name="Rectangle 17"/>
+            <p:cNvSpPr>
+              <a:spLocks noChangeArrowheads="1"/>
+            </p:cNvSpPr>
+            <p:nvPr/>
+          </p:nvSpPr>
+          <p:spPr bwMode="auto">
+            <a:xfrm>
+              <a:off x="5321231" y="440545"/>
+              <a:ext cx="25594136" cy="3209925"/>
+            </a:xfrm>
+            <a:prstGeom prst="rect">
+              <a:avLst/>
+            </a:prstGeom>
+            <a:noFill/>
+            <a:ln w="9525">
+              <a:noFill/>
+              <a:miter lim="800000"/>
+              <a:headEnd/>
+              <a:tailEnd/>
+            </a:ln>
+            <a:effectLst/>
+          </p:spPr>
+          <p:txBody>
+            <a:bodyPr lIns="386915" tIns="193458" rIns="386915" bIns="193458" anchor="ctr"/>
+            <a:lstStyle/>
+            <a:p>
+              <a:pPr algn="ctr" defTabSz="3225800"/>
+              <a:r>
+                <a:rPr lang="en-US" sz="9000" dirty="0">
+                  <a:latin typeface="+mj-lt"/>
+                  <a:ea typeface="Verdana" panose="020B0604030504040204" pitchFamily="34" charset="0"/>
+                  <a:cs typeface="Helvetica" panose="020B0604020202020204" pitchFamily="34" charset="0"/>
+                </a:rPr>
+                <a:t>Optimizing Latency and </a:t>
+              </a:r>
+              <a:r>
+                <a:rPr lang="en-US" sz="9000" dirty="0" smtClean="0">
+                  <a:latin typeface="+mj-lt"/>
+                  <a:ea typeface="Verdana" panose="020B0604030504040204" pitchFamily="34" charset="0"/>
+                  <a:cs typeface="Helvetica" panose="020B0604020202020204" pitchFamily="34" charset="0"/>
+                </a:rPr>
+                <a:t>Throughput</a:t>
+              </a:r>
+            </a:p>
+            <a:p>
+              <a:pPr algn="ctr" defTabSz="3225800"/>
+              <a:r>
+                <a:rPr lang="en-US" sz="9000" dirty="0" smtClean="0">
+                  <a:latin typeface="+mj-lt"/>
+                  <a:ea typeface="Verdana" panose="020B0604030504040204" pitchFamily="34" charset="0"/>
+                  <a:cs typeface="Helvetica" panose="020B0604020202020204" pitchFamily="34" charset="0"/>
+                </a:rPr>
+                <a:t>Trade-offs in a Stream Processing System</a:t>
+              </a:r>
+              <a:endParaRPr lang="en-US" sz="9000" dirty="0">
+                <a:solidFill>
+                  <a:srgbClr val="003564"/>
+                </a:solidFill>
+                <a:latin typeface="+mj-lt"/>
+                <a:ea typeface="Verdana" panose="020B0604030504040204" pitchFamily="34" charset="0"/>
+                <a:cs typeface="Helvetica" panose="020B0604020202020204" pitchFamily="34" charset="0"/>
+              </a:endParaRPr>
+            </a:p>
+          </p:txBody>
+        </p:sp>
+        <p:sp>
+          <p:nvSpPr>
+            <p:cNvPr id="5134" name="Text Box 14"/>
+            <p:cNvSpPr txBox="1">
+              <a:spLocks noChangeArrowheads="1"/>
+            </p:cNvSpPr>
+            <p:nvPr/>
+          </p:nvSpPr>
+          <p:spPr bwMode="auto">
+            <a:xfrm>
+              <a:off x="6302564" y="3655071"/>
+              <a:ext cx="23600227" cy="875634"/>
+            </a:xfrm>
+            <a:prstGeom prst="rect">
+              <a:avLst/>
+            </a:prstGeom>
+            <a:noFill/>
+            <a:ln w="9525">
+              <a:noFill/>
+              <a:miter lim="800000"/>
+              <a:headEnd/>
+              <a:tailEnd/>
+            </a:ln>
+            <a:effectLst/>
+          </p:spPr>
+          <p:txBody>
+            <a:bodyPr wrap="square" lIns="109720" tIns="54861" rIns="109720" bIns="54861">
+              <a:spAutoFit/>
+            </a:bodyPr>
+            <a:lstStyle/>
+            <a:p>
+              <a:pPr algn="ctr" defTabSz="1096963"/>
+              <a:r>
+                <a:rPr lang="en-US" sz="5000" b="1" dirty="0" smtClean="0">
+                  <a:solidFill>
+                    <a:srgbClr val="7D7D7D"/>
+                  </a:solidFill>
+                  <a:latin typeface="+mj-lt"/>
+                  <a:ea typeface="Verdana" panose="020B0604030504040204" pitchFamily="34" charset="0"/>
+                  <a:cs typeface="Helvetica" panose="020B0604020202020204" pitchFamily="34" charset="0"/>
+                </a:rPr>
+                <a:t>Joao </a:t>
+              </a:r>
+              <a:r>
+                <a:rPr lang="en-US" sz="5000" b="1" dirty="0" err="1" smtClean="0">
+                  <a:solidFill>
+                    <a:srgbClr val="7D7D7D"/>
+                  </a:solidFill>
+                  <a:latin typeface="+mj-lt"/>
+                  <a:ea typeface="Verdana" panose="020B0604030504040204" pitchFamily="34" charset="0"/>
+                  <a:cs typeface="Helvetica" panose="020B0604020202020204" pitchFamily="34" charset="0"/>
+                </a:rPr>
+                <a:t>Carreira</a:t>
+              </a:r>
+              <a:r>
+                <a:rPr lang="en-US" sz="5000" b="1" dirty="0" smtClean="0">
+                  <a:solidFill>
+                    <a:srgbClr val="7D7D7D"/>
+                  </a:solidFill>
+                  <a:latin typeface="+mj-lt"/>
+                  <a:ea typeface="Verdana" panose="020B0604030504040204" pitchFamily="34" charset="0"/>
+                  <a:cs typeface="Helvetica" panose="020B0604020202020204" pitchFamily="34" charset="0"/>
+                </a:rPr>
+                <a:t> (joao@berkeley.edu) 	</a:t>
+              </a:r>
+              <a:r>
+                <a:rPr lang="en-US" sz="5000" b="1" dirty="0" err="1" smtClean="0">
+                  <a:solidFill>
+                    <a:srgbClr val="7D7D7D"/>
+                  </a:solidFill>
+                  <a:latin typeface="+mj-lt"/>
+                  <a:ea typeface="Verdana" panose="020B0604030504040204" pitchFamily="34" charset="0"/>
+                  <a:cs typeface="Helvetica" panose="020B0604020202020204" pitchFamily="34" charset="0"/>
+                </a:rPr>
+                <a:t>Jianneng</a:t>
+              </a:r>
+              <a:r>
+                <a:rPr lang="en-US" sz="5000" b="1" dirty="0" smtClean="0">
+                  <a:solidFill>
+                    <a:srgbClr val="7D7D7D"/>
+                  </a:solidFill>
+                  <a:latin typeface="+mj-lt"/>
+                  <a:ea typeface="Verdana" panose="020B0604030504040204" pitchFamily="34" charset="0"/>
+                  <a:cs typeface="Helvetica" panose="020B0604020202020204" pitchFamily="34" charset="0"/>
+                </a:rPr>
+                <a:t> Li (jiannengli@berkeley.edu)</a:t>
+              </a:r>
+              <a:endParaRPr lang="en-US" sz="5000" b="1" dirty="0">
+                <a:solidFill>
+                  <a:srgbClr val="7D7D7D"/>
+                </a:solidFill>
+                <a:latin typeface="+mj-lt"/>
+                <a:ea typeface="Verdana" panose="020B0604030504040204" pitchFamily="34" charset="0"/>
+                <a:cs typeface="Helvetica" panose="020B0604020202020204" pitchFamily="34" charset="0"/>
+              </a:endParaRPr>
+            </a:p>
+          </p:txBody>
+        </p:sp>
+      </p:grpSp>
+      <p:sp>
+        <p:nvSpPr>
+          <p:cNvPr id="5632" name="Text Box 512"/>
+          <p:cNvSpPr txBox="1">
+            <a:spLocks noChangeArrowheads="1"/>
+          </p:cNvSpPr>
+          <p:nvPr/>
+        </p:nvSpPr>
+        <p:spPr bwMode="auto">
+          <a:xfrm>
+            <a:off x="20510502" y="12080250"/>
+            <a:ext cx="14820900" cy="4801314"/>
           </a:xfrm>
           <a:prstGeom prst="rect">
             <a:avLst/>
@@ -3456,35 +3678,88 @@
           <a:effectLst/>
         </p:spPr>
         <p:txBody>
-          <a:bodyPr lIns="386915" tIns="193458" rIns="386915" bIns="193458" anchor="ctr"/>
+          <a:bodyPr wrap="square">
+            <a:spAutoFit/>
+          </a:bodyPr>
           <a:lstStyle/>
           <a:p>
-            <a:pPr algn="ctr" defTabSz="3225800"/>
-            <a:r>
-              <a:rPr lang="en-US" sz="9600" b="1" dirty="0"/>
-              <a:t>Optimizing Latency and Throughput </a:t>
-            </a:r>
-            <a:r>
-              <a:rPr lang="en-US" sz="9600" b="1" dirty="0" smtClean="0"/>
-              <a:t>Trade-offs </a:t>
-            </a:r>
-            <a:r>
-              <a:rPr lang="en-US" sz="9600" b="1" dirty="0"/>
-              <a:t>in a Stream Processing System</a:t>
-            </a:r>
-            <a:endParaRPr lang="en-US" sz="17400" b="1" dirty="0">
-              <a:solidFill>
-                <a:srgbClr val="003564"/>
-              </a:solidFill>
-              <a:latin typeface="Arial" pitchFamily="34" charset="0"/>
-              <a:cs typeface="Arial" pitchFamily="34" charset="0"/>
-            </a:endParaRPr>
-          </a:p>
-        </p:txBody>
-      </p:sp>
-      <p:sp>
-        <p:nvSpPr>
-          <p:cNvPr id="5134" name="Text Box 14"/>
+            <a:pPr>
+              <a:spcBef>
+                <a:spcPct val="50000"/>
+              </a:spcBef>
+            </a:pPr>
+            <a:r>
+              <a:rPr lang="en-US" sz="6600" dirty="0">
+                <a:solidFill>
+                  <a:srgbClr val="003564"/>
+                </a:solidFill>
+                <a:ea typeface="Verdana" panose="020B0604030504040204" pitchFamily="34" charset="0"/>
+                <a:cs typeface="Helvetica" panose="020B0604020202020204" pitchFamily="34" charset="0"/>
+              </a:rPr>
+              <a:t>Contribution</a:t>
+            </a:r>
+          </a:p>
+          <a:p>
+            <a:pPr>
+              <a:spcBef>
+                <a:spcPct val="50000"/>
+              </a:spcBef>
+            </a:pPr>
+            <a:r>
+              <a:rPr lang="en-US" sz="3000" dirty="0">
+                <a:ea typeface="Verdana" panose="020B0604030504040204" pitchFamily="34" charset="0"/>
+                <a:cs typeface="Helvetica" panose="020B0604020202020204" pitchFamily="34" charset="0"/>
+              </a:rPr>
+              <a:t>1) We provide an evaluation of the performance of Spark Streaming across two major metrics: latency and throughput</a:t>
+            </a:r>
+          </a:p>
+          <a:p>
+            <a:pPr>
+              <a:spcBef>
+                <a:spcPct val="50000"/>
+              </a:spcBef>
+            </a:pPr>
+            <a:r>
+              <a:rPr lang="en-US" sz="3000" dirty="0">
+                <a:ea typeface="Verdana" panose="020B0604030504040204" pitchFamily="34" charset="0"/>
+                <a:cs typeface="Helvetica" panose="020B0604020202020204" pitchFamily="34" charset="0"/>
+              </a:rPr>
+              <a:t>2) We show that Spark Streaming currently cannot provide high throughput and low latency for realistic workloads</a:t>
+            </a:r>
+          </a:p>
+          <a:p>
+            <a:pPr>
+              <a:spcBef>
+                <a:spcPct val="50000"/>
+              </a:spcBef>
+            </a:pPr>
+            <a:r>
+              <a:rPr lang="en-US" sz="3000" dirty="0">
+                <a:ea typeface="Verdana" panose="020B0604030504040204" pitchFamily="34" charset="0"/>
+                <a:cs typeface="Helvetica" panose="020B0604020202020204" pitchFamily="34" charset="0"/>
+              </a:rPr>
+              <a:t>3) Techniques/lesson to improve end-to-end latency:</a:t>
+            </a:r>
+          </a:p>
+          <a:p>
+            <a:pPr>
+              <a:spcBef>
+                <a:spcPct val="50000"/>
+              </a:spcBef>
+            </a:pPr>
+            <a:r>
+              <a:rPr lang="en-US" sz="3000" dirty="0">
+                <a:ea typeface="Verdana" panose="020B0604030504040204" pitchFamily="34" charset="0"/>
+                <a:cs typeface="Helvetica" panose="020B0604020202020204" pitchFamily="34" charset="0"/>
+              </a:rPr>
+              <a:t>a) </a:t>
+            </a:r>
+          </a:p>
+        </p:txBody>
+      </p:sp>
+      <p:sp>
+        <p:nvSpPr>
+          <p:cNvPr id="5652" name="Text Box 532"/>
           <p:cNvSpPr txBox="1">
             <a:spLocks noChangeArrowheads="1"/>
           </p:cNvSpPr>
@@ -3492,8 +3767,8 @@
         </p:nvSpPr>
         <p:spPr bwMode="auto">
           <a:xfrm>
-            <a:off x="1167064" y="4069728"/>
-            <a:ext cx="27262667" cy="726347"/>
+            <a:off x="1375735" y="4890107"/>
+            <a:ext cx="8293201" cy="5547673"/>
           </a:xfrm>
           <a:prstGeom prst="rect">
             <a:avLst/>
@@ -3508,55 +3783,105 @@
           <a:effectLst/>
         </p:spPr>
         <p:txBody>
-          <a:bodyPr wrap="square" lIns="109720" tIns="54861" rIns="109720" bIns="54861">
+          <a:bodyPr wrap="square" lIns="0" tIns="0" rIns="0" bIns="0">
             <a:spAutoFit/>
           </a:bodyPr>
           <a:lstStyle/>
           <a:p>
-            <a:pPr algn="ctr" defTabSz="1096963"/>
-            <a:r>
-              <a:rPr lang="en-US" sz="4000" b="1" dirty="0" smtClean="0">
+            <a:pPr>
+              <a:spcBef>
+                <a:spcPct val="50000"/>
+              </a:spcBef>
+            </a:pPr>
+            <a:r>
+              <a:rPr lang="en-US" sz="5000" dirty="0" smtClean="0">
                 <a:solidFill>
                   <a:srgbClr val="003564"/>
                 </a:solidFill>
-                <a:latin typeface="Arial" pitchFamily="34" charset="0"/>
-                <a:cs typeface="Arial" pitchFamily="34" charset="0"/>
+                <a:latin typeface="+mj-lt"/>
+                <a:ea typeface="Verdana" panose="020B0604030504040204" pitchFamily="34" charset="0"/>
+                <a:cs typeface="Helvetica" panose="020B0604020202020204" pitchFamily="34" charset="0"/>
               </a:rPr>
-              <a:t>Joao Carreira (joao@berkeley.edu)            </a:t>
-            </a:r>
-            <a:r>
-              <a:rPr lang="en-US" sz="4000" b="1" dirty="0" err="1" smtClean="0">
-                <a:solidFill>
-                  <a:srgbClr val="003564"/>
-                </a:solidFill>
-                <a:latin typeface="Arial" pitchFamily="34" charset="0"/>
-                <a:cs typeface="Arial" pitchFamily="34" charset="0"/>
-              </a:rPr>
-              <a:t>Jianneng</a:t>
-            </a:r>
-            <a:r>
-              <a:rPr lang="en-US" sz="4000" b="1" dirty="0" smtClean="0">
-                <a:solidFill>
-                  <a:srgbClr val="003564"/>
-                </a:solidFill>
-                <a:latin typeface="Arial" pitchFamily="34" charset="0"/>
-                <a:cs typeface="Arial" pitchFamily="34" charset="0"/>
-              </a:rPr>
-              <a:t> Li (jiannengli@berkeley.edu)</a:t>
-            </a:r>
-            <a:endParaRPr lang="en-US" sz="4000" b="1" dirty="0">
+              <a:t>Motivation</a:t>
+            </a:r>
+            <a:endParaRPr lang="en-US" sz="5000" dirty="0">
               <a:solidFill>
                 <a:srgbClr val="003564"/>
               </a:solidFill>
-              <a:latin typeface="Arial" pitchFamily="34" charset="0"/>
-              <a:cs typeface="Arial" pitchFamily="34" charset="0"/>
+              <a:latin typeface="+mj-lt"/>
+              <a:ea typeface="Verdana" panose="020B0604030504040204" pitchFamily="34" charset="0"/>
+              <a:cs typeface="Helvetica" panose="020B0604020202020204" pitchFamily="34" charset="0"/>
             </a:endParaRPr>
           </a:p>
-        </p:txBody>
-      </p:sp>
-      <p:sp>
-        <p:nvSpPr>
-          <p:cNvPr id="5632" name="Text Box 512"/>
+          <a:p>
+            <a:pPr marL="457200" indent="-457200">
+              <a:spcBef>
+                <a:spcPct val="50000"/>
+              </a:spcBef>
+              <a:buFont typeface="Wingdings" panose="05000000000000000000" pitchFamily="2" charset="2"/>
+              <a:buChar char="Ø"/>
+            </a:pPr>
+            <a:r>
+              <a:rPr lang="en-US" sz="2700" dirty="0" smtClean="0">
+                <a:latin typeface="+mj-lt"/>
+                <a:ea typeface="Verdana" panose="020B0604030504040204" pitchFamily="34" charset="0"/>
+                <a:cs typeface="Helvetica" panose="020B0604020202020204" pitchFamily="34" charset="0"/>
+              </a:rPr>
+              <a:t>Streaming systems can process data in two ways: record-by-record or micro-batch, favoring latency and throughput respectively</a:t>
+            </a:r>
+          </a:p>
+          <a:p>
+            <a:pPr marL="457200" indent="-457200">
+              <a:spcBef>
+                <a:spcPct val="50000"/>
+              </a:spcBef>
+              <a:buFont typeface="Wingdings" panose="05000000000000000000" pitchFamily="2" charset="2"/>
+              <a:buChar char="Ø"/>
+            </a:pPr>
+            <a:r>
+              <a:rPr lang="en-US" sz="2700" dirty="0" smtClean="0">
+                <a:latin typeface="+mj-lt"/>
+                <a:ea typeface="Verdana" panose="020B0604030504040204" pitchFamily="34" charset="0"/>
+                <a:cs typeface="Helvetica" panose="020B0604020202020204" pitchFamily="34" charset="0"/>
+              </a:rPr>
+              <a:t>Spark Streaming is a micro-batch stream processor built on top of Spark, and offers high throughput and targets 0.5 to 2 seconds of latency</a:t>
+            </a:r>
+          </a:p>
+          <a:p>
+            <a:pPr marL="457200" indent="-457200">
+              <a:spcBef>
+                <a:spcPct val="50000"/>
+              </a:spcBef>
+              <a:buFont typeface="Wingdings" panose="05000000000000000000" pitchFamily="2" charset="2"/>
+              <a:buChar char="Ø"/>
+            </a:pPr>
+            <a:r>
+              <a:rPr lang="en-US" sz="2700" dirty="0" smtClean="0">
+                <a:latin typeface="+mj-lt"/>
+                <a:ea typeface="Verdana" panose="020B0604030504040204" pitchFamily="34" charset="0"/>
+                <a:cs typeface="Helvetica" panose="020B0604020202020204" pitchFamily="34" charset="0"/>
+              </a:rPr>
+              <a:t>Because Spark Streaming also has other desirable properties such as fault tolerance, we want to explore what it takes for the system to provide low latency while maintaining </a:t>
+            </a:r>
+            <a:r>
+              <a:rPr lang="en-US" sz="2700" smtClean="0">
+                <a:latin typeface="+mj-lt"/>
+                <a:ea typeface="Verdana" panose="020B0604030504040204" pitchFamily="34" charset="0"/>
+                <a:cs typeface="Helvetica" panose="020B0604020202020204" pitchFamily="34" charset="0"/>
+              </a:rPr>
+              <a:t>reasonable throughput</a:t>
+            </a:r>
+            <a:endParaRPr lang="en-US" sz="2700" dirty="0" smtClean="0">
+              <a:latin typeface="+mj-lt"/>
+              <a:ea typeface="Verdana" panose="020B0604030504040204" pitchFamily="34" charset="0"/>
+              <a:cs typeface="Helvetica" panose="020B0604020202020204" pitchFamily="34" charset="0"/>
+            </a:endParaRPr>
+          </a:p>
+        </p:txBody>
+      </p:sp>
+      <p:sp>
+        <p:nvSpPr>
+          <p:cNvPr id="29" name="Text Box 532"/>
           <p:cNvSpPr txBox="1">
             <a:spLocks noChangeArrowheads="1"/>
           </p:cNvSpPr>
@@ -3564,8 +3889,8 @@
         </p:nvSpPr>
         <p:spPr bwMode="auto">
           <a:xfrm>
-            <a:off x="18834102" y="12907567"/>
-            <a:ext cx="14820900" cy="2855739"/>
+            <a:off x="10797121" y="4890104"/>
+            <a:ext cx="7828201" cy="1392689"/>
           </a:xfrm>
           <a:prstGeom prst="rect">
             <a:avLst/>
@@ -3580,7 +3905,7 @@
           <a:effectLst/>
         </p:spPr>
         <p:txBody>
-          <a:bodyPr wrap="square">
+          <a:bodyPr wrap="square" lIns="0" tIns="0" rIns="0" bIns="0">
             <a:spAutoFit/>
           </a:bodyPr>
           <a:lstStyle/>
@@ -3591,658 +3916,50 @@
               </a:spcBef>
             </a:pPr>
             <a:r>
-              <a:rPr lang="en-US" sz="3600" b="1" dirty="0" smtClean="0">
+              <a:rPr lang="en-US" sz="5000" dirty="0" smtClean="0">
                 <a:solidFill>
                   <a:srgbClr val="003564"/>
                 </a:solidFill>
-                <a:latin typeface="Arial" pitchFamily="34" charset="0"/>
-                <a:cs typeface="Arial" pitchFamily="34" charset="0"/>
+                <a:latin typeface="+mj-lt"/>
+                <a:ea typeface="Verdana" panose="020B0604030504040204" pitchFamily="34" charset="0"/>
+                <a:cs typeface="Helvetica" panose="020B0604020202020204" pitchFamily="34" charset="0"/>
               </a:rPr>
-              <a:t>Contributions</a:t>
-            </a:r>
-            <a:endParaRPr lang="en-US" sz="3600" dirty="0">
+              <a:t>Techniques</a:t>
+            </a:r>
+            <a:endParaRPr lang="en-US" sz="5000" dirty="0">
               <a:solidFill>
                 <a:srgbClr val="003564"/>
               </a:solidFill>
-              <a:latin typeface="Arial" pitchFamily="34" charset="0"/>
-              <a:cs typeface="Arial" pitchFamily="34" charset="0"/>
+              <a:latin typeface="+mj-lt"/>
+              <a:ea typeface="Verdana" panose="020B0604030504040204" pitchFamily="34" charset="0"/>
+              <a:cs typeface="Helvetica" panose="020B0604020202020204" pitchFamily="34" charset="0"/>
             </a:endParaRPr>
           </a:p>
           <a:p>
             <a:pPr>
-              <a:lnSpc>
-                <a:spcPts val="4100"/>
-              </a:lnSpc>
               <a:spcBef>
-                <a:spcPct val="30000"/>
+                <a:spcPct val="50000"/>
               </a:spcBef>
             </a:pPr>
             <a:r>
-              <a:rPr lang="en-US" sz="2700" dirty="0" err="1" smtClean="0">
-                <a:latin typeface="Arial" pitchFamily="34" charset="0"/>
-                <a:cs typeface="Arial" pitchFamily="34" charset="0"/>
+              <a:rPr lang="en-US" sz="2700" dirty="0" smtClean="0">
+                <a:latin typeface="+mj-lt"/>
+                <a:ea typeface="Verdana" panose="020B0604030504040204" pitchFamily="34" charset="0"/>
+                <a:cs typeface="Helvetica" panose="020B0604020202020204" pitchFamily="34" charset="0"/>
               </a:rPr>
-              <a:t>Lorem</a:t>
-            </a:r>
-            <a:r>
-              <a:rPr lang="en-US" sz="2700" dirty="0" smtClean="0">
-                <a:latin typeface="Arial" pitchFamily="34" charset="0"/>
-                <a:cs typeface="Arial" pitchFamily="34" charset="0"/>
-              </a:rPr>
-              <a:t> </a:t>
-            </a:r>
-            <a:r>
-              <a:rPr lang="en-US" sz="2700" dirty="0" err="1" smtClean="0">
-                <a:latin typeface="Arial" pitchFamily="34" charset="0"/>
-                <a:cs typeface="Arial" pitchFamily="34" charset="0"/>
-              </a:rPr>
-              <a:t>ipsum</a:t>
-            </a:r>
-            <a:r>
-              <a:rPr lang="en-US" sz="2700" dirty="0" smtClean="0">
-                <a:latin typeface="Arial" pitchFamily="34" charset="0"/>
-                <a:cs typeface="Arial" pitchFamily="34" charset="0"/>
-              </a:rPr>
-              <a:t> dolor sit </a:t>
-            </a:r>
-            <a:r>
-              <a:rPr lang="en-US" sz="2700" dirty="0" err="1" smtClean="0">
-                <a:latin typeface="Arial" pitchFamily="34" charset="0"/>
-                <a:cs typeface="Arial" pitchFamily="34" charset="0"/>
-              </a:rPr>
-              <a:t>amet</a:t>
-            </a:r>
-            <a:r>
-              <a:rPr lang="en-US" sz="2700" dirty="0" smtClean="0">
-                <a:latin typeface="Arial" pitchFamily="34" charset="0"/>
-                <a:cs typeface="Arial" pitchFamily="34" charset="0"/>
-              </a:rPr>
-              <a:t>, </a:t>
-            </a:r>
-            <a:r>
-              <a:rPr lang="en-US" sz="2700" dirty="0" err="1" smtClean="0">
-                <a:latin typeface="Arial" pitchFamily="34" charset="0"/>
-                <a:cs typeface="Arial" pitchFamily="34" charset="0"/>
-              </a:rPr>
-              <a:t>consectetur</a:t>
-            </a:r>
-            <a:r>
-              <a:rPr lang="en-US" sz="2700" dirty="0" smtClean="0">
-                <a:latin typeface="Arial" pitchFamily="34" charset="0"/>
-                <a:cs typeface="Arial" pitchFamily="34" charset="0"/>
-              </a:rPr>
-              <a:t> </a:t>
-            </a:r>
-            <a:r>
-              <a:rPr lang="en-US" sz="2700" dirty="0" err="1" smtClean="0">
-                <a:latin typeface="Arial" pitchFamily="34" charset="0"/>
-                <a:cs typeface="Arial" pitchFamily="34" charset="0"/>
-              </a:rPr>
-              <a:t>adipiscing</a:t>
-            </a:r>
-            <a:r>
-              <a:rPr lang="en-US" sz="2700" dirty="0" smtClean="0">
-                <a:latin typeface="Arial" pitchFamily="34" charset="0"/>
-                <a:cs typeface="Arial" pitchFamily="34" charset="0"/>
-              </a:rPr>
-              <a:t> </a:t>
-            </a:r>
-            <a:r>
-              <a:rPr lang="en-US" sz="2700" dirty="0" err="1" smtClean="0">
-                <a:latin typeface="Arial" pitchFamily="34" charset="0"/>
-                <a:cs typeface="Arial" pitchFamily="34" charset="0"/>
-              </a:rPr>
-              <a:t>elit</a:t>
-            </a:r>
-            <a:r>
-              <a:rPr lang="en-US" sz="2700" dirty="0" smtClean="0">
-                <a:latin typeface="Arial" pitchFamily="34" charset="0"/>
-                <a:cs typeface="Arial" pitchFamily="34" charset="0"/>
-              </a:rPr>
-              <a:t>. </a:t>
-            </a:r>
-            <a:r>
-              <a:rPr lang="en-US" sz="2700" dirty="0" err="1" smtClean="0">
-                <a:latin typeface="Arial" pitchFamily="34" charset="0"/>
-                <a:cs typeface="Arial" pitchFamily="34" charset="0"/>
-              </a:rPr>
-              <a:t>Duis</a:t>
-            </a:r>
-            <a:r>
-              <a:rPr lang="en-US" sz="2700" dirty="0" smtClean="0">
-                <a:latin typeface="Arial" pitchFamily="34" charset="0"/>
-                <a:cs typeface="Arial" pitchFamily="34" charset="0"/>
-              </a:rPr>
-              <a:t> id </a:t>
-            </a:r>
-            <a:r>
-              <a:rPr lang="en-US" sz="2700" dirty="0" err="1" smtClean="0">
-                <a:latin typeface="Arial" pitchFamily="34" charset="0"/>
-                <a:cs typeface="Arial" pitchFamily="34" charset="0"/>
-              </a:rPr>
-              <a:t>sem</a:t>
-            </a:r>
-            <a:r>
-              <a:rPr lang="en-US" sz="2700" dirty="0" smtClean="0">
-                <a:latin typeface="Arial" pitchFamily="34" charset="0"/>
-                <a:cs typeface="Arial" pitchFamily="34" charset="0"/>
-              </a:rPr>
-              <a:t> </a:t>
-            </a:r>
-            <a:r>
-              <a:rPr lang="en-US" sz="2700" dirty="0" err="1" smtClean="0">
-                <a:latin typeface="Arial" pitchFamily="34" charset="0"/>
-                <a:cs typeface="Arial" pitchFamily="34" charset="0"/>
-              </a:rPr>
-              <a:t>vel</a:t>
-            </a:r>
-            <a:r>
-              <a:rPr lang="en-US" sz="2700" dirty="0" smtClean="0">
-                <a:latin typeface="Arial" pitchFamily="34" charset="0"/>
-                <a:cs typeface="Arial" pitchFamily="34" charset="0"/>
-              </a:rPr>
-              <a:t> </a:t>
-            </a:r>
-            <a:r>
-              <a:rPr lang="en-US" sz="2700" dirty="0" err="1" smtClean="0">
-                <a:latin typeface="Arial" pitchFamily="34" charset="0"/>
-                <a:cs typeface="Arial" pitchFamily="34" charset="0"/>
-              </a:rPr>
-              <a:t>lorem</a:t>
-            </a:r>
-            <a:r>
-              <a:rPr lang="en-US" sz="2700" dirty="0" smtClean="0">
-                <a:latin typeface="Arial" pitchFamily="34" charset="0"/>
-                <a:cs typeface="Arial" pitchFamily="34" charset="0"/>
-              </a:rPr>
-              <a:t> </a:t>
-            </a:r>
-            <a:r>
-              <a:rPr lang="en-US" sz="2700" dirty="0" err="1" smtClean="0">
-                <a:latin typeface="Arial" pitchFamily="34" charset="0"/>
-                <a:cs typeface="Arial" pitchFamily="34" charset="0"/>
-              </a:rPr>
-              <a:t>pulvinar</a:t>
-            </a:r>
-            <a:r>
-              <a:rPr lang="en-US" sz="2700" dirty="0" smtClean="0">
-                <a:latin typeface="Arial" pitchFamily="34" charset="0"/>
-                <a:cs typeface="Arial" pitchFamily="34" charset="0"/>
-              </a:rPr>
-              <a:t> </a:t>
-            </a:r>
-            <a:r>
-              <a:rPr lang="en-US" sz="2700" dirty="0" err="1" smtClean="0">
-                <a:latin typeface="Arial" pitchFamily="34" charset="0"/>
-                <a:cs typeface="Arial" pitchFamily="34" charset="0"/>
-              </a:rPr>
-              <a:t>hendrerit</a:t>
-            </a:r>
-            <a:r>
-              <a:rPr lang="en-US" sz="2700" dirty="0" smtClean="0">
-                <a:latin typeface="Arial" pitchFamily="34" charset="0"/>
-                <a:cs typeface="Arial" pitchFamily="34" charset="0"/>
-              </a:rPr>
-              <a:t> ac at </a:t>
-            </a:r>
-            <a:r>
-              <a:rPr lang="en-US" sz="2700" dirty="0" err="1" smtClean="0">
-                <a:latin typeface="Arial" pitchFamily="34" charset="0"/>
-                <a:cs typeface="Arial" pitchFamily="34" charset="0"/>
-              </a:rPr>
-              <a:t>neque</a:t>
-            </a:r>
-            <a:r>
-              <a:rPr lang="en-US" sz="2700" dirty="0" smtClean="0">
-                <a:latin typeface="Arial" pitchFamily="34" charset="0"/>
-                <a:cs typeface="Arial" pitchFamily="34" charset="0"/>
-              </a:rPr>
-              <a:t>. </a:t>
-            </a:r>
-            <a:r>
-              <a:rPr lang="en-US" sz="2700" dirty="0" err="1" smtClean="0">
-                <a:latin typeface="Arial" pitchFamily="34" charset="0"/>
-                <a:cs typeface="Arial" pitchFamily="34" charset="0"/>
-              </a:rPr>
-              <a:t>Phasellus</a:t>
-            </a:r>
-            <a:r>
-              <a:rPr lang="en-US" sz="2700" dirty="0" smtClean="0">
-                <a:latin typeface="Arial" pitchFamily="34" charset="0"/>
-                <a:cs typeface="Arial" pitchFamily="34" charset="0"/>
-              </a:rPr>
-              <a:t> </a:t>
-            </a:r>
-            <a:r>
-              <a:rPr lang="en-US" sz="2700" dirty="0" err="1" smtClean="0">
-                <a:latin typeface="Arial" pitchFamily="34" charset="0"/>
-                <a:cs typeface="Arial" pitchFamily="34" charset="0"/>
-              </a:rPr>
-              <a:t>ornare</a:t>
-            </a:r>
-            <a:r>
-              <a:rPr lang="en-US" sz="2700" dirty="0" smtClean="0">
-                <a:latin typeface="Arial" pitchFamily="34" charset="0"/>
-                <a:cs typeface="Arial" pitchFamily="34" charset="0"/>
-              </a:rPr>
-              <a:t> </a:t>
-            </a:r>
-            <a:r>
-              <a:rPr lang="en-US" sz="2700" dirty="0" err="1" smtClean="0">
-                <a:latin typeface="Arial" pitchFamily="34" charset="0"/>
-                <a:cs typeface="Arial" pitchFamily="34" charset="0"/>
-              </a:rPr>
-              <a:t>erat</a:t>
-            </a:r>
-            <a:r>
-              <a:rPr lang="en-US" sz="2700" dirty="0" smtClean="0">
-                <a:latin typeface="Arial" pitchFamily="34" charset="0"/>
-                <a:cs typeface="Arial" pitchFamily="34" charset="0"/>
-              </a:rPr>
-              <a:t> sit </a:t>
-            </a:r>
-            <a:r>
-              <a:rPr lang="en-US" sz="2700" dirty="0" err="1" smtClean="0">
-                <a:latin typeface="Arial" pitchFamily="34" charset="0"/>
-                <a:cs typeface="Arial" pitchFamily="34" charset="0"/>
-              </a:rPr>
-              <a:t>amet</a:t>
-            </a:r>
-            <a:r>
-              <a:rPr lang="en-US" sz="2700" dirty="0" smtClean="0">
-                <a:latin typeface="Arial" pitchFamily="34" charset="0"/>
-                <a:cs typeface="Arial" pitchFamily="34" charset="0"/>
-              </a:rPr>
-              <a:t> </a:t>
-            </a:r>
-            <a:r>
-              <a:rPr lang="en-US" sz="2700" dirty="0" err="1" smtClean="0">
-                <a:latin typeface="Arial" pitchFamily="34" charset="0"/>
-                <a:cs typeface="Arial" pitchFamily="34" charset="0"/>
-              </a:rPr>
-              <a:t>libero</a:t>
-            </a:r>
-            <a:r>
-              <a:rPr lang="en-US" sz="2700" dirty="0" smtClean="0">
-                <a:latin typeface="Arial" pitchFamily="34" charset="0"/>
-                <a:cs typeface="Arial" pitchFamily="34" charset="0"/>
-              </a:rPr>
-              <a:t> </a:t>
-            </a:r>
-            <a:r>
-              <a:rPr lang="en-US" sz="2700" dirty="0" err="1" smtClean="0">
-                <a:latin typeface="Arial" pitchFamily="34" charset="0"/>
-                <a:cs typeface="Arial" pitchFamily="34" charset="0"/>
-              </a:rPr>
-              <a:t>ullamcorper</a:t>
-            </a:r>
-            <a:r>
-              <a:rPr lang="en-US" sz="2700" dirty="0" smtClean="0">
-                <a:latin typeface="Arial" pitchFamily="34" charset="0"/>
-                <a:cs typeface="Arial" pitchFamily="34" charset="0"/>
-              </a:rPr>
-              <a:t> </a:t>
-            </a:r>
-            <a:r>
-              <a:rPr lang="en-US" sz="2700" dirty="0" err="1" smtClean="0">
-                <a:latin typeface="Arial" pitchFamily="34" charset="0"/>
-                <a:cs typeface="Arial" pitchFamily="34" charset="0"/>
-              </a:rPr>
-              <a:t>condimentum</a:t>
-            </a:r>
-            <a:r>
-              <a:rPr lang="en-US" sz="2700" dirty="0" smtClean="0">
-                <a:latin typeface="Arial" pitchFamily="34" charset="0"/>
-                <a:cs typeface="Arial" pitchFamily="34" charset="0"/>
-              </a:rPr>
-              <a:t>. </a:t>
-            </a:r>
-            <a:r>
-              <a:rPr lang="en-US" sz="2700" dirty="0" err="1" smtClean="0">
-                <a:latin typeface="Arial" pitchFamily="34" charset="0"/>
-                <a:cs typeface="Arial" pitchFamily="34" charset="0"/>
-              </a:rPr>
-              <a:t>Pellentesque</a:t>
-            </a:r>
-            <a:r>
-              <a:rPr lang="en-US" sz="2700" dirty="0" smtClean="0">
-                <a:latin typeface="Arial" pitchFamily="34" charset="0"/>
-                <a:cs typeface="Arial" pitchFamily="34" charset="0"/>
-              </a:rPr>
-              <a:t> </a:t>
-            </a:r>
-            <a:r>
-              <a:rPr lang="en-US" sz="2700" dirty="0" err="1" smtClean="0">
-                <a:latin typeface="Arial" pitchFamily="34" charset="0"/>
-                <a:cs typeface="Arial" pitchFamily="34" charset="0"/>
-              </a:rPr>
-              <a:t>luctus</a:t>
-            </a:r>
-            <a:r>
-              <a:rPr lang="en-US" sz="2700" dirty="0" smtClean="0">
-                <a:latin typeface="Arial" pitchFamily="34" charset="0"/>
-                <a:cs typeface="Arial" pitchFamily="34" charset="0"/>
-              </a:rPr>
-              <a:t> </a:t>
-            </a:r>
-            <a:r>
-              <a:rPr lang="en-US" sz="2700" dirty="0" err="1" smtClean="0">
-                <a:latin typeface="Arial" pitchFamily="34" charset="0"/>
-                <a:cs typeface="Arial" pitchFamily="34" charset="0"/>
-              </a:rPr>
-              <a:t>ornare</a:t>
-            </a:r>
-            <a:r>
-              <a:rPr lang="en-US" sz="2700" dirty="0" smtClean="0">
-                <a:latin typeface="Arial" pitchFamily="34" charset="0"/>
-                <a:cs typeface="Arial" pitchFamily="34" charset="0"/>
-              </a:rPr>
-              <a:t> </a:t>
-            </a:r>
-            <a:r>
-              <a:rPr lang="en-US" sz="2700" dirty="0" err="1" smtClean="0">
-                <a:latin typeface="Arial" pitchFamily="34" charset="0"/>
-                <a:cs typeface="Arial" pitchFamily="34" charset="0"/>
-              </a:rPr>
-              <a:t>commodo</a:t>
-            </a:r>
-            <a:r>
-              <a:rPr lang="en-US" sz="2700" dirty="0" smtClean="0">
-                <a:latin typeface="Arial" pitchFamily="34" charset="0"/>
-                <a:cs typeface="Arial" pitchFamily="34" charset="0"/>
-              </a:rPr>
-              <a:t>. </a:t>
-            </a:r>
-            <a:r>
-              <a:rPr lang="en-US" sz="2700" dirty="0" err="1" smtClean="0">
-                <a:latin typeface="Arial" pitchFamily="34" charset="0"/>
-                <a:cs typeface="Arial" pitchFamily="34" charset="0"/>
-              </a:rPr>
-              <a:t>Sed</a:t>
-            </a:r>
-            <a:r>
-              <a:rPr lang="en-US" sz="2700" dirty="0" smtClean="0">
-                <a:latin typeface="Arial" pitchFamily="34" charset="0"/>
-                <a:cs typeface="Arial" pitchFamily="34" charset="0"/>
-              </a:rPr>
-              <a:t> </a:t>
-            </a:r>
-            <a:r>
-              <a:rPr lang="en-US" sz="2700" dirty="0" err="1" smtClean="0">
-                <a:latin typeface="Arial" pitchFamily="34" charset="0"/>
-                <a:cs typeface="Arial" pitchFamily="34" charset="0"/>
-              </a:rPr>
-              <a:t>convallis</a:t>
-            </a:r>
-            <a:r>
-              <a:rPr lang="en-US" sz="2700" dirty="0" smtClean="0">
-                <a:latin typeface="Arial" pitchFamily="34" charset="0"/>
-                <a:cs typeface="Arial" pitchFamily="34" charset="0"/>
-              </a:rPr>
-              <a:t> quam sit </a:t>
-            </a:r>
-            <a:r>
-              <a:rPr lang="en-US" sz="2700" dirty="0" err="1" smtClean="0">
-                <a:latin typeface="Arial" pitchFamily="34" charset="0"/>
-                <a:cs typeface="Arial" pitchFamily="34" charset="0"/>
-              </a:rPr>
-              <a:t>amet</a:t>
-            </a:r>
-            <a:r>
-              <a:rPr lang="en-US" sz="2700" dirty="0" smtClean="0">
-                <a:latin typeface="Arial" pitchFamily="34" charset="0"/>
-                <a:cs typeface="Arial" pitchFamily="34" charset="0"/>
-              </a:rPr>
-              <a:t> </a:t>
-            </a:r>
-            <a:r>
-              <a:rPr lang="en-US" sz="2700" dirty="0" err="1" smtClean="0">
-                <a:latin typeface="Arial" pitchFamily="34" charset="0"/>
-                <a:cs typeface="Arial" pitchFamily="34" charset="0"/>
-              </a:rPr>
-              <a:t>neque</a:t>
-            </a:r>
-            <a:r>
-              <a:rPr lang="en-US" sz="2700" dirty="0" smtClean="0">
-                <a:latin typeface="Arial" pitchFamily="34" charset="0"/>
-                <a:cs typeface="Arial" pitchFamily="34" charset="0"/>
-              </a:rPr>
-              <a:t> </a:t>
-            </a:r>
-            <a:r>
-              <a:rPr lang="en-US" sz="2700" dirty="0" err="1" smtClean="0">
-                <a:latin typeface="Arial" pitchFamily="34" charset="0"/>
-                <a:cs typeface="Arial" pitchFamily="34" charset="0"/>
-              </a:rPr>
-              <a:t>lacinia</a:t>
-            </a:r>
-            <a:r>
-              <a:rPr lang="en-US" sz="2700" dirty="0" smtClean="0">
-                <a:latin typeface="Arial" pitchFamily="34" charset="0"/>
-                <a:cs typeface="Arial" pitchFamily="34" charset="0"/>
-              </a:rPr>
-              <a:t> </a:t>
-            </a:r>
-            <a:r>
-              <a:rPr lang="en-US" sz="2700" dirty="0" err="1" smtClean="0">
-                <a:latin typeface="Arial" pitchFamily="34" charset="0"/>
-                <a:cs typeface="Arial" pitchFamily="34" charset="0"/>
-              </a:rPr>
-              <a:t>viverra</a:t>
-            </a:r>
-            <a:r>
-              <a:rPr lang="en-US" sz="2700" dirty="0" smtClean="0">
-                <a:latin typeface="Arial" pitchFamily="34" charset="0"/>
-                <a:cs typeface="Arial" pitchFamily="34" charset="0"/>
-              </a:rPr>
-              <a:t>. Maecenas </a:t>
-            </a:r>
-            <a:r>
-              <a:rPr lang="en-US" sz="2700" dirty="0" err="1" smtClean="0">
-                <a:latin typeface="Arial" pitchFamily="34" charset="0"/>
-                <a:cs typeface="Arial" pitchFamily="34" charset="0"/>
-              </a:rPr>
-              <a:t>vestibulum</a:t>
-            </a:r>
-            <a:r>
-              <a:rPr lang="en-US" sz="2700" dirty="0" smtClean="0">
-                <a:latin typeface="Arial" pitchFamily="34" charset="0"/>
-                <a:cs typeface="Arial" pitchFamily="34" charset="0"/>
-              </a:rPr>
-              <a:t>, </a:t>
-            </a:r>
-            <a:r>
-              <a:rPr lang="en-US" sz="2700" dirty="0" err="1" smtClean="0">
-                <a:latin typeface="Arial" pitchFamily="34" charset="0"/>
-                <a:cs typeface="Arial" pitchFamily="34" charset="0"/>
-              </a:rPr>
-              <a:t>purus</a:t>
-            </a:r>
-            <a:r>
-              <a:rPr lang="en-US" sz="2700" dirty="0" smtClean="0">
-                <a:latin typeface="Arial" pitchFamily="34" charset="0"/>
-                <a:cs typeface="Arial" pitchFamily="34" charset="0"/>
-              </a:rPr>
-              <a:t> sit </a:t>
-            </a:r>
-            <a:r>
-              <a:rPr lang="en-US" sz="2700" dirty="0" err="1" smtClean="0">
-                <a:latin typeface="Arial" pitchFamily="34" charset="0"/>
-                <a:cs typeface="Arial" pitchFamily="34" charset="0"/>
-              </a:rPr>
-              <a:t>amet</a:t>
-            </a:r>
-            <a:r>
-              <a:rPr lang="en-US" sz="2700" dirty="0" smtClean="0">
-                <a:latin typeface="Arial" pitchFamily="34" charset="0"/>
-                <a:cs typeface="Arial" pitchFamily="34" charset="0"/>
-              </a:rPr>
-              <a:t> </a:t>
-            </a:r>
-            <a:r>
-              <a:rPr lang="en-US" sz="2700" dirty="0" err="1" smtClean="0">
-                <a:latin typeface="Arial" pitchFamily="34" charset="0"/>
-                <a:cs typeface="Arial" pitchFamily="34" charset="0"/>
-              </a:rPr>
-              <a:t>mollis</a:t>
-            </a:r>
-            <a:r>
-              <a:rPr lang="en-US" sz="2700" dirty="0" smtClean="0">
-                <a:latin typeface="Arial" pitchFamily="34" charset="0"/>
-                <a:cs typeface="Arial" pitchFamily="34" charset="0"/>
-              </a:rPr>
-              <a:t> </a:t>
-            </a:r>
-            <a:r>
-              <a:rPr lang="en-US" sz="2700" dirty="0" err="1" smtClean="0">
-                <a:latin typeface="Arial" pitchFamily="34" charset="0"/>
-                <a:cs typeface="Arial" pitchFamily="34" charset="0"/>
-              </a:rPr>
-              <a:t>sagittis</a:t>
-            </a:r>
-            <a:r>
-              <a:rPr lang="en-US" sz="2700" dirty="0" smtClean="0">
-                <a:latin typeface="Arial" pitchFamily="34" charset="0"/>
-                <a:cs typeface="Arial" pitchFamily="34" charset="0"/>
-              </a:rPr>
-              <a:t>, </a:t>
-            </a:r>
-            <a:r>
-              <a:rPr lang="en-US" sz="2700" dirty="0" err="1" smtClean="0">
-                <a:latin typeface="Arial" pitchFamily="34" charset="0"/>
-                <a:cs typeface="Arial" pitchFamily="34" charset="0"/>
-              </a:rPr>
-              <a:t>orci</a:t>
-            </a:r>
-            <a:r>
-              <a:rPr lang="en-US" sz="2700" dirty="0" smtClean="0">
-                <a:latin typeface="Arial" pitchFamily="34" charset="0"/>
-                <a:cs typeface="Arial" pitchFamily="34" charset="0"/>
-              </a:rPr>
-              <a:t> </a:t>
-            </a:r>
-            <a:r>
-              <a:rPr lang="en-US" sz="2700" dirty="0" err="1" smtClean="0">
-                <a:latin typeface="Arial" pitchFamily="34" charset="0"/>
-                <a:cs typeface="Arial" pitchFamily="34" charset="0"/>
-              </a:rPr>
-              <a:t>libero</a:t>
-            </a:r>
-            <a:r>
-              <a:rPr lang="en-US" sz="2700" dirty="0" smtClean="0">
-                <a:latin typeface="Arial" pitchFamily="34" charset="0"/>
-                <a:cs typeface="Arial" pitchFamily="34" charset="0"/>
-              </a:rPr>
-              <a:t> </a:t>
-            </a:r>
-            <a:r>
-              <a:rPr lang="en-US" sz="2700" dirty="0" err="1" smtClean="0">
-                <a:latin typeface="Arial" pitchFamily="34" charset="0"/>
-                <a:cs typeface="Arial" pitchFamily="34" charset="0"/>
-              </a:rPr>
-              <a:t>feugiat</a:t>
-            </a:r>
-            <a:r>
-              <a:rPr lang="en-US" sz="2700" dirty="0" smtClean="0">
-                <a:latin typeface="Arial" pitchFamily="34" charset="0"/>
-                <a:cs typeface="Arial" pitchFamily="34" charset="0"/>
-              </a:rPr>
-              <a:t> </a:t>
-            </a:r>
-            <a:r>
-              <a:rPr lang="en-US" sz="2700" dirty="0" err="1" smtClean="0">
-                <a:latin typeface="Arial" pitchFamily="34" charset="0"/>
-                <a:cs typeface="Arial" pitchFamily="34" charset="0"/>
-              </a:rPr>
-              <a:t>eros</a:t>
-            </a:r>
-            <a:r>
-              <a:rPr lang="en-US" sz="2700" dirty="0" smtClean="0">
-                <a:latin typeface="Arial" pitchFamily="34" charset="0"/>
-                <a:cs typeface="Arial" pitchFamily="34" charset="0"/>
-              </a:rPr>
-              <a:t>, non </a:t>
-            </a:r>
-            <a:r>
-              <a:rPr lang="en-US" sz="2700" dirty="0" err="1" smtClean="0">
-                <a:latin typeface="Arial" pitchFamily="34" charset="0"/>
-                <a:cs typeface="Arial" pitchFamily="34" charset="0"/>
-              </a:rPr>
-              <a:t>vehicula</a:t>
-            </a:r>
-            <a:r>
-              <a:rPr lang="en-US" sz="2700" dirty="0" smtClean="0">
-                <a:latin typeface="Arial" pitchFamily="34" charset="0"/>
-                <a:cs typeface="Arial" pitchFamily="34" charset="0"/>
-              </a:rPr>
-              <a:t> </a:t>
-            </a:r>
-            <a:r>
-              <a:rPr lang="en-US" sz="2700" dirty="0" err="1" smtClean="0">
-                <a:latin typeface="Arial" pitchFamily="34" charset="0"/>
-                <a:cs typeface="Arial" pitchFamily="34" charset="0"/>
-              </a:rPr>
-              <a:t>lorem</a:t>
-            </a:r>
-            <a:r>
-              <a:rPr lang="en-US" sz="2700" dirty="0" smtClean="0">
-                <a:latin typeface="Arial" pitchFamily="34" charset="0"/>
-                <a:cs typeface="Arial" pitchFamily="34" charset="0"/>
-              </a:rPr>
-              <a:t> </a:t>
-            </a:r>
-            <a:r>
-              <a:rPr lang="en-US" sz="2700" dirty="0" err="1" smtClean="0">
-                <a:latin typeface="Arial" pitchFamily="34" charset="0"/>
-                <a:cs typeface="Arial" pitchFamily="34" charset="0"/>
-              </a:rPr>
-              <a:t>est</a:t>
-            </a:r>
-            <a:r>
-              <a:rPr lang="en-US" sz="2700" dirty="0" smtClean="0">
-                <a:latin typeface="Arial" pitchFamily="34" charset="0"/>
-                <a:cs typeface="Arial" pitchFamily="34" charset="0"/>
-              </a:rPr>
-              <a:t> </a:t>
-            </a:r>
-            <a:r>
-              <a:rPr lang="en-US" sz="2700" dirty="0" err="1" smtClean="0">
-                <a:latin typeface="Arial" pitchFamily="34" charset="0"/>
-                <a:cs typeface="Arial" pitchFamily="34" charset="0"/>
-              </a:rPr>
-              <a:t>sed</a:t>
-            </a:r>
-            <a:r>
-              <a:rPr lang="en-US" sz="2700" dirty="0" smtClean="0">
-                <a:latin typeface="Arial" pitchFamily="34" charset="0"/>
-                <a:cs typeface="Arial" pitchFamily="34" charset="0"/>
-              </a:rPr>
-              <a:t> </a:t>
-            </a:r>
-            <a:r>
-              <a:rPr lang="en-US" sz="2700" dirty="0" err="1" smtClean="0">
-                <a:latin typeface="Arial" pitchFamily="34" charset="0"/>
-                <a:cs typeface="Arial" pitchFamily="34" charset="0"/>
-              </a:rPr>
-              <a:t>elit</a:t>
-            </a:r>
-            <a:r>
-              <a:rPr lang="en-US" sz="2700" dirty="0" smtClean="0">
-                <a:latin typeface="Arial" pitchFamily="34" charset="0"/>
-                <a:cs typeface="Arial" pitchFamily="34" charset="0"/>
-              </a:rPr>
-              <a:t>. </a:t>
-            </a:r>
-            <a:endParaRPr lang="en-US" sz="2700" dirty="0">
-              <a:latin typeface="Arial" pitchFamily="34" charset="0"/>
-              <a:cs typeface="Arial" pitchFamily="34" charset="0"/>
+              <a:t>1)</a:t>
+            </a:r>
+            <a:endParaRPr lang="en-US" sz="2700" dirty="0" smtClean="0">
+              <a:latin typeface="+mj-lt"/>
+              <a:ea typeface="Verdana" panose="020B0604030504040204" pitchFamily="34" charset="0"/>
+              <a:cs typeface="Helvetica" panose="020B0604020202020204" pitchFamily="34" charset="0"/>
             </a:endParaRPr>
           </a:p>
         </p:txBody>
       </p:sp>
       <p:sp>
         <p:nvSpPr>
-          <p:cNvPr id="5652" name="Text Box 532"/>
+          <p:cNvPr id="32" name="Text Box 512"/>
           <p:cNvSpPr txBox="1">
             <a:spLocks noChangeArrowheads="1"/>
           </p:cNvSpPr>
@@ -4250,8 +3967,8 @@
         </p:nvSpPr>
         <p:spPr bwMode="auto">
           <a:xfrm>
-            <a:off x="1375735" y="5717424"/>
-            <a:ext cx="8293201" cy="3787789"/>
+            <a:off x="20516565" y="17423200"/>
+            <a:ext cx="14820900" cy="1186479"/>
           </a:xfrm>
           <a:prstGeom prst="rect">
             <a:avLst/>
@@ -4266,7 +3983,7 @@
           <a:effectLst/>
         </p:spPr>
         <p:txBody>
-          <a:bodyPr wrap="square" lIns="0" tIns="0" rIns="0" bIns="0">
+          <a:bodyPr wrap="square">
             <a:spAutoFit/>
           </a:bodyPr>
           <a:lstStyle/>
@@ -4277,89 +3994,50 @@
               </a:spcBef>
             </a:pPr>
             <a:r>
-              <a:rPr lang="en-US" sz="3600" b="1" dirty="0" smtClean="0">
+              <a:rPr lang="en-US" sz="3600" dirty="0" smtClean="0">
                 <a:solidFill>
                   <a:srgbClr val="003564"/>
                 </a:solidFill>
-                <a:latin typeface="Arial" pitchFamily="34" charset="0"/>
-                <a:cs typeface="Arial" pitchFamily="34" charset="0"/>
+                <a:latin typeface="+mj-lt"/>
+                <a:ea typeface="Verdana" panose="020B0604030504040204" pitchFamily="34" charset="0"/>
+                <a:cs typeface="Helvetica" panose="020B0604020202020204" pitchFamily="34" charset="0"/>
               </a:rPr>
-              <a:t>Problem</a:t>
-            </a:r>
-            <a:endParaRPr lang="en-US" dirty="0">
+              <a:t>Evaluation</a:t>
+            </a:r>
+            <a:endParaRPr lang="en-US" sz="3600" dirty="0">
               <a:solidFill>
                 <a:srgbClr val="003564"/>
               </a:solidFill>
-              <a:latin typeface="Arial" pitchFamily="34" charset="0"/>
-              <a:cs typeface="Arial" pitchFamily="34" charset="0"/>
+              <a:latin typeface="+mj-lt"/>
+              <a:ea typeface="Verdana" panose="020B0604030504040204" pitchFamily="34" charset="0"/>
+              <a:cs typeface="Helvetica" panose="020B0604020202020204" pitchFamily="34" charset="0"/>
             </a:endParaRPr>
           </a:p>
           <a:p>
-            <a:pPr marL="457200" indent="-457200">
-              <a:lnSpc>
-                <a:spcPts val="4100"/>
-              </a:lnSpc>
+            <a:pPr>
               <a:spcBef>
-                <a:spcPct val="50000"/>
+                <a:spcPct val="30000"/>
               </a:spcBef>
-              <a:buFont typeface="Arial"/>
-              <a:buChar char="•"/>
             </a:pPr>
             <a:r>
-              <a:rPr lang="en-US" sz="2700" dirty="0">
-                <a:latin typeface="Arial" pitchFamily="34" charset="0"/>
-                <a:cs typeface="Arial" pitchFamily="34" charset="0"/>
+              <a:rPr lang="en-US" sz="2700" dirty="0" smtClean="0">
+                <a:latin typeface="+mj-lt"/>
+                <a:ea typeface="Verdana" panose="020B0604030504040204" pitchFamily="34" charset="0"/>
+                <a:cs typeface="Helvetica" panose="020B0604020202020204" pitchFamily="34" charset="0"/>
               </a:rPr>
-              <a:t>S</a:t>
-            </a:r>
-            <a:r>
-              <a:rPr lang="en-US" sz="2700" dirty="0" smtClean="0">
-                <a:latin typeface="Arial" pitchFamily="34" charset="0"/>
-                <a:cs typeface="Arial" pitchFamily="34" charset="0"/>
-              </a:rPr>
-              <a:t>treaming systems (e.g., Spark) struggle between providing high throughput and low-latency</a:t>
-            </a:r>
-          </a:p>
-          <a:p>
-            <a:pPr marL="457200" indent="-457200">
-              <a:lnSpc>
-                <a:spcPts val="4100"/>
-              </a:lnSpc>
-              <a:spcBef>
-                <a:spcPct val="50000"/>
-              </a:spcBef>
-              <a:buFont typeface="Arial"/>
-              <a:buChar char="•"/>
-            </a:pPr>
-            <a:r>
-              <a:rPr lang="en-US" sz="2700" dirty="0" smtClean="0">
-                <a:latin typeface="Arial" pitchFamily="34" charset="0"/>
-                <a:cs typeface="Arial" pitchFamily="34" charset="0"/>
-              </a:rPr>
-              <a:t>Common wisdom: micro-batch systems give up on latency to provide high throughput</a:t>
-            </a:r>
-          </a:p>
-          <a:p>
-            <a:pPr marL="457200" indent="-457200">
-              <a:lnSpc>
-                <a:spcPts val="4100"/>
-              </a:lnSpc>
-              <a:spcBef>
-                <a:spcPct val="50000"/>
-              </a:spcBef>
-              <a:buFont typeface="Arial"/>
-              <a:buChar char="•"/>
-            </a:pPr>
+              <a:t>W</a:t>
+            </a:r>
             <a:endParaRPr lang="en-US" sz="2700" dirty="0">
-              <a:latin typeface="Arial" pitchFamily="34" charset="0"/>
-              <a:cs typeface="Arial" pitchFamily="34" charset="0"/>
+              <a:latin typeface="+mj-lt"/>
+              <a:ea typeface="Verdana" panose="020B0604030504040204" pitchFamily="34" charset="0"/>
+              <a:cs typeface="Helvetica" panose="020B0604020202020204" pitchFamily="34" charset="0"/>
             </a:endParaRPr>
           </a:p>
         </p:txBody>
       </p:sp>
       <p:sp>
         <p:nvSpPr>
-          <p:cNvPr id="29" name="Text Box 532"/>
+          <p:cNvPr id="33" name="Text Box 512"/>
           <p:cNvSpPr txBox="1">
             <a:spLocks noChangeArrowheads="1"/>
           </p:cNvSpPr>
@@ -4367,8 +4045,8 @@
         </p:nvSpPr>
         <p:spPr bwMode="auto">
           <a:xfrm>
-            <a:off x="10797121" y="5717421"/>
-            <a:ext cx="7828201" cy="6098678"/>
+            <a:off x="20510502" y="21719550"/>
+            <a:ext cx="14820900" cy="2806922"/>
           </a:xfrm>
           <a:prstGeom prst="rect">
             <a:avLst/>
@@ -4383,7 +4061,7 @@
           <a:effectLst/>
         </p:spPr>
         <p:txBody>
-          <a:bodyPr wrap="square" lIns="0" tIns="0" rIns="0" bIns="0">
+          <a:bodyPr wrap="square">
             <a:spAutoFit/>
           </a:bodyPr>
           <a:lstStyle/>
@@ -4394,361 +4072,92 @@
               </a:spcBef>
             </a:pPr>
             <a:r>
-              <a:rPr lang="en-US" sz="3600" b="1" dirty="0" smtClean="0">
+              <a:rPr lang="en-US" sz="3600" dirty="0" smtClean="0">
                 <a:solidFill>
                   <a:srgbClr val="003564"/>
                 </a:solidFill>
-                <a:latin typeface="Arial" pitchFamily="34" charset="0"/>
-                <a:cs typeface="Arial" pitchFamily="34" charset="0"/>
+                <a:latin typeface="+mj-lt"/>
+                <a:ea typeface="Verdana" panose="020B0604030504040204" pitchFamily="34" charset="0"/>
+                <a:cs typeface="Helvetica" panose="020B0604020202020204" pitchFamily="34" charset="0"/>
               </a:rPr>
-              <a:t>Contribution</a:t>
+              <a:t>Lessons</a:t>
             </a:r>
             <a:endParaRPr lang="en-US" sz="3600" dirty="0">
               <a:solidFill>
                 <a:srgbClr val="003564"/>
               </a:solidFill>
-              <a:latin typeface="Arial" pitchFamily="34" charset="0"/>
-              <a:cs typeface="Arial" pitchFamily="34" charset="0"/>
+              <a:latin typeface="+mj-lt"/>
+              <a:ea typeface="Verdana" panose="020B0604030504040204" pitchFamily="34" charset="0"/>
+              <a:cs typeface="Helvetica" panose="020B0604020202020204" pitchFamily="34" charset="0"/>
             </a:endParaRPr>
           </a:p>
           <a:p>
             <a:pPr>
-              <a:lnSpc>
-                <a:spcPts val="4100"/>
-              </a:lnSpc>
-              <a:spcBef>
-                <a:spcPct val="50000"/>
-              </a:spcBef>
-            </a:pPr>
-            <a:r>
-              <a:rPr lang="en-US" sz="2700" dirty="0" smtClean="0">
-                <a:latin typeface="Arial" pitchFamily="34" charset="0"/>
-                <a:cs typeface="Arial" pitchFamily="34" charset="0"/>
-              </a:rPr>
-              <a:t>1) We provide an evaluation of the performance of Spark Streaming across two major metrics: latency and throughput</a:t>
-            </a:r>
-          </a:p>
-          <a:p>
-            <a:pPr>
-              <a:lnSpc>
-                <a:spcPts val="4100"/>
-              </a:lnSpc>
-              <a:spcBef>
-                <a:spcPct val="50000"/>
-              </a:spcBef>
-            </a:pPr>
-            <a:r>
-              <a:rPr lang="en-US" sz="2700" dirty="0" smtClean="0">
-                <a:latin typeface="Arial" pitchFamily="34" charset="0"/>
-                <a:cs typeface="Arial" pitchFamily="34" charset="0"/>
-              </a:rPr>
-              <a:t>2) We show that Spark Streaming currently cannot provide high throughput and low latency for realistic workloads</a:t>
-            </a:r>
-          </a:p>
-          <a:p>
-            <a:pPr>
-              <a:lnSpc>
-                <a:spcPts val="4100"/>
-              </a:lnSpc>
-              <a:spcBef>
-                <a:spcPct val="50000"/>
-              </a:spcBef>
-            </a:pPr>
-            <a:r>
-              <a:rPr lang="en-US" sz="2700" dirty="0" smtClean="0">
-                <a:latin typeface="Arial" pitchFamily="34" charset="0"/>
-                <a:cs typeface="Arial" pitchFamily="34" charset="0"/>
-              </a:rPr>
-              <a:t>3) </a:t>
-            </a:r>
-            <a:r>
-              <a:rPr lang="en-US" sz="2700" dirty="0" smtClean="0">
-                <a:latin typeface="Arial" pitchFamily="34" charset="0"/>
-                <a:cs typeface="Arial" pitchFamily="34" charset="0"/>
-              </a:rPr>
-              <a:t>T</a:t>
-            </a:r>
-            <a:r>
-              <a:rPr lang="en-US" sz="2700" dirty="0" smtClean="0">
-                <a:latin typeface="Arial" pitchFamily="34" charset="0"/>
-                <a:cs typeface="Arial" pitchFamily="34" charset="0"/>
-              </a:rPr>
-              <a:t>echniques/lesson </a:t>
-            </a:r>
-            <a:r>
-              <a:rPr lang="en-US" sz="2700" dirty="0" smtClean="0">
-                <a:latin typeface="Arial" pitchFamily="34" charset="0"/>
-                <a:cs typeface="Arial" pitchFamily="34" charset="0"/>
-              </a:rPr>
-              <a:t>to improve </a:t>
-            </a:r>
-            <a:r>
-              <a:rPr lang="en-US" sz="2700" dirty="0" smtClean="0">
-                <a:latin typeface="Arial" pitchFamily="34" charset="0"/>
-                <a:cs typeface="Arial" pitchFamily="34" charset="0"/>
-              </a:rPr>
-              <a:t>end-to-end latency</a:t>
-            </a:r>
-            <a:r>
-              <a:rPr lang="en-US" sz="2700" dirty="0" smtClean="0">
-                <a:latin typeface="Arial" pitchFamily="34" charset="0"/>
-                <a:cs typeface="Arial" pitchFamily="34" charset="0"/>
-              </a:rPr>
-              <a:t>:</a:t>
-            </a:r>
-            <a:endParaRPr lang="en-US" sz="2700" dirty="0" smtClean="0">
-              <a:latin typeface="Arial" pitchFamily="34" charset="0"/>
-              <a:cs typeface="Arial" pitchFamily="34" charset="0"/>
-            </a:endParaRPr>
-          </a:p>
-          <a:p>
-            <a:pPr>
-              <a:lnSpc>
-                <a:spcPts val="4100"/>
-              </a:lnSpc>
-              <a:spcBef>
-                <a:spcPct val="50000"/>
-              </a:spcBef>
-            </a:pPr>
-            <a:r>
-              <a:rPr lang="en-US" sz="2700" dirty="0" smtClean="0">
-                <a:latin typeface="Arial" pitchFamily="34" charset="0"/>
-                <a:cs typeface="Arial" pitchFamily="34" charset="0"/>
-              </a:rPr>
-              <a:t>a) </a:t>
-            </a:r>
-          </a:p>
-        </p:txBody>
-      </p:sp>
-      <p:sp>
-        <p:nvSpPr>
-          <p:cNvPr id="32" name="Text Box 512"/>
-          <p:cNvSpPr txBox="1">
-            <a:spLocks noChangeArrowheads="1"/>
-          </p:cNvSpPr>
-          <p:nvPr/>
-        </p:nvSpPr>
-        <p:spPr bwMode="auto">
-          <a:xfrm>
-            <a:off x="18768486" y="17064038"/>
-            <a:ext cx="14820900" cy="1278384"/>
-          </a:xfrm>
-          <a:prstGeom prst="rect">
-            <a:avLst/>
-          </a:prstGeom>
-          <a:noFill/>
-          <a:ln w="9525">
-            <a:noFill/>
-            <a:miter lim="800000"/>
-            <a:headEnd/>
-            <a:tailEnd/>
-          </a:ln>
-          <a:effectLst/>
-        </p:spPr>
-        <p:txBody>
-          <a:bodyPr wrap="square">
-            <a:spAutoFit/>
-          </a:bodyPr>
-          <a:lstStyle/>
-          <a:p>
-            <a:pPr>
-              <a:spcBef>
-                <a:spcPct val="50000"/>
-              </a:spcBef>
-            </a:pPr>
-            <a:r>
-              <a:rPr lang="en-US" sz="3600" b="1" dirty="0" smtClean="0">
-                <a:solidFill>
-                  <a:srgbClr val="003564"/>
-                </a:solidFill>
-                <a:latin typeface="Arial" pitchFamily="34" charset="0"/>
-                <a:cs typeface="Arial" pitchFamily="34" charset="0"/>
-              </a:rPr>
-              <a:t>Evaluation</a:t>
-            </a:r>
-            <a:endParaRPr lang="en-US" sz="3600" dirty="0">
-              <a:solidFill>
-                <a:srgbClr val="003564"/>
-              </a:solidFill>
-              <a:latin typeface="Arial" pitchFamily="34" charset="0"/>
-              <a:cs typeface="Arial" pitchFamily="34" charset="0"/>
-            </a:endParaRPr>
-          </a:p>
-          <a:p>
-            <a:pPr>
-              <a:lnSpc>
-                <a:spcPts val="4100"/>
-              </a:lnSpc>
               <a:spcBef>
                 <a:spcPct val="30000"/>
               </a:spcBef>
             </a:pPr>
             <a:r>
               <a:rPr lang="en-US" sz="2700" dirty="0" smtClean="0">
-                <a:latin typeface="Arial" pitchFamily="34" charset="0"/>
-                <a:cs typeface="Arial" pitchFamily="34" charset="0"/>
+                <a:latin typeface="+mj-lt"/>
+                <a:ea typeface="Verdana" panose="020B0604030504040204" pitchFamily="34" charset="0"/>
+                <a:cs typeface="Helvetica" panose="020B0604020202020204" pitchFamily="34" charset="0"/>
               </a:rPr>
-              <a:t>W</a:t>
-            </a:r>
-            <a:endParaRPr lang="en-US" sz="2700" dirty="0">
-              <a:latin typeface="Arial" pitchFamily="34" charset="0"/>
-              <a:cs typeface="Arial" pitchFamily="34" charset="0"/>
-            </a:endParaRPr>
-          </a:p>
-        </p:txBody>
-      </p:sp>
-      <p:sp>
-        <p:nvSpPr>
-          <p:cNvPr id="33" name="Text Box 512"/>
-          <p:cNvSpPr txBox="1">
-            <a:spLocks noChangeArrowheads="1"/>
-          </p:cNvSpPr>
-          <p:nvPr/>
-        </p:nvSpPr>
-        <p:spPr bwMode="auto">
-          <a:xfrm>
-            <a:off x="18834102" y="22546867"/>
-            <a:ext cx="14820900" cy="3229688"/>
-          </a:xfrm>
-          <a:prstGeom prst="rect">
-            <a:avLst/>
-          </a:prstGeom>
-          <a:noFill/>
-          <a:ln w="9525">
-            <a:noFill/>
-            <a:miter lim="800000"/>
-            <a:headEnd/>
-            <a:tailEnd/>
-          </a:ln>
-          <a:effectLst/>
-        </p:spPr>
-        <p:txBody>
-          <a:bodyPr wrap="square">
-            <a:spAutoFit/>
-          </a:bodyPr>
-          <a:lstStyle/>
+              <a:t>Serialization:</a:t>
+            </a:r>
+          </a:p>
           <a:p>
             <a:pPr>
-              <a:spcBef>
-                <a:spcPct val="50000"/>
-              </a:spcBef>
-            </a:pPr>
-            <a:r>
-              <a:rPr lang="en-US" sz="3600" b="1" dirty="0" smtClean="0">
-                <a:solidFill>
-                  <a:srgbClr val="003564"/>
-                </a:solidFill>
-                <a:latin typeface="Arial" pitchFamily="34" charset="0"/>
-                <a:cs typeface="Arial" pitchFamily="34" charset="0"/>
-              </a:rPr>
-              <a:t>Lessons</a:t>
-            </a:r>
-            <a:endParaRPr lang="en-US" sz="3600" dirty="0">
-              <a:solidFill>
-                <a:srgbClr val="003564"/>
-              </a:solidFill>
-              <a:latin typeface="Arial" pitchFamily="34" charset="0"/>
-              <a:cs typeface="Arial" pitchFamily="34" charset="0"/>
-            </a:endParaRPr>
-          </a:p>
-          <a:p>
-            <a:pPr>
-              <a:lnSpc>
-                <a:spcPts val="4100"/>
-              </a:lnSpc>
               <a:spcBef>
                 <a:spcPct val="30000"/>
               </a:spcBef>
             </a:pPr>
             <a:r>
               <a:rPr lang="en-US" sz="2700" dirty="0" smtClean="0">
-                <a:latin typeface="Arial" pitchFamily="34" charset="0"/>
-                <a:cs typeface="Arial" pitchFamily="34" charset="0"/>
+                <a:latin typeface="+mj-lt"/>
+                <a:ea typeface="Verdana" panose="020B0604030504040204" pitchFamily="34" charset="0"/>
+                <a:cs typeface="Helvetica" panose="020B0604020202020204" pitchFamily="34" charset="0"/>
               </a:rPr>
-              <a:t>Serialization:</a:t>
+              <a:t>Batch window:</a:t>
             </a:r>
           </a:p>
           <a:p>
             <a:pPr>
-              <a:lnSpc>
-                <a:spcPts val="4100"/>
-              </a:lnSpc>
               <a:spcBef>
                 <a:spcPct val="30000"/>
               </a:spcBef>
             </a:pPr>
             <a:r>
               <a:rPr lang="en-US" sz="2700" dirty="0" smtClean="0">
-                <a:latin typeface="Arial" pitchFamily="34" charset="0"/>
-                <a:cs typeface="Arial" pitchFamily="34" charset="0"/>
+                <a:latin typeface="+mj-lt"/>
+                <a:ea typeface="Verdana" panose="020B0604030504040204" pitchFamily="34" charset="0"/>
+                <a:cs typeface="Helvetica" panose="020B0604020202020204" pitchFamily="34" charset="0"/>
               </a:rPr>
-              <a:t>Batch window:</a:t>
+              <a:t>Scheduling scalability:</a:t>
             </a:r>
           </a:p>
           <a:p>
             <a:pPr>
-              <a:lnSpc>
-                <a:spcPts val="4100"/>
-              </a:lnSpc>
               <a:spcBef>
                 <a:spcPct val="30000"/>
               </a:spcBef>
             </a:pPr>
             <a:r>
               <a:rPr lang="en-US" sz="2700" dirty="0" smtClean="0">
-                <a:latin typeface="Arial" pitchFamily="34" charset="0"/>
-                <a:cs typeface="Arial" pitchFamily="34" charset="0"/>
-              </a:rPr>
-              <a:t>Scheduling scalability:</a:t>
-            </a:r>
-          </a:p>
-          <a:p>
-            <a:pPr>
-              <a:lnSpc>
-                <a:spcPts val="4100"/>
-              </a:lnSpc>
-              <a:spcBef>
-                <a:spcPct val="30000"/>
-              </a:spcBef>
-            </a:pPr>
-            <a:r>
-              <a:rPr lang="en-US" sz="2700" dirty="0" smtClean="0">
-                <a:latin typeface="Arial" pitchFamily="34" charset="0"/>
-                <a:cs typeface="Arial" pitchFamily="34" charset="0"/>
+                <a:latin typeface="+mj-lt"/>
+                <a:ea typeface="Verdana" panose="020B0604030504040204" pitchFamily="34" charset="0"/>
+                <a:cs typeface="Helvetica" panose="020B0604020202020204" pitchFamily="34" charset="0"/>
               </a:rPr>
               <a:t>Throughput:</a:t>
             </a:r>
             <a:endParaRPr lang="en-US" sz="2700" dirty="0">
-              <a:latin typeface="Arial" pitchFamily="34" charset="0"/>
-              <a:cs typeface="Arial" pitchFamily="34" charset="0"/>
+              <a:latin typeface="+mj-lt"/>
+              <a:ea typeface="Verdana" panose="020B0604030504040204" pitchFamily="34" charset="0"/>
+              <a:cs typeface="Helvetica" panose="020B0604020202020204" pitchFamily="34" charset="0"/>
             </a:endParaRPr>
           </a:p>
         </p:txBody>
       </p:sp>
-      <p:pic>
-        <p:nvPicPr>
-          <p:cNvPr id="6" name="Picture 5"/>
-          <p:cNvPicPr>
-            <a:picLocks noChangeAspect="1"/>
-          </p:cNvPicPr>
-          <p:nvPr/>
-        </p:nvPicPr>
-        <p:blipFill>
-          <a:blip r:embed="rId2"/>
-          <a:stretch>
-            <a:fillRect/>
-          </a:stretch>
-        </p:blipFill>
-        <p:spPr>
-          <a:xfrm>
-            <a:off x="27632156" y="0"/>
-            <a:ext cx="8263467" cy="2358766"/>
-          </a:xfrm>
-          <a:prstGeom prst="rect">
-            <a:avLst/>
-          </a:prstGeom>
-        </p:spPr>
-      </p:pic>
       <p:pic>
         <p:nvPicPr>
           <p:cNvPr id="8" name="Picture 7"/>
@@ -4765,7 +4174,7 @@
         </p:blipFill>
         <p:spPr>
           <a:xfrm>
-            <a:off x="20036079" y="5624751"/>
+            <a:off x="21712479" y="4797434"/>
             <a:ext cx="11377307" cy="7123398"/>
           </a:xfrm>
           <a:prstGeom prst="rect">
@@ -4789,8 +4198,8 @@
         </p:blipFill>
         <p:spPr bwMode="auto">
           <a:xfrm>
-            <a:off x="30863668" y="2490994"/>
-            <a:ext cx="2791335" cy="2791335"/>
+            <a:off x="509370" y="25192875"/>
+            <a:ext cx="1930041" cy="1930041"/>
           </a:xfrm>
           <a:prstGeom prst="rect">
             <a:avLst/>
@@ -4820,7 +4229,7 @@
         </p:blipFill>
         <p:spPr>
           <a:xfrm>
-            <a:off x="9978332" y="11839297"/>
+            <a:off x="9978332" y="11011980"/>
             <a:ext cx="8453487" cy="8453487"/>
           </a:xfrm>
           <a:prstGeom prst="rect">
@@ -4850,8 +4259,8 @@
         </p:blipFill>
         <p:spPr>
           <a:xfrm>
-            <a:off x="1071808" y="9563021"/>
-            <a:ext cx="8498846" cy="8498846"/>
+            <a:off x="2021328" y="10509720"/>
+            <a:ext cx="7549326" cy="7549326"/>
           </a:xfrm>
           <a:prstGeom prst="rect">
             <a:avLst/>
@@ -4880,8 +4289,8 @@
         </p:blipFill>
         <p:spPr>
           <a:xfrm>
-            <a:off x="708939" y="17727981"/>
-            <a:ext cx="8952431" cy="8952431"/>
+            <a:off x="1785903" y="18059046"/>
+            <a:ext cx="7321007" cy="7321007"/>
           </a:xfrm>
           <a:prstGeom prst="rect">
             <a:avLst/>
@@ -4896,7 +4305,7 @@
   <p:timing>
     <p:tnLst>
       <p:par>
-        <p:cTn xmlns:p14="http://schemas.microsoft.com/office/powerpoint/2010/main" id="1" dur="indefinite" restart="never" nodeType="tmRoot"/>
+        <p:cTn id="1" dur="indefinite" restart="never" nodeType="tmRoot"/>
       </p:par>
     </p:tnLst>
   </p:timing>

</xml_diff>

<commit_message>
checkpoint because of fire alarm
</commit_message>
<xml_diff>
--- a/poster/Poster.pptx
+++ b/poster/Poster.pptx
@@ -3461,7 +3461,7 @@
           </a:prstGeom>
           <a:noFill/>
           <a:extLst>
-            <a:ext uri="{909E8E84-426E-40dd-AFC4-6F175D3DCCD1}">
+            <a:ext uri="{909E8E84-426E-40DD-AFC4-6F175D3DCCD1}">
               <a14:hiddenFill xmlns:a14="http://schemas.microsoft.com/office/drawing/2010/main">
                 <a:solidFill>
                   <a:srgbClr val="FFFFFF"/>
@@ -3586,6 +3586,17 @@
             <a:p>
               <a:pPr algn="ctr" defTabSz="1096963"/>
               <a:r>
+                <a:rPr lang="en-US" sz="5000" b="1" dirty="0" err="1" smtClean="0">
+                  <a:solidFill>
+                    <a:srgbClr val="7D7D7D"/>
+                  </a:solidFill>
+                  <a:latin typeface="+mj-lt"/>
+                  <a:ea typeface="Verdana" panose="020B0604030504040204" pitchFamily="34" charset="0"/>
+                  <a:cs typeface="Helvetica" panose="020B0604020202020204" pitchFamily="34" charset="0"/>
+                </a:rPr>
+                <a:t>João</a:t>
+              </a:r>
+              <a:r>
                 <a:rPr lang="en-US" sz="5000" b="1" dirty="0" smtClean="0">
                   <a:solidFill>
                     <a:srgbClr val="7D7D7D"/>
@@ -3594,7 +3605,7 @@
                   <a:ea typeface="Verdana" panose="020B0604030504040204" pitchFamily="34" charset="0"/>
                   <a:cs typeface="Helvetica" panose="020B0604020202020204" pitchFamily="34" charset="0"/>
                 </a:rPr>
-                <a:t>Joao </a:t>
+                <a:t> </a:t>
               </a:r>
               <a:r>
                 <a:rPr lang="en-US" sz="5000" b="1" dirty="0" err="1" smtClean="0">
@@ -3616,7 +3627,18 @@
                   <a:ea typeface="Verdana" panose="020B0604030504040204" pitchFamily="34" charset="0"/>
                   <a:cs typeface="Helvetica" panose="020B0604020202020204" pitchFamily="34" charset="0"/>
                 </a:rPr>
-                <a:t> (joao@berkeley.edu) 	</a:t>
+                <a:t> </a:t>
+              </a:r>
+              <a:r>
+                <a:rPr lang="en-US" sz="5000" b="1" dirty="0" smtClean="0">
+                  <a:solidFill>
+                    <a:srgbClr val="7D7D7D"/>
+                  </a:solidFill>
+                  <a:latin typeface="+mj-lt"/>
+                  <a:ea typeface="Verdana" panose="020B0604030504040204" pitchFamily="34" charset="0"/>
+                  <a:cs typeface="Helvetica" panose="020B0604020202020204" pitchFamily="34" charset="0"/>
+                </a:rPr>
+                <a:t>(joao@berkeley.edu) 	</a:t>
               </a:r>
               <a:r>
                 <a:rPr lang="en-US" sz="5000" b="1" dirty="0" err="1" smtClean="0">
@@ -3662,8 +3684,8 @@
         </p:nvSpPr>
         <p:spPr bwMode="auto">
           <a:xfrm>
-            <a:off x="20510502" y="12080250"/>
-            <a:ext cx="14820900" cy="4801314"/>
+            <a:off x="22290730" y="4779213"/>
+            <a:ext cx="13222242" cy="1554272"/>
           </a:xfrm>
           <a:prstGeom prst="rect">
             <a:avLst/>
@@ -3689,71 +3711,36 @@
               </a:spcBef>
             </a:pPr>
             <a:r>
-              <a:rPr lang="en-US" sz="6600" dirty="0">
+              <a:rPr lang="en-US" sz="5000" dirty="0" smtClean="0">
                 <a:solidFill>
                   <a:srgbClr val="003564"/>
                 </a:solidFill>
+                <a:latin typeface="+mj-lt"/>
                 <a:ea typeface="Verdana" panose="020B0604030504040204" pitchFamily="34" charset="0"/>
                 <a:cs typeface="Helvetica" panose="020B0604020202020204" pitchFamily="34" charset="0"/>
               </a:rPr>
-              <a:t>Contribution</a:t>
-            </a:r>
-          </a:p>
-          <a:p>
-            <a:pPr>
+              <a:t>Implementation</a:t>
+            </a:r>
+          </a:p>
+          <a:p>
+            <a:pPr marL="457200" indent="-457200">
               <a:spcBef>
                 <a:spcPct val="50000"/>
               </a:spcBef>
+              <a:buFont typeface="Wingdings" panose="05000000000000000000" pitchFamily="2" charset="2"/>
+              <a:buChar char="Ø"/>
             </a:pPr>
             <a:r>
-              <a:rPr lang="en-US" sz="3000" dirty="0">
+              <a:rPr lang="en-US" sz="3000" smtClean="0">
                 <a:ea typeface="Verdana" panose="020B0604030504040204" pitchFamily="34" charset="0"/>
                 <a:cs typeface="Helvetica" panose="020B0604020202020204" pitchFamily="34" charset="0"/>
               </a:rPr>
-              <a:t>1) We provide an evaluation of the performance of Spark Streaming across two major metrics: latency and throughput</a:t>
-            </a:r>
-          </a:p>
-          <a:p>
-            <a:pPr>
-              <a:spcBef>
-                <a:spcPct val="50000"/>
-              </a:spcBef>
-            </a:pPr>
-            <a:r>
-              <a:rPr lang="en-US" sz="3000" dirty="0">
-                <a:ea typeface="Verdana" panose="020B0604030504040204" pitchFamily="34" charset="0"/>
-                <a:cs typeface="Helvetica" panose="020B0604020202020204" pitchFamily="34" charset="0"/>
-              </a:rPr>
-              <a:t>2) We show that Spark Streaming currently cannot provide high throughput and low latency for realistic workloads</a:t>
-            </a:r>
-          </a:p>
-          <a:p>
-            <a:pPr>
-              <a:spcBef>
-                <a:spcPct val="50000"/>
-              </a:spcBef>
-            </a:pPr>
-            <a:r>
-              <a:rPr lang="en-US" sz="3000" dirty="0">
-                <a:ea typeface="Verdana" panose="020B0604030504040204" pitchFamily="34" charset="0"/>
-                <a:cs typeface="Helvetica" panose="020B0604020202020204" pitchFamily="34" charset="0"/>
-              </a:rPr>
-              <a:t>3) Techniques/lesson to improve end-to-end latency:</a:t>
-            </a:r>
-          </a:p>
-          <a:p>
-            <a:pPr>
-              <a:spcBef>
-                <a:spcPct val="50000"/>
-              </a:spcBef>
-            </a:pPr>
-            <a:r>
-              <a:rPr lang="en-US" sz="3000" dirty="0">
-                <a:ea typeface="Verdana" panose="020B0604030504040204" pitchFamily="34" charset="0"/>
-                <a:cs typeface="Helvetica" panose="020B0604020202020204" pitchFamily="34" charset="0"/>
-              </a:rPr>
-              <a:t>a) </a:t>
-            </a:r>
+              <a:t>Task overhead</a:t>
+            </a:r>
+            <a:endParaRPr lang="en-US" sz="3000" dirty="0">
+              <a:ea typeface="Verdana" panose="020B0604030504040204" pitchFamily="34" charset="0"/>
+              <a:cs typeface="Helvetica" panose="020B0604020202020204" pitchFamily="34" charset="0"/>
+            </a:endParaRPr>
           </a:p>
         </p:txBody>
       </p:sp>
@@ -3768,7 +3755,7 @@
         <p:spPr bwMode="auto">
           <a:xfrm>
             <a:off x="1375735" y="4890107"/>
-            <a:ext cx="8293201" cy="5547673"/>
+            <a:ext cx="10337294" cy="6078587"/>
           </a:xfrm>
           <a:prstGeom prst="rect">
             <a:avLst/>
@@ -3802,7 +3789,7 @@
                 <a:ea typeface="Verdana" panose="020B0604030504040204" pitchFamily="34" charset="0"/>
                 <a:cs typeface="Helvetica" panose="020B0604020202020204" pitchFamily="34" charset="0"/>
               </a:rPr>
-              <a:t>Motivation</a:t>
+              <a:t>Motivation and Objective</a:t>
             </a:r>
             <a:endParaRPr lang="en-US" sz="5000" dirty="0">
               <a:solidFill>
@@ -3822,7 +3809,7 @@
               <a:buChar char="Ø"/>
             </a:pPr>
             <a:r>
-              <a:rPr lang="en-US" sz="2700" dirty="0" smtClean="0">
+              <a:rPr lang="en-US" sz="3000" dirty="0" smtClean="0">
                 <a:latin typeface="+mj-lt"/>
                 <a:ea typeface="Verdana" panose="020B0604030504040204" pitchFamily="34" charset="0"/>
                 <a:cs typeface="Helvetica" panose="020B0604020202020204" pitchFamily="34" charset="0"/>
@@ -3839,7 +3826,7 @@
               <a:buChar char="Ø"/>
             </a:pPr>
             <a:r>
-              <a:rPr lang="en-US" sz="2700" dirty="0" smtClean="0">
+              <a:rPr lang="en-US" sz="3000" dirty="0" smtClean="0">
                 <a:latin typeface="+mj-lt"/>
                 <a:ea typeface="Verdana" panose="020B0604030504040204" pitchFamily="34" charset="0"/>
                 <a:cs typeface="Helvetica" panose="020B0604020202020204" pitchFamily="34" charset="0"/>
@@ -3856,26 +3843,29 @@
               <a:buChar char="Ø"/>
             </a:pPr>
             <a:r>
-              <a:rPr lang="en-US" sz="2700" dirty="0" smtClean="0">
+              <a:rPr lang="en-US" sz="3000" dirty="0" smtClean="0">
                 <a:latin typeface="+mj-lt"/>
                 <a:ea typeface="Verdana" panose="020B0604030504040204" pitchFamily="34" charset="0"/>
                 <a:cs typeface="Helvetica" panose="020B0604020202020204" pitchFamily="34" charset="0"/>
               </a:rPr>
-              <a:t>Because Spark Streaming also has other desirable properties such as fault tolerance, we want to explore what it takes for the system to provide low latency while maintaining </a:t>
-            </a:r>
-            <a:r>
-              <a:rPr lang="en-US" sz="2700" smtClean="0">
+              <a:t>Because Spark Streaming also has other desirable properties such as fault tolerance, we want to explore what it takes for </a:t>
+            </a:r>
+            <a:r>
+              <a:rPr lang="en-US" sz="3000" dirty="0" smtClean="0">
                 <a:latin typeface="+mj-lt"/>
                 <a:ea typeface="Verdana" panose="020B0604030504040204" pitchFamily="34" charset="0"/>
                 <a:cs typeface="Helvetica" panose="020B0604020202020204" pitchFamily="34" charset="0"/>
               </a:rPr>
-              <a:t>reasonable throughput</a:t>
-            </a:r>
-            <a:endParaRPr lang="en-US" sz="2700" dirty="0" smtClean="0">
-              <a:latin typeface="+mj-lt"/>
-              <a:ea typeface="Verdana" panose="020B0604030504040204" pitchFamily="34" charset="0"/>
-              <a:cs typeface="Helvetica" panose="020B0604020202020204" pitchFamily="34" charset="0"/>
-            </a:endParaRPr>
+              <a:t>a system of its architecture </a:t>
+            </a:r>
+            <a:r>
+              <a:rPr lang="en-US" sz="3000" dirty="0" smtClean="0">
+                <a:latin typeface="+mj-lt"/>
+                <a:ea typeface="Verdana" panose="020B0604030504040204" pitchFamily="34" charset="0"/>
+                <a:cs typeface="Helvetica" panose="020B0604020202020204" pitchFamily="34" charset="0"/>
+              </a:rPr>
+              <a:t>to provide low latency while maintaining reasonable throughput</a:t>
+            </a:r>
           </a:p>
         </p:txBody>
       </p:sp>
@@ -3889,8 +3879,8 @@
         </p:nvSpPr>
         <p:spPr bwMode="auto">
           <a:xfrm>
-            <a:off x="10797121" y="4890104"/>
-            <a:ext cx="7828201" cy="1392689"/>
+            <a:off x="1180509" y="19977886"/>
+            <a:ext cx="10986856" cy="6540252"/>
           </a:xfrm>
           <a:prstGeom prst="rect">
             <a:avLst/>
@@ -3924,7 +3914,7 @@
                 <a:ea typeface="Verdana" panose="020B0604030504040204" pitchFamily="34" charset="0"/>
                 <a:cs typeface="Helvetica" panose="020B0604020202020204" pitchFamily="34" charset="0"/>
               </a:rPr>
-              <a:t>Techniques</a:t>
+              <a:t>Experiments</a:t>
             </a:r>
             <a:endParaRPr lang="en-US" sz="5000" dirty="0">
               <a:solidFill>
@@ -3936,18 +3926,96 @@
             </a:endParaRPr>
           </a:p>
           <a:p>
-            <a:pPr>
+            <a:pPr marL="457200" indent="-457200">
               <a:spcBef>
                 <a:spcPct val="50000"/>
               </a:spcBef>
+              <a:buFont typeface="Wingdings" panose="05000000000000000000" pitchFamily="2" charset="2"/>
+              <a:buChar char="Ø"/>
             </a:pPr>
             <a:r>
-              <a:rPr lang="en-US" sz="2700" dirty="0" smtClean="0">
+              <a:rPr lang="en-US" sz="3000" dirty="0">
                 <a:latin typeface="+mj-lt"/>
                 <a:ea typeface="Verdana" panose="020B0604030504040204" pitchFamily="34" charset="0"/>
                 <a:cs typeface="Helvetica" panose="020B0604020202020204" pitchFamily="34" charset="0"/>
               </a:rPr>
-              <a:t>1)</a:t>
+              <a:t>O</a:t>
+            </a:r>
+            <a:r>
+              <a:rPr lang="en-US" sz="3000" dirty="0" smtClean="0">
+                <a:latin typeface="+mj-lt"/>
+                <a:ea typeface="Verdana" panose="020B0604030504040204" pitchFamily="34" charset="0"/>
+                <a:cs typeface="Helvetica" panose="020B0604020202020204" pitchFamily="34" charset="0"/>
+              </a:rPr>
+              <a:t>ne node</a:t>
+            </a:r>
+          </a:p>
+          <a:p>
+            <a:pPr marL="914400" lvl="1" indent="-457200">
+              <a:spcBef>
+                <a:spcPct val="50000"/>
+              </a:spcBef>
+              <a:buFont typeface="Wingdings" panose="05000000000000000000" pitchFamily="2" charset="2"/>
+              <a:buChar char="Ø"/>
+            </a:pPr>
+            <a:r>
+              <a:rPr lang="en-US" sz="3000" dirty="0" smtClean="0">
+                <a:latin typeface="+mj-lt"/>
+                <a:ea typeface="Verdana" panose="020B0604030504040204" pitchFamily="34" charset="0"/>
+                <a:cs typeface="Helvetica" panose="020B0604020202020204" pitchFamily="34" charset="0"/>
+              </a:rPr>
+              <a:t>Given a throughput, find end-to-end latencies of data for various batch windows; as well, find average breakdown as well as cumulative distribution function (CDF) of those latencies</a:t>
+            </a:r>
+          </a:p>
+          <a:p>
+            <a:pPr marL="914400" lvl="1" indent="-457200">
+              <a:spcBef>
+                <a:spcPct val="50000"/>
+              </a:spcBef>
+              <a:buFont typeface="Wingdings" panose="05000000000000000000" pitchFamily="2" charset="2"/>
+              <a:buChar char="Ø"/>
+            </a:pPr>
+            <a:r>
+              <a:rPr lang="en-US" sz="3000" dirty="0" smtClean="0">
+                <a:latin typeface="+mj-lt"/>
+                <a:ea typeface="Verdana" panose="020B0604030504040204" pitchFamily="34" charset="0"/>
+                <a:cs typeface="Helvetica" panose="020B0604020202020204" pitchFamily="34" charset="0"/>
+              </a:rPr>
+              <a:t>For a configuration with stable end-to-end latencies, find average breakdown of times for running tasks</a:t>
+            </a:r>
+          </a:p>
+          <a:p>
+            <a:pPr marL="457200" indent="-457200">
+              <a:spcBef>
+                <a:spcPct val="50000"/>
+              </a:spcBef>
+              <a:buFont typeface="Wingdings" panose="05000000000000000000" pitchFamily="2" charset="2"/>
+              <a:buChar char="Ø"/>
+            </a:pPr>
+            <a:r>
+              <a:rPr lang="en-US" sz="3000" dirty="0" smtClean="0">
+                <a:latin typeface="+mj-lt"/>
+                <a:ea typeface="Verdana" panose="020B0604030504040204" pitchFamily="34" charset="0"/>
+                <a:cs typeface="Helvetica" panose="020B0604020202020204" pitchFamily="34" charset="0"/>
+              </a:rPr>
+              <a:t>Multiple nodes</a:t>
+            </a:r>
+          </a:p>
+          <a:p>
+            <a:pPr marL="914400" lvl="1" indent="-457200">
+              <a:spcBef>
+                <a:spcPct val="50000"/>
+              </a:spcBef>
+              <a:buFont typeface="Wingdings" panose="05000000000000000000" pitchFamily="2" charset="2"/>
+              <a:buChar char="Ø"/>
+            </a:pPr>
+            <a:r>
+              <a:rPr lang="en-US" sz="3000" dirty="0" smtClean="0">
+                <a:latin typeface="+mj-lt"/>
+                <a:ea typeface="Verdana" panose="020B0604030504040204" pitchFamily="34" charset="0"/>
+                <a:cs typeface="Helvetica" panose="020B0604020202020204" pitchFamily="34" charset="0"/>
+              </a:rPr>
+              <a:t>Given a throughput and batch window, compare latencies and breakdowns per-node to that of one-node deployment</a:t>
             </a:r>
           </a:p>
         </p:txBody>
@@ -3962,8 +4030,8 @@
         </p:nvSpPr>
         <p:spPr bwMode="auto">
           <a:xfrm>
-            <a:off x="20516565" y="17423200"/>
-            <a:ext cx="14820900" cy="1186479"/>
+            <a:off x="22290730" y="10624540"/>
+            <a:ext cx="13222242" cy="1186479"/>
           </a:xfrm>
           <a:prstGeom prst="rect">
             <a:avLst/>
@@ -4040,8 +4108,8 @@
         </p:nvSpPr>
         <p:spPr bwMode="auto">
           <a:xfrm>
-            <a:off x="26648836" y="16978216"/>
-            <a:ext cx="14820900" cy="2806922"/>
+            <a:off x="26045170" y="12391947"/>
+            <a:ext cx="10168356" cy="6794168"/>
           </a:xfrm>
           <a:prstGeom prst="rect">
             <a:avLst/>
@@ -4143,8 +4211,79 @@
                 <a:ea typeface="Verdana" panose="020B0604030504040204" pitchFamily="34" charset="0"/>
                 <a:cs typeface="Helvetica" panose="020B0604020202020204" pitchFamily="34" charset="0"/>
               </a:rPr>
-              <a:t>Throughput:</a:t>
-            </a:r>
+              <a:t>Throughput</a:t>
+            </a:r>
+            <a:r>
+              <a:rPr lang="en-US" sz="2700" dirty="0" smtClean="0">
+                <a:latin typeface="+mj-lt"/>
+                <a:ea typeface="Verdana" panose="020B0604030504040204" pitchFamily="34" charset="0"/>
+                <a:cs typeface="Helvetica" panose="020B0604020202020204" pitchFamily="34" charset="0"/>
+              </a:rPr>
+              <a:t>:</a:t>
+            </a:r>
+          </a:p>
+          <a:p>
+            <a:pPr>
+              <a:spcBef>
+                <a:spcPct val="50000"/>
+              </a:spcBef>
+            </a:pPr>
+            <a:r>
+              <a:rPr lang="en-US" sz="2800" dirty="0">
+                <a:ea typeface="Verdana" panose="020B0604030504040204" pitchFamily="34" charset="0"/>
+                <a:cs typeface="Helvetica" panose="020B0604020202020204" pitchFamily="34" charset="0"/>
+              </a:rPr>
+              <a:t>1) We provide an evaluation of the performance of Spark Streaming across two major metrics: latency and throughput</a:t>
+            </a:r>
+          </a:p>
+          <a:p>
+            <a:pPr>
+              <a:spcBef>
+                <a:spcPct val="50000"/>
+              </a:spcBef>
+            </a:pPr>
+            <a:r>
+              <a:rPr lang="en-US" sz="2800" dirty="0">
+                <a:ea typeface="Verdana" panose="020B0604030504040204" pitchFamily="34" charset="0"/>
+                <a:cs typeface="Helvetica" panose="020B0604020202020204" pitchFamily="34" charset="0"/>
+              </a:rPr>
+              <a:t>2) We show that Spark Streaming currently cannot provide high throughput and low latency for realistic workloads</a:t>
+            </a:r>
+          </a:p>
+          <a:p>
+            <a:pPr>
+              <a:spcBef>
+                <a:spcPct val="50000"/>
+              </a:spcBef>
+            </a:pPr>
+            <a:r>
+              <a:rPr lang="en-US" sz="2800" dirty="0">
+                <a:ea typeface="Verdana" panose="020B0604030504040204" pitchFamily="34" charset="0"/>
+                <a:cs typeface="Helvetica" panose="020B0604020202020204" pitchFamily="34" charset="0"/>
+              </a:rPr>
+              <a:t>3) Techniques/lesson to improve end-to-end latency:</a:t>
+            </a:r>
+          </a:p>
+          <a:p>
+            <a:pPr>
+              <a:spcBef>
+                <a:spcPct val="50000"/>
+              </a:spcBef>
+            </a:pPr>
+            <a:r>
+              <a:rPr lang="en-US" sz="2800" dirty="0">
+                <a:ea typeface="Verdana" panose="020B0604030504040204" pitchFamily="34" charset="0"/>
+                <a:cs typeface="Helvetica" panose="020B0604020202020204" pitchFamily="34" charset="0"/>
+              </a:rPr>
+              <a:t>a) </a:t>
+            </a:r>
+          </a:p>
+          <a:p>
+            <a:pPr>
+              <a:spcBef>
+                <a:spcPct val="30000"/>
+              </a:spcBef>
+            </a:pPr>
             <a:endParaRPr lang="en-US" sz="2700" dirty="0">
               <a:latin typeface="+mj-lt"/>
               <a:ea typeface="Verdana" panose="020B0604030504040204" pitchFamily="34" charset="0"/>
@@ -4169,7 +4308,7 @@
         </p:blipFill>
         <p:spPr>
           <a:xfrm>
-            <a:off x="21712479" y="4797434"/>
+            <a:off x="1375735" y="12391947"/>
             <a:ext cx="11377307" cy="7123398"/>
           </a:xfrm>
           <a:prstGeom prst="rect">
@@ -4193,7 +4332,7 @@
         </p:blipFill>
         <p:spPr bwMode="auto">
           <a:xfrm>
-            <a:off x="509370" y="25192875"/>
+            <a:off x="28097926" y="25185075"/>
             <a:ext cx="1930041" cy="1930041"/>
           </a:xfrm>
           <a:prstGeom prst="rect">
@@ -4224,8 +4363,8 @@
         </p:blipFill>
         <p:spPr>
           <a:xfrm>
-            <a:off x="9724332" y="10884980"/>
-            <a:ext cx="8453487" cy="8453487"/>
+            <a:off x="13688390" y="12163422"/>
+            <a:ext cx="7814464" cy="7814464"/>
           </a:xfrm>
           <a:prstGeom prst="rect">
             <a:avLst/>
@@ -4254,8 +4393,8 @@
         </p:blipFill>
         <p:spPr>
           <a:xfrm>
-            <a:off x="2021328" y="10509720"/>
-            <a:ext cx="7549326" cy="7549326"/>
+            <a:off x="13900478" y="4676993"/>
+            <a:ext cx="7101708" cy="7101708"/>
           </a:xfrm>
           <a:prstGeom prst="rect">
             <a:avLst/>
@@ -4284,8 +4423,8 @@
         </p:blipFill>
         <p:spPr>
           <a:xfrm>
-            <a:off x="769904" y="19134666"/>
-            <a:ext cx="5652720" cy="5652720"/>
+            <a:off x="13931999" y="20524068"/>
+            <a:ext cx="6591048" cy="6591048"/>
           </a:xfrm>
           <a:prstGeom prst="rect">
             <a:avLst/>
@@ -4314,7 +4453,7 @@
         </p:blipFill>
         <p:spPr>
           <a:xfrm>
-            <a:off x="6705599" y="19828933"/>
+            <a:off x="22662146" y="18827870"/>
             <a:ext cx="6400800" cy="6400800"/>
           </a:xfrm>
           <a:prstGeom prst="rect">
@@ -4344,8 +4483,8 @@
         </p:blipFill>
         <p:spPr>
           <a:xfrm>
-            <a:off x="14113933" y="19998267"/>
-            <a:ext cx="6400800" cy="6400800"/>
+            <a:off x="22876304" y="13683790"/>
+            <a:ext cx="4539712" cy="4539712"/>
           </a:xfrm>
           <a:prstGeom prst="rect">
             <a:avLst/>
@@ -4374,14 +4513,72 @@
         </p:blipFill>
         <p:spPr>
           <a:xfrm>
-            <a:off x="21056600" y="20040599"/>
-            <a:ext cx="6400800" cy="6400800"/>
+            <a:off x="30027967" y="19977886"/>
+            <a:ext cx="4368800" cy="4368800"/>
           </a:xfrm>
           <a:prstGeom prst="rect">
             <a:avLst/>
           </a:prstGeom>
         </p:spPr>
       </p:pic>
+      <p:sp>
+        <p:nvSpPr>
+          <p:cNvPr id="19" name="Text Box 532"/>
+          <p:cNvSpPr txBox="1">
+            <a:spLocks noChangeArrowheads="1"/>
+          </p:cNvSpPr>
+          <p:nvPr/>
+        </p:nvSpPr>
+        <p:spPr bwMode="auto">
+          <a:xfrm>
+            <a:off x="1375735" y="11393981"/>
+            <a:ext cx="8835065" cy="769441"/>
+          </a:xfrm>
+          <a:prstGeom prst="rect">
+            <a:avLst/>
+          </a:prstGeom>
+          <a:noFill/>
+          <a:ln w="9525">
+            <a:noFill/>
+            <a:miter lim="800000"/>
+            <a:headEnd/>
+            <a:tailEnd/>
+          </a:ln>
+          <a:effectLst/>
+        </p:spPr>
+        <p:txBody>
+          <a:bodyPr wrap="square" lIns="0" tIns="0" rIns="0" bIns="0">
+            <a:spAutoFit/>
+          </a:bodyPr>
+          <a:lstStyle/>
+          <a:p>
+            <a:pPr>
+              <a:spcBef>
+                <a:spcPct val="50000"/>
+              </a:spcBef>
+            </a:pPr>
+            <a:r>
+              <a:rPr lang="en-US" sz="5000" dirty="0" smtClean="0">
+                <a:solidFill>
+                  <a:srgbClr val="003564"/>
+                </a:solidFill>
+                <a:latin typeface="+mj-lt"/>
+                <a:ea typeface="Verdana" panose="020B0604030504040204" pitchFamily="34" charset="0"/>
+                <a:cs typeface="Helvetica" panose="020B0604020202020204" pitchFamily="34" charset="0"/>
+              </a:rPr>
+              <a:t>Architecture</a:t>
+            </a:r>
+            <a:endParaRPr lang="en-US" sz="5000" dirty="0">
+              <a:solidFill>
+                <a:srgbClr val="003564"/>
+              </a:solidFill>
+              <a:latin typeface="+mj-lt"/>
+              <a:ea typeface="Verdana" panose="020B0604030504040204" pitchFamily="34" charset="0"/>
+              <a:cs typeface="Helvetica" panose="020B0604020202020204" pitchFamily="34" charset="0"/>
+            </a:endParaRPr>
+          </a:p>
+        </p:txBody>
+      </p:sp>
     </p:spTree>
   </p:cSld>
   <p:clrMapOvr>
@@ -4390,7 +4587,7 @@
   <p:timing>
     <p:tnLst>
       <p:par>
-        <p:cTn xmlns:p14="http://schemas.microsoft.com/office/powerpoint/2010/main" id="1" dur="indefinite" restart="never" nodeType="tmRoot"/>
+        <p:cTn id="1" dur="indefinite" restart="never" nodeType="tmRoot"/>
       </p:par>
     </p:tnLst>
   </p:timing>

</xml_diff>

<commit_message>
textbox with shadow and remove one of evaluation graphs
</commit_message>
<xml_diff>
--- a/poster/Poster.pptx
+++ b/poster/Poster.pptx
@@ -5,10 +5,11 @@
     <p:sldMasterId id="2147483648" r:id="rId1"/>
   </p:sldMasterIdLst>
   <p:handoutMasterIdLst>
-    <p:handoutMasterId r:id="rId3"/>
+    <p:handoutMasterId r:id="rId4"/>
   </p:handoutMasterIdLst>
   <p:sldIdLst>
     <p:sldId id="257" r:id="rId2"/>
+    <p:sldId id="258" r:id="rId3"/>
   </p:sldIdLst>
   <p:sldSz cx="36576000" cy="27432000"/>
   <p:notesSz cx="20193000" cy="32027813"/>
@@ -3685,7 +3686,7 @@
         <p:spPr bwMode="auto">
           <a:xfrm>
             <a:off x="22290730" y="4779213"/>
-            <a:ext cx="13222242" cy="1554272"/>
+            <a:ext cx="13222242" cy="3631763"/>
           </a:xfrm>
           <a:prstGeom prst="rect">
             <a:avLst/>
@@ -3719,7 +3720,7 @@
                 <a:ea typeface="Verdana" panose="020B0604030504040204" pitchFamily="34" charset="0"/>
                 <a:cs typeface="Helvetica" panose="020B0604020202020204" pitchFamily="34" charset="0"/>
               </a:rPr>
-              <a:t>Implementation</a:t>
+              <a:t>Implementation and Evaluation</a:t>
             </a:r>
           </a:p>
           <a:p>
@@ -3731,13 +3732,66 @@
               <a:buChar char="Ø"/>
             </a:pPr>
             <a:r>
-              <a:rPr lang="en-US" sz="3000" smtClean="0">
+              <a:rPr lang="en-US" sz="3000" dirty="0" smtClean="0">
+                <a:latin typeface="+mj-lt"/>
                 <a:ea typeface="Verdana" panose="020B0604030504040204" pitchFamily="34" charset="0"/>
                 <a:cs typeface="Helvetica" panose="020B0604020202020204" pitchFamily="34" charset="0"/>
               </a:rPr>
-              <a:t>Task overhead</a:t>
+              <a:t>Reduce overhead in task deserialization</a:t>
+            </a:r>
+          </a:p>
+          <a:p>
+            <a:pPr marL="914400" lvl="1" indent="-457200">
+              <a:spcBef>
+                <a:spcPct val="50000"/>
+              </a:spcBef>
+              <a:buFont typeface="Wingdings" panose="05000000000000000000" pitchFamily="2" charset="2"/>
+              <a:buChar char="Ø"/>
+            </a:pPr>
+            <a:r>
+              <a:rPr lang="en-US" sz="3000" dirty="0" smtClean="0">
+                <a:latin typeface="+mj-lt"/>
+                <a:ea typeface="Verdana" panose="020B0604030504040204" pitchFamily="34" charset="0"/>
+                <a:cs typeface="Helvetica" panose="020B0604020202020204" pitchFamily="34" charset="0"/>
+              </a:rPr>
+              <a:t>Lazily instantiate configuration object while updating dependencies</a:t>
+            </a:r>
+          </a:p>
+          <a:p>
+            <a:pPr marL="914400" lvl="1" indent="-457200">
+              <a:spcBef>
+                <a:spcPct val="50000"/>
+              </a:spcBef>
+              <a:buFont typeface="Wingdings" panose="05000000000000000000" pitchFamily="2" charset="2"/>
+              <a:buChar char="Ø"/>
+            </a:pPr>
+            <a:r>
+              <a:rPr lang="en-US" sz="3000" dirty="0" smtClean="0">
+                <a:latin typeface="+mj-lt"/>
+                <a:ea typeface="Verdana" panose="020B0604030504040204" pitchFamily="34" charset="0"/>
+                <a:cs typeface="Helvetica" panose="020B0604020202020204" pitchFamily="34" charset="0"/>
+              </a:rPr>
+              <a:t>Cache task binary instead of sending same information every time</a:t>
+            </a:r>
+          </a:p>
+          <a:p>
+            <a:pPr marL="457200" indent="-457200">
+              <a:spcBef>
+                <a:spcPct val="50000"/>
+              </a:spcBef>
+              <a:buFont typeface="Wingdings" panose="05000000000000000000" pitchFamily="2" charset="2"/>
+              <a:buChar char="Ø"/>
+            </a:pPr>
+            <a:r>
+              <a:rPr lang="en-US" sz="3000" dirty="0" smtClean="0">
+                <a:latin typeface="+mj-lt"/>
+                <a:ea typeface="Verdana" panose="020B0604030504040204" pitchFamily="34" charset="0"/>
+                <a:cs typeface="Helvetica" panose="020B0604020202020204" pitchFamily="34" charset="0"/>
+              </a:rPr>
+              <a:t>Experimental decentralized task scheduler</a:t>
             </a:r>
             <a:endParaRPr lang="en-US" sz="3000" dirty="0">
+              <a:latin typeface="+mj-lt"/>
               <a:ea typeface="Verdana" panose="020B0604030504040204" pitchFamily="34" charset="0"/>
               <a:cs typeface="Helvetica" panose="020B0604020202020204" pitchFamily="34" charset="0"/>
             </a:endParaRPr>
@@ -3754,14 +3808,18 @@
         </p:nvSpPr>
         <p:spPr bwMode="auto">
           <a:xfrm>
-            <a:off x="1375735" y="4890107"/>
-            <a:ext cx="10337294" cy="6078587"/>
+            <a:off x="1375734" y="4890107"/>
+            <a:ext cx="11377307" cy="6078587"/>
           </a:xfrm>
           <a:prstGeom prst="rect">
             <a:avLst/>
           </a:prstGeom>
-          <a:noFill/>
-          <a:ln w="9525">
+          <a:solidFill>
+            <a:schemeClr val="bg1">
+              <a:lumMod val="95000"/>
+            </a:schemeClr>
+          </a:solidFill>
+          <a:ln w="0">
             <a:noFill/>
             <a:miter lim="800000"/>
             <a:headEnd/>
@@ -3770,7 +3828,7 @@
           <a:effectLst/>
         </p:spPr>
         <p:txBody>
-          <a:bodyPr wrap="square" lIns="0" tIns="0" rIns="0" bIns="0">
+          <a:bodyPr wrap="square" lIns="228600" tIns="0" rIns="228600" bIns="0">
             <a:spAutoFit/>
           </a:bodyPr>
           <a:lstStyle/>
@@ -4022,7 +4080,7 @@
       </p:sp>
       <p:sp>
         <p:nvSpPr>
-          <p:cNvPr id="32" name="Text Box 512"/>
+          <p:cNvPr id="33" name="Text Box 512"/>
           <p:cNvSpPr txBox="1">
             <a:spLocks noChangeArrowheads="1"/>
           </p:cNvSpPr>
@@ -4030,8 +4088,8 @@
         </p:nvSpPr>
         <p:spPr bwMode="auto">
           <a:xfrm>
-            <a:off x="22290730" y="10624540"/>
-            <a:ext cx="13222242" cy="1186479"/>
+            <a:off x="22501050" y="15691221"/>
+            <a:ext cx="13011921" cy="7648248"/>
           </a:xfrm>
           <a:prstGeom prst="rect">
             <a:avLst/>
@@ -4057,7 +4115,7 @@
               </a:spcBef>
             </a:pPr>
             <a:r>
-              <a:rPr lang="en-US" sz="3600" dirty="0" smtClean="0">
+              <a:rPr lang="en-US" sz="5000" dirty="0" smtClean="0">
                 <a:solidFill>
                   <a:srgbClr val="003564"/>
                 </a:solidFill>
@@ -4065,9 +4123,9 @@
                 <a:ea typeface="Verdana" panose="020B0604030504040204" pitchFamily="34" charset="0"/>
                 <a:cs typeface="Helvetica" panose="020B0604020202020204" pitchFamily="34" charset="0"/>
               </a:rPr>
-              <a:t>Evaluation</a:t>
-            </a:r>
-            <a:endParaRPr lang="en-US" sz="3600" dirty="0">
+              <a:t>Contributions</a:t>
+            </a:r>
+            <a:endParaRPr lang="en-US" sz="5000" dirty="0">
               <a:solidFill>
                 <a:srgbClr val="003564"/>
               </a:solidFill>
@@ -4077,57 +4135,83 @@
             </a:endParaRPr>
           </a:p>
           <a:p>
+            <a:pPr marL="457200" indent="-457200">
+              <a:spcBef>
+                <a:spcPct val="50000"/>
+              </a:spcBef>
+              <a:buFont typeface="Wingdings" panose="05000000000000000000" pitchFamily="2" charset="2"/>
+              <a:buChar char="Ø"/>
+            </a:pPr>
+            <a:r>
+              <a:rPr lang="en-US" sz="3000" dirty="0" smtClean="0">
+                <a:latin typeface="+mj-lt"/>
+                <a:ea typeface="Verdana" panose="020B0604030504040204" pitchFamily="34" charset="0"/>
+                <a:cs typeface="Helvetica" panose="020B0604020202020204" pitchFamily="34" charset="0"/>
+              </a:rPr>
+              <a:t>Serialization</a:t>
+            </a:r>
+            <a:r>
+              <a:rPr lang="en-US" sz="3000" dirty="0" smtClean="0">
+                <a:latin typeface="+mj-lt"/>
+                <a:ea typeface="Verdana" panose="020B0604030504040204" pitchFamily="34" charset="0"/>
+                <a:cs typeface="Helvetica" panose="020B0604020202020204" pitchFamily="34" charset="0"/>
+              </a:rPr>
+              <a:t>:</a:t>
+            </a:r>
+          </a:p>
+          <a:p>
             <a:pPr>
               <a:spcBef>
                 <a:spcPct val="30000"/>
               </a:spcBef>
             </a:pPr>
             <a:r>
-              <a:rPr lang="en-US" sz="2700" dirty="0" smtClean="0">
+              <a:rPr lang="en-US" sz="3000" dirty="0" smtClean="0">
                 <a:latin typeface="+mj-lt"/>
                 <a:ea typeface="Verdana" panose="020B0604030504040204" pitchFamily="34" charset="0"/>
                 <a:cs typeface="Helvetica" panose="020B0604020202020204" pitchFamily="34" charset="0"/>
               </a:rPr>
-              <a:t>W</a:t>
-            </a:r>
-            <a:endParaRPr lang="en-US" sz="2700" dirty="0">
-              <a:latin typeface="+mj-lt"/>
-              <a:ea typeface="Verdana" panose="020B0604030504040204" pitchFamily="34" charset="0"/>
-              <a:cs typeface="Helvetica" panose="020B0604020202020204" pitchFamily="34" charset="0"/>
-            </a:endParaRPr>
-          </a:p>
-        </p:txBody>
-      </p:sp>
-      <p:sp>
-        <p:nvSpPr>
-          <p:cNvPr id="33" name="Text Box 512"/>
-          <p:cNvSpPr txBox="1">
-            <a:spLocks noChangeArrowheads="1"/>
-          </p:cNvSpPr>
-          <p:nvPr/>
-        </p:nvSpPr>
-        <p:spPr bwMode="auto">
-          <a:xfrm>
-            <a:off x="26045170" y="12391947"/>
-            <a:ext cx="10168356" cy="6794168"/>
-          </a:xfrm>
-          <a:prstGeom prst="rect">
-            <a:avLst/>
-          </a:prstGeom>
-          <a:noFill/>
-          <a:ln w="9525">
-            <a:noFill/>
-            <a:miter lim="800000"/>
-            <a:headEnd/>
-            <a:tailEnd/>
-          </a:ln>
-          <a:effectLst/>
-        </p:spPr>
-        <p:txBody>
-          <a:bodyPr wrap="square">
-            <a:spAutoFit/>
-          </a:bodyPr>
-          <a:lstStyle/>
+              <a:t>Batch window:</a:t>
+            </a:r>
+          </a:p>
+          <a:p>
+            <a:pPr>
+              <a:spcBef>
+                <a:spcPct val="30000"/>
+              </a:spcBef>
+            </a:pPr>
+            <a:r>
+              <a:rPr lang="en-US" sz="3000" dirty="0" smtClean="0">
+                <a:latin typeface="+mj-lt"/>
+                <a:ea typeface="Verdana" panose="020B0604030504040204" pitchFamily="34" charset="0"/>
+                <a:cs typeface="Helvetica" panose="020B0604020202020204" pitchFamily="34" charset="0"/>
+              </a:rPr>
+              <a:t>Scheduling scalability:</a:t>
+            </a:r>
+          </a:p>
+          <a:p>
+            <a:pPr>
+              <a:spcBef>
+                <a:spcPct val="30000"/>
+              </a:spcBef>
+            </a:pPr>
+            <a:r>
+              <a:rPr lang="en-US" sz="3000" dirty="0" smtClean="0">
+                <a:latin typeface="+mj-lt"/>
+                <a:ea typeface="Verdana" panose="020B0604030504040204" pitchFamily="34" charset="0"/>
+                <a:cs typeface="Helvetica" panose="020B0604020202020204" pitchFamily="34" charset="0"/>
+              </a:rPr>
+              <a:t>Throughput</a:t>
+            </a:r>
+            <a:r>
+              <a:rPr lang="en-US" sz="3000" dirty="0" smtClean="0">
+                <a:latin typeface="+mj-lt"/>
+                <a:ea typeface="Verdana" panose="020B0604030504040204" pitchFamily="34" charset="0"/>
+                <a:cs typeface="Helvetica" panose="020B0604020202020204" pitchFamily="34" charset="0"/>
+              </a:rPr>
+              <a:t>:</a:t>
+            </a:r>
+          </a:p>
           <a:p>
             <a:pPr>
               <a:spcBef>
@@ -4135,24 +4219,58 @@
               </a:spcBef>
             </a:pPr>
             <a:r>
-              <a:rPr lang="en-US" sz="3600" dirty="0" smtClean="0">
-                <a:solidFill>
-                  <a:srgbClr val="003564"/>
-                </a:solidFill>
+              <a:rPr lang="en-US" sz="3000" dirty="0">
                 <a:latin typeface="+mj-lt"/>
                 <a:ea typeface="Verdana" panose="020B0604030504040204" pitchFamily="34" charset="0"/>
                 <a:cs typeface="Helvetica" panose="020B0604020202020204" pitchFamily="34" charset="0"/>
               </a:rPr>
-              <a:t>Lessons</a:t>
-            </a:r>
-            <a:endParaRPr lang="en-US" sz="3600" dirty="0">
-              <a:solidFill>
-                <a:srgbClr val="003564"/>
-              </a:solidFill>
-              <a:latin typeface="+mj-lt"/>
-              <a:ea typeface="Verdana" panose="020B0604030504040204" pitchFamily="34" charset="0"/>
-              <a:cs typeface="Helvetica" panose="020B0604020202020204" pitchFamily="34" charset="0"/>
-            </a:endParaRPr>
+              <a:t>1) We provide an evaluation of the performance of Spark Streaming across two major metrics: latency and throughput</a:t>
+            </a:r>
+          </a:p>
+          <a:p>
+            <a:pPr>
+              <a:spcBef>
+                <a:spcPct val="50000"/>
+              </a:spcBef>
+            </a:pPr>
+            <a:r>
+              <a:rPr lang="en-US" sz="3000" dirty="0">
+                <a:latin typeface="+mj-lt"/>
+                <a:ea typeface="Verdana" panose="020B0604030504040204" pitchFamily="34" charset="0"/>
+                <a:cs typeface="Helvetica" panose="020B0604020202020204" pitchFamily="34" charset="0"/>
+              </a:rPr>
+              <a:t>2) We show that Spark Streaming currently cannot provide high throughput and low latency for realistic workloads</a:t>
+            </a:r>
+          </a:p>
+          <a:p>
+            <a:pPr>
+              <a:spcBef>
+                <a:spcPct val="50000"/>
+              </a:spcBef>
+            </a:pPr>
+            <a:r>
+              <a:rPr lang="en-US" sz="3000" dirty="0">
+                <a:latin typeface="+mj-lt"/>
+                <a:ea typeface="Verdana" panose="020B0604030504040204" pitchFamily="34" charset="0"/>
+                <a:cs typeface="Helvetica" panose="020B0604020202020204" pitchFamily="34" charset="0"/>
+              </a:rPr>
+              <a:t>3) Techniques/lesson to improve end-to-end latency:</a:t>
+            </a:r>
+          </a:p>
+          <a:p>
+            <a:pPr>
+              <a:spcBef>
+                <a:spcPct val="50000"/>
+              </a:spcBef>
+            </a:pPr>
+            <a:r>
+              <a:rPr lang="en-US" sz="3000" dirty="0">
+                <a:latin typeface="+mj-lt"/>
+                <a:ea typeface="Verdana" panose="020B0604030504040204" pitchFamily="34" charset="0"/>
+                <a:cs typeface="Helvetica" panose="020B0604020202020204" pitchFamily="34" charset="0"/>
+              </a:rPr>
+              <a:t>a) </a:t>
+            </a:r>
           </a:p>
           <a:p>
             <a:pPr>
@@ -4160,131 +4278,7 @@
                 <a:spcPct val="30000"/>
               </a:spcBef>
             </a:pPr>
-            <a:r>
-              <a:rPr lang="en-US" sz="2700" dirty="0" smtClean="0">
-                <a:latin typeface="+mj-lt"/>
-                <a:ea typeface="Verdana" panose="020B0604030504040204" pitchFamily="34" charset="0"/>
-                <a:cs typeface="Helvetica" panose="020B0604020202020204" pitchFamily="34" charset="0"/>
-              </a:rPr>
-              <a:t>Serialization:</a:t>
-            </a:r>
-          </a:p>
-          <a:p>
-            <a:pPr>
-              <a:spcBef>
-                <a:spcPct val="30000"/>
-              </a:spcBef>
-            </a:pPr>
-            <a:r>
-              <a:rPr lang="en-US" sz="2700" dirty="0" smtClean="0">
-                <a:latin typeface="+mj-lt"/>
-                <a:ea typeface="Verdana" panose="020B0604030504040204" pitchFamily="34" charset="0"/>
-                <a:cs typeface="Helvetica" panose="020B0604020202020204" pitchFamily="34" charset="0"/>
-              </a:rPr>
-              <a:t>Batch window:</a:t>
-            </a:r>
-          </a:p>
-          <a:p>
-            <a:pPr>
-              <a:spcBef>
-                <a:spcPct val="30000"/>
-              </a:spcBef>
-            </a:pPr>
-            <a:r>
-              <a:rPr lang="en-US" sz="2700" dirty="0" smtClean="0">
-                <a:latin typeface="+mj-lt"/>
-                <a:ea typeface="Verdana" panose="020B0604030504040204" pitchFamily="34" charset="0"/>
-                <a:cs typeface="Helvetica" panose="020B0604020202020204" pitchFamily="34" charset="0"/>
-              </a:rPr>
-              <a:t>Scheduling scalability:</a:t>
-            </a:r>
-          </a:p>
-          <a:p>
-            <a:pPr>
-              <a:spcBef>
-                <a:spcPct val="30000"/>
-              </a:spcBef>
-            </a:pPr>
-            <a:r>
-              <a:rPr lang="en-US" sz="2700" dirty="0" smtClean="0">
-                <a:latin typeface="+mj-lt"/>
-                <a:ea typeface="Verdana" panose="020B0604030504040204" pitchFamily="34" charset="0"/>
-                <a:cs typeface="Helvetica" panose="020B0604020202020204" pitchFamily="34" charset="0"/>
-              </a:rPr>
-              <a:t>Throughput</a:t>
-            </a:r>
-            <a:r>
-              <a:rPr lang="en-US" sz="2700" dirty="0" smtClean="0">
-                <a:latin typeface="+mj-lt"/>
-                <a:ea typeface="Verdana" panose="020B0604030504040204" pitchFamily="34" charset="0"/>
-                <a:cs typeface="Helvetica" panose="020B0604020202020204" pitchFamily="34" charset="0"/>
-              </a:rPr>
-              <a:t>:</a:t>
-            </a:r>
-          </a:p>
-          <a:p>
-            <a:pPr>
-              <a:spcBef>
-                <a:spcPct val="50000"/>
-              </a:spcBef>
-            </a:pPr>
-            <a:r>
-              <a:rPr lang="en-US" sz="2800" dirty="0">
-                <a:ea typeface="Verdana" panose="020B0604030504040204" pitchFamily="34" charset="0"/>
-                <a:cs typeface="Helvetica" panose="020B0604020202020204" pitchFamily="34" charset="0"/>
-              </a:rPr>
-              <a:t>1) We provide an evaluation of the performance of Spark Streaming across two major metrics: latency and throughput</a:t>
-            </a:r>
-          </a:p>
-          <a:p>
-            <a:pPr>
-              <a:spcBef>
-                <a:spcPct val="50000"/>
-              </a:spcBef>
-            </a:pPr>
-            <a:r>
-              <a:rPr lang="en-US" sz="2800" dirty="0">
-                <a:ea typeface="Verdana" panose="020B0604030504040204" pitchFamily="34" charset="0"/>
-                <a:cs typeface="Helvetica" panose="020B0604020202020204" pitchFamily="34" charset="0"/>
-              </a:rPr>
-              <a:t>2) We show that Spark Streaming currently cannot provide high throughput and low latency for realistic workloads</a:t>
-            </a:r>
-          </a:p>
-          <a:p>
-            <a:pPr>
-              <a:spcBef>
-                <a:spcPct val="50000"/>
-              </a:spcBef>
-            </a:pPr>
-            <a:r>
-              <a:rPr lang="en-US" sz="2800" dirty="0">
-                <a:ea typeface="Verdana" panose="020B0604030504040204" pitchFamily="34" charset="0"/>
-                <a:cs typeface="Helvetica" panose="020B0604020202020204" pitchFamily="34" charset="0"/>
-              </a:rPr>
-              <a:t>3) Techniques/lesson to improve end-to-end latency:</a:t>
-            </a:r>
-          </a:p>
-          <a:p>
-            <a:pPr>
-              <a:spcBef>
-                <a:spcPct val="50000"/>
-              </a:spcBef>
-            </a:pPr>
-            <a:r>
-              <a:rPr lang="en-US" sz="2800" dirty="0">
-                <a:ea typeface="Verdana" panose="020B0604030504040204" pitchFamily="34" charset="0"/>
-                <a:cs typeface="Helvetica" panose="020B0604020202020204" pitchFamily="34" charset="0"/>
-              </a:rPr>
-              <a:t>a) </a:t>
-            </a:r>
-          </a:p>
-          <a:p>
-            <a:pPr>
-              <a:spcBef>
-                <a:spcPct val="30000"/>
-              </a:spcBef>
-            </a:pPr>
-            <a:endParaRPr lang="en-US" sz="2700" dirty="0">
+            <a:endParaRPr lang="en-US" sz="3000" dirty="0">
               <a:latin typeface="+mj-lt"/>
               <a:ea typeface="Verdana" panose="020B0604030504040204" pitchFamily="34" charset="0"/>
               <a:cs typeface="Helvetica" panose="020B0604020202020204" pitchFamily="34" charset="0"/>
@@ -4314,6 +4308,11 @@
           <a:prstGeom prst="rect">
             <a:avLst/>
           </a:prstGeom>
+          <a:ln w="0">
+            <a:solidFill>
+              <a:schemeClr val="tx1"/>
+            </a:solidFill>
+          </a:ln>
         </p:spPr>
       </p:pic>
       <p:pic>
@@ -4433,7 +4432,7 @@
       </p:pic>
       <p:pic>
         <p:nvPicPr>
-          <p:cNvPr id="3" name="Picture 2" descr="lazy_micro.pdf"/>
+          <p:cNvPr id="5" name="Picture 4" descr="task_deser_micro.pdf"/>
           <p:cNvPicPr>
             <a:picLocks noChangeAspect="1"/>
           </p:cNvPicPr>
@@ -4453,8 +4452,8 @@
         </p:blipFill>
         <p:spPr>
           <a:xfrm>
-            <a:off x="22662146" y="18827870"/>
-            <a:ext cx="6400800" cy="6400800"/>
+            <a:off x="22501050" y="8687861"/>
+            <a:ext cx="6134312" cy="6578401"/>
           </a:xfrm>
           <a:prstGeom prst="rect">
             <a:avLst/>
@@ -4463,7 +4462,7 @@
       </p:pic>
       <p:pic>
         <p:nvPicPr>
-          <p:cNvPr id="5" name="Picture 4" descr="task_deser_micro.pdf"/>
+          <p:cNvPr id="6" name="Picture 5" descr="runtime_optimizations.pdf"/>
           <p:cNvPicPr>
             <a:picLocks noChangeAspect="1"/>
           </p:cNvPicPr>
@@ -4483,24 +4482,56 @@
         </p:blipFill>
         <p:spPr>
           <a:xfrm>
-            <a:off x="22876304" y="13683790"/>
-            <a:ext cx="4539712" cy="4539712"/>
+            <a:off x="29434970" y="8570854"/>
+            <a:ext cx="4836259" cy="6782600"/>
           </a:xfrm>
           <a:prstGeom prst="rect">
             <a:avLst/>
           </a:prstGeom>
         </p:spPr>
       </p:pic>
+    </p:spTree>
+  </p:cSld>
+  <p:clrMapOvr>
+    <a:masterClrMapping/>
+  </p:clrMapOvr>
+  <p:timing>
+    <p:tnLst>
+      <p:par>
+        <p:cTn id="1" dur="indefinite" restart="never" nodeType="tmRoot"/>
+      </p:par>
+    </p:tnLst>
+  </p:timing>
+</p:sld>
+</file>
+
+<file path=ppt/slides/slide2.xml><?xml version="1.0" encoding="utf-8"?>
+<p:sld xmlns:a="http://schemas.openxmlformats.org/drawingml/2006/main" xmlns:r="http://schemas.openxmlformats.org/officeDocument/2006/relationships" xmlns:p="http://schemas.openxmlformats.org/presentationml/2006/main">
+  <p:cSld>
+    <p:spTree>
+      <p:nvGrpSpPr>
+        <p:cNvPr id="1" name=""/>
+        <p:cNvGrpSpPr/>
+        <p:nvPr/>
+      </p:nvGrpSpPr>
+      <p:grpSpPr>
+        <a:xfrm>
+          <a:off x="0" y="0"/>
+          <a:ext cx="0" cy="0"/>
+          <a:chOff x="0" y="0"/>
+          <a:chExt cx="0" cy="0"/>
+        </a:xfrm>
+      </p:grpSpPr>
       <p:pic>
         <p:nvPicPr>
-          <p:cNvPr id="6" name="Picture 5" descr="runtime_optimizations.pdf"/>
+          <p:cNvPr id="2" name="Picture 1" descr="lazy_micro.pdf"/>
           <p:cNvPicPr>
             <a:picLocks noChangeAspect="1"/>
           </p:cNvPicPr>
           <p:nvPr/>
         </p:nvPicPr>
         <p:blipFill>
-          <a:blip r:embed="rId10">
+          <a:blip r:embed="rId2">
             <a:extLst>
               <a:ext uri="{28A0092B-C50C-407E-A947-70E740481C1C}">
                 <a14:useLocalDpi xmlns:a14="http://schemas.microsoft.com/office/drawing/2010/main" val="0"/>
@@ -4513,73 +4544,20 @@
         </p:blipFill>
         <p:spPr>
           <a:xfrm>
-            <a:off x="30027967" y="19977886"/>
-            <a:ext cx="4368800" cy="4368800"/>
+            <a:off x="26024840" y="9889068"/>
+            <a:ext cx="4146172" cy="4146172"/>
           </a:xfrm>
           <a:prstGeom prst="rect">
             <a:avLst/>
           </a:prstGeom>
         </p:spPr>
       </p:pic>
-      <p:sp>
-        <p:nvSpPr>
-          <p:cNvPr id="19" name="Text Box 532"/>
-          <p:cNvSpPr txBox="1">
-            <a:spLocks noChangeArrowheads="1"/>
-          </p:cNvSpPr>
-          <p:nvPr/>
-        </p:nvSpPr>
-        <p:spPr bwMode="auto">
-          <a:xfrm>
-            <a:off x="1375735" y="11393981"/>
-            <a:ext cx="8835065" cy="769441"/>
-          </a:xfrm>
-          <a:prstGeom prst="rect">
-            <a:avLst/>
-          </a:prstGeom>
-          <a:noFill/>
-          <a:ln w="9525">
-            <a:noFill/>
-            <a:miter lim="800000"/>
-            <a:headEnd/>
-            <a:tailEnd/>
-          </a:ln>
-          <a:effectLst/>
-        </p:spPr>
-        <p:txBody>
-          <a:bodyPr wrap="square" lIns="0" tIns="0" rIns="0" bIns="0">
-            <a:spAutoFit/>
-          </a:bodyPr>
-          <a:lstStyle/>
-          <a:p>
-            <a:pPr>
-              <a:spcBef>
-                <a:spcPct val="50000"/>
-              </a:spcBef>
-            </a:pPr>
-            <a:r>
-              <a:rPr lang="en-US" sz="5000" dirty="0" smtClean="0">
-                <a:solidFill>
-                  <a:srgbClr val="003564"/>
-                </a:solidFill>
-                <a:latin typeface="+mj-lt"/>
-                <a:ea typeface="Verdana" panose="020B0604030504040204" pitchFamily="34" charset="0"/>
-                <a:cs typeface="Helvetica" panose="020B0604020202020204" pitchFamily="34" charset="0"/>
-              </a:rPr>
-              <a:t>Architecture</a:t>
-            </a:r>
-            <a:endParaRPr lang="en-US" sz="5000" dirty="0">
-              <a:solidFill>
-                <a:srgbClr val="003564"/>
-              </a:solidFill>
-              <a:latin typeface="+mj-lt"/>
-              <a:ea typeface="Verdana" panose="020B0604030504040204" pitchFamily="34" charset="0"/>
-              <a:cs typeface="Helvetica" panose="020B0604020202020204" pitchFamily="34" charset="0"/>
-            </a:endParaRPr>
-          </a:p>
-        </p:txBody>
-      </p:sp>
     </p:spTree>
+    <p:extLst>
+      <p:ext uri="{BB962C8B-B14F-4D97-AF65-F5344CB8AC3E}">
+        <p14:creationId xmlns:p14="http://schemas.microsoft.com/office/powerpoint/2010/main" val="3602414330"/>
+      </p:ext>
+    </p:extLst>
   </p:cSld>
   <p:clrMapOvr>
     <a:masterClrMapping/>

</xml_diff>

<commit_message>
New Poster with bigger text in graphs
</commit_message>
<xml_diff>
--- a/poster/Poster.pptx
+++ b/poster/Poster.pptx
@@ -3461,7 +3461,7 @@
           </a:prstGeom>
           <a:noFill/>
           <a:extLst>
-            <a:ext uri="{909E8E84-426E-40DD-AFC4-6F175D3DCCD1}">
+            <a:ext uri="{909E8E84-426E-40dd-AFC4-6F175D3DCCD1}">
               <a14:hiddenFill xmlns:a14="http://schemas.microsoft.com/office/drawing/2010/main">
                 <a:solidFill>
                   <a:srgbClr val="FFFFFF"/>
@@ -3881,23 +3881,7 @@
                 <a:ea typeface="Verdana" panose="020B0604030504040204" pitchFamily="34" charset="0"/>
                 <a:cs typeface="Helvetica" panose="020B0604020202020204" pitchFamily="34" charset="0"/>
               </a:rPr>
-              <a:t>Spark Streaming is a micro-batch stream processor built on top of Spark, and offers high throughput </a:t>
-            </a:r>
-            <a:r>
-              <a:rPr lang="en-US" sz="2800" dirty="0" smtClean="0">
-                <a:latin typeface="+mj-lt"/>
-                <a:ea typeface="Verdana" panose="020B0604030504040204" pitchFamily="34" charset="0"/>
-                <a:cs typeface="Helvetica" panose="020B0604020202020204" pitchFamily="34" charset="0"/>
-              </a:rPr>
-              <a:t>while targeting 0.5 </a:t>
-            </a:r>
-            <a:r>
-              <a:rPr lang="en-US" sz="2800" dirty="0" smtClean="0">
-                <a:latin typeface="+mj-lt"/>
-                <a:ea typeface="Verdana" panose="020B0604030504040204" pitchFamily="34" charset="0"/>
-                <a:cs typeface="Helvetica" panose="020B0604020202020204" pitchFamily="34" charset="0"/>
-              </a:rPr>
-              <a:t>to 2 seconds of latency</a:t>
+              <a:t>Spark Streaming is a micro-batch stream processor built on top of Spark, and offers high throughput while targeting 0.5 to 2 seconds of latency</a:t>
             </a:r>
           </a:p>
           <a:p>
@@ -3914,47 +3898,7 @@
                 <a:ea typeface="Verdana" panose="020B0604030504040204" pitchFamily="34" charset="0"/>
                 <a:cs typeface="Helvetica" panose="020B0604020202020204" pitchFamily="34" charset="0"/>
               </a:rPr>
-              <a:t>Because Spark Streaming </a:t>
-            </a:r>
-            <a:r>
-              <a:rPr lang="en-US" sz="2800" dirty="0" smtClean="0">
-                <a:latin typeface="+mj-lt"/>
-                <a:ea typeface="Verdana" panose="020B0604030504040204" pitchFamily="34" charset="0"/>
-                <a:cs typeface="Helvetica" panose="020B0604020202020204" pitchFamily="34" charset="0"/>
-              </a:rPr>
-              <a:t>also </a:t>
-            </a:r>
-            <a:r>
-              <a:rPr lang="en-US" sz="2800" dirty="0" smtClean="0">
-                <a:latin typeface="+mj-lt"/>
-                <a:ea typeface="Verdana" panose="020B0604030504040204" pitchFamily="34" charset="0"/>
-                <a:cs typeface="Helvetica" panose="020B0604020202020204" pitchFamily="34" charset="0"/>
-              </a:rPr>
-              <a:t>offers several </a:t>
-            </a:r>
-            <a:r>
-              <a:rPr lang="en-US" sz="2800" dirty="0" smtClean="0">
-                <a:latin typeface="+mj-lt"/>
-                <a:ea typeface="Verdana" panose="020B0604030504040204" pitchFamily="34" charset="0"/>
-                <a:cs typeface="Helvetica" panose="020B0604020202020204" pitchFamily="34" charset="0"/>
-              </a:rPr>
-              <a:t>desirable properties such as fault tolerance, </a:t>
-            </a:r>
-            <a:r>
-              <a:rPr lang="en-US" sz="2800" dirty="0" smtClean="0">
-                <a:latin typeface="+mj-lt"/>
-                <a:ea typeface="Verdana" panose="020B0604030504040204" pitchFamily="34" charset="0"/>
-                <a:cs typeface="Helvetica" panose="020B0604020202020204" pitchFamily="34" charset="0"/>
-              </a:rPr>
-              <a:t>we </a:t>
-            </a:r>
-            <a:r>
-              <a:rPr lang="en-US" sz="2800" dirty="0" smtClean="0">
-                <a:latin typeface="+mj-lt"/>
-                <a:ea typeface="Verdana" panose="020B0604030504040204" pitchFamily="34" charset="0"/>
-                <a:cs typeface="Helvetica" panose="020B0604020202020204" pitchFamily="34" charset="0"/>
-              </a:rPr>
-              <a:t>explore what it takes for a system with this architecture to provide low latency while maintaining reasonable throughput</a:t>
+              <a:t>Because Spark Streaming also offers several desirable properties such as fault tolerance, we explore what it takes for a system with this architecture to provide low latency while maintaining reasonable throughput</a:t>
             </a:r>
           </a:p>
         </p:txBody>
@@ -4074,39 +4018,7 @@
                 <a:ea typeface="Verdana" panose="020B0604030504040204" pitchFamily="34" charset="0"/>
                 <a:cs typeface="Helvetica" panose="020B0604020202020204" pitchFamily="34" charset="0"/>
               </a:rPr>
-              <a:t>and 2) find average breakdown as well as cumulative distribution </a:t>
-            </a:r>
-            <a:r>
-              <a:rPr lang="en-US" sz="2800" dirty="0" smtClean="0">
-                <a:latin typeface="+mj-lt"/>
-                <a:ea typeface="Verdana" panose="020B0604030504040204" pitchFamily="34" charset="0"/>
-                <a:cs typeface="Helvetica" panose="020B0604020202020204" pitchFamily="34" charset="0"/>
-              </a:rPr>
-              <a:t>functions </a:t>
-            </a:r>
-            <a:r>
-              <a:rPr lang="en-US" sz="2800" dirty="0" smtClean="0">
-                <a:latin typeface="+mj-lt"/>
-                <a:ea typeface="Verdana" panose="020B0604030504040204" pitchFamily="34" charset="0"/>
-                <a:cs typeface="Helvetica" panose="020B0604020202020204" pitchFamily="34" charset="0"/>
-              </a:rPr>
-              <a:t>(</a:t>
-            </a:r>
-            <a:r>
-              <a:rPr lang="en-US" sz="2800" dirty="0" smtClean="0">
-                <a:latin typeface="+mj-lt"/>
-                <a:ea typeface="Verdana" panose="020B0604030504040204" pitchFamily="34" charset="0"/>
-                <a:cs typeface="Helvetica" panose="020B0604020202020204" pitchFamily="34" charset="0"/>
-              </a:rPr>
-              <a:t>CDFs) </a:t>
-            </a:r>
-            <a:r>
-              <a:rPr lang="en-US" sz="2800" dirty="0" smtClean="0">
-                <a:latin typeface="+mj-lt"/>
-                <a:ea typeface="Verdana" panose="020B0604030504040204" pitchFamily="34" charset="0"/>
-                <a:cs typeface="Helvetica" panose="020B0604020202020204" pitchFamily="34" charset="0"/>
-              </a:rPr>
-              <a:t>of those latencies</a:t>
+              <a:t>and 2) find average breakdown as well as cumulative distribution functions (CDFs) of those latencies</a:t>
             </a:r>
           </a:p>
           <a:p>
@@ -4157,21 +4069,8 @@
                 <a:ea typeface="Verdana" panose="020B0604030504040204" pitchFamily="34" charset="0"/>
                 <a:cs typeface="Helvetica" panose="020B0604020202020204" pitchFamily="34" charset="0"/>
               </a:rPr>
-              <a:t>Given a throughput and batch window, compare latencies and breakdowns per-node to that of one-node </a:t>
-            </a:r>
-            <a:r>
-              <a:rPr lang="en-US" sz="2800" dirty="0" smtClean="0">
-                <a:latin typeface="+mj-lt"/>
-                <a:ea typeface="Verdana" panose="020B0604030504040204" pitchFamily="34" charset="0"/>
-                <a:cs typeface="Helvetica" panose="020B0604020202020204" pitchFamily="34" charset="0"/>
-              </a:rPr>
-              <a:t>deployment</a:t>
-            </a:r>
-            <a:endParaRPr lang="en-US" sz="2800" dirty="0" smtClean="0">
-              <a:latin typeface="+mj-lt"/>
-              <a:ea typeface="Verdana" panose="020B0604030504040204" pitchFamily="34" charset="0"/>
-              <a:cs typeface="Helvetica" panose="020B0604020202020204" pitchFamily="34" charset="0"/>
-            </a:endParaRPr>
+              <a:t>Given a throughput and batch window, compare latencies and breakdowns per-node to that of one-node deployment</a:t>
+            </a:r>
           </a:p>
         </p:txBody>
       </p:sp>
@@ -4333,15 +4232,7 @@
                 <a:ea typeface="Verdana" panose="020B0604030504040204" pitchFamily="34" charset="0"/>
                 <a:cs typeface="Helvetica" panose="020B0604020202020204" pitchFamily="34" charset="0"/>
               </a:rPr>
-              <a:t>Scheduling </a:t>
-            </a:r>
-            <a:r>
-              <a:rPr lang="en-US" sz="2800" i="1" dirty="0" smtClean="0">
-                <a:latin typeface="+mj-lt"/>
-                <a:ea typeface="Verdana" panose="020B0604030504040204" pitchFamily="34" charset="0"/>
-                <a:cs typeface="Helvetica" panose="020B0604020202020204" pitchFamily="34" charset="0"/>
-              </a:rPr>
-              <a:t>overhead</a:t>
+              <a:t>Scheduling overhead</a:t>
             </a:r>
             <a:r>
               <a:rPr lang="en-US" sz="2800" dirty="0" smtClean="0">
@@ -4351,11 +4242,6 @@
               </a:rPr>
               <a:t>: we did not encounter scheduler bottlenecks in our experiments, but as the system scales out, a decentralized scheduler can be potentially useful</a:t>
             </a:r>
-            <a:endParaRPr lang="en-US" sz="2800" dirty="0" smtClean="0">
-              <a:latin typeface="+mj-lt"/>
-              <a:ea typeface="Verdana" panose="020B0604030504040204" pitchFamily="34" charset="0"/>
-              <a:cs typeface="Helvetica" panose="020B0604020202020204" pitchFamily="34" charset="0"/>
-            </a:endParaRPr>
           </a:p>
           <a:p>
             <a:pPr marL="914400" lvl="1" indent="-457200">
@@ -4379,15 +4265,7 @@
                 <a:ea typeface="Verdana" panose="020B0604030504040204" pitchFamily="34" charset="0"/>
                 <a:cs typeface="Helvetica" panose="020B0604020202020204" pitchFamily="34" charset="0"/>
               </a:rPr>
-              <a:t>: </a:t>
-            </a:r>
-            <a:r>
-              <a:rPr lang="en-US" sz="2800" dirty="0" smtClean="0">
-                <a:latin typeface="+mj-lt"/>
-                <a:ea typeface="Verdana" panose="020B0604030504040204" pitchFamily="34" charset="0"/>
-                <a:cs typeface="Helvetica" panose="020B0604020202020204" pitchFamily="34" charset="0"/>
-              </a:rPr>
-              <a:t>we did not find significant network bottleneck either in our experiments, but as the number of tasks per second increases, hardware technology such as </a:t>
+              <a:t>: we did not find significant network bottleneck either in our experiments, but as the number of tasks per second increases, hardware technology such as </a:t>
             </a:r>
             <a:r>
               <a:rPr lang="en-US" sz="2800" dirty="0" err="1" smtClean="0">
@@ -4405,11 +4283,6 @@
               </a:rPr>
               <a:t> can be used to decrease communication time between the driver and executors</a:t>
             </a:r>
-            <a:endParaRPr lang="en-US" sz="2800" dirty="0" smtClean="0">
-              <a:latin typeface="+mj-lt"/>
-              <a:ea typeface="Verdana" panose="020B0604030504040204" pitchFamily="34" charset="0"/>
-              <a:cs typeface="Helvetica" panose="020B0604020202020204" pitchFamily="34" charset="0"/>
-            </a:endParaRPr>
           </a:p>
           <a:p>
             <a:pPr marL="457200" indent="-457200">
@@ -4425,23 +4298,7 @@
                 <a:ea typeface="Verdana" panose="020B0604030504040204" pitchFamily="34" charset="0"/>
                 <a:cs typeface="Helvetica" panose="020B0604020202020204" pitchFamily="34" charset="0"/>
               </a:rPr>
-              <a:t>We show that for the best latency in Spark Streaming, the batch window should </a:t>
-            </a:r>
-            <a:r>
-              <a:rPr lang="en-US" sz="2800" dirty="0" smtClean="0">
-                <a:latin typeface="+mj-lt"/>
-                <a:ea typeface="Verdana" panose="020B0604030504040204" pitchFamily="34" charset="0"/>
-                <a:cs typeface="Helvetica" panose="020B0604020202020204" pitchFamily="34" charset="0"/>
-              </a:rPr>
-              <a:t>be slightly </a:t>
-            </a:r>
-            <a:r>
-              <a:rPr lang="en-US" sz="2800" dirty="0" smtClean="0">
-                <a:latin typeface="+mj-lt"/>
-                <a:ea typeface="Verdana" panose="020B0604030504040204" pitchFamily="34" charset="0"/>
-                <a:cs typeface="Helvetica" panose="020B0604020202020204" pitchFamily="34" charset="0"/>
-              </a:rPr>
-              <a:t>larger than the time it takes to process a batch</a:t>
+              <a:t>We show that for the best latency in Spark Streaming, the batch window should be slightly larger than the time it takes to process a batch</a:t>
             </a:r>
             <a:endParaRPr lang="en-US" sz="2800" dirty="0">
               <a:latin typeface="+mj-lt"/>
@@ -4478,156 +4335,6 @@
       </p:pic>
       <p:pic>
         <p:nvPicPr>
-          <p:cNvPr id="14" name="Picture 13" descr="batchsize_vs_latency3.pdf"/>
-          <p:cNvPicPr>
-            <a:picLocks noChangeAspect="1"/>
-          </p:cNvPicPr>
-          <p:nvPr/>
-        </p:nvPicPr>
-        <p:blipFill>
-          <a:blip r:embed="rId4">
-            <a:extLst>
-              <a:ext uri="{28A0092B-C50C-407E-A947-70E740481C1C}">
-                <a14:useLocalDpi xmlns:a14="http://schemas.microsoft.com/office/drawing/2010/main" val="0"/>
-              </a:ext>
-            </a:extLst>
-          </a:blip>
-          <a:stretch>
-            <a:fillRect/>
-          </a:stretch>
-        </p:blipFill>
-        <p:spPr>
-          <a:xfrm>
-            <a:off x="13657943" y="4314673"/>
-            <a:ext cx="7833784" cy="7833784"/>
-          </a:xfrm>
-          <a:prstGeom prst="rect">
-            <a:avLst/>
-          </a:prstGeom>
-        </p:spPr>
-      </p:pic>
-      <p:pic>
-        <p:nvPicPr>
-          <p:cNvPr id="15" name="Picture 14" descr="6ms_time_breakdown.pdf"/>
-          <p:cNvPicPr>
-            <a:picLocks noChangeAspect="1"/>
-          </p:cNvPicPr>
-          <p:nvPr/>
-        </p:nvPicPr>
-        <p:blipFill>
-          <a:blip r:embed="rId5">
-            <a:extLst>
-              <a:ext uri="{28A0092B-C50C-407E-A947-70E740481C1C}">
-                <a14:useLocalDpi xmlns:a14="http://schemas.microsoft.com/office/drawing/2010/main" val="0"/>
-              </a:ext>
-            </a:extLst>
-          </a:blip>
-          <a:stretch>
-            <a:fillRect/>
-          </a:stretch>
-        </p:blipFill>
-        <p:spPr>
-          <a:xfrm>
-            <a:off x="13195149" y="11916227"/>
-            <a:ext cx="8759372" cy="8759372"/>
-          </a:xfrm>
-          <a:prstGeom prst="rect">
-            <a:avLst/>
-          </a:prstGeom>
-        </p:spPr>
-      </p:pic>
-      <p:pic>
-        <p:nvPicPr>
-          <p:cNvPr id="16" name="Picture 15" descr="task_deser_micro.pdf"/>
-          <p:cNvPicPr>
-            <a:picLocks noChangeAspect="1"/>
-          </p:cNvPicPr>
-          <p:nvPr/>
-        </p:nvPicPr>
-        <p:blipFill>
-          <a:blip r:embed="rId6">
-            <a:extLst>
-              <a:ext uri="{28A0092B-C50C-407E-A947-70E740481C1C}">
-                <a14:useLocalDpi xmlns:a14="http://schemas.microsoft.com/office/drawing/2010/main" val="0"/>
-              </a:ext>
-            </a:extLst>
-          </a:blip>
-          <a:stretch>
-            <a:fillRect/>
-          </a:stretch>
-        </p:blipFill>
-        <p:spPr>
-          <a:xfrm>
-            <a:off x="23270951" y="8585200"/>
-            <a:ext cx="5049415" cy="6662056"/>
-          </a:xfrm>
-          <a:prstGeom prst="rect">
-            <a:avLst/>
-          </a:prstGeom>
-        </p:spPr>
-      </p:pic>
-      <p:pic>
-        <p:nvPicPr>
-          <p:cNvPr id="17" name="Picture 16" descr="cdf_e2e_times.pdf"/>
-          <p:cNvPicPr>
-            <a:picLocks noChangeAspect="1"/>
-          </p:cNvPicPr>
-          <p:nvPr/>
-        </p:nvPicPr>
-        <p:blipFill>
-          <a:blip r:embed="rId7">
-            <a:extLst>
-              <a:ext uri="{28A0092B-C50C-407E-A947-70E740481C1C}">
-                <a14:useLocalDpi xmlns:a14="http://schemas.microsoft.com/office/drawing/2010/main" val="0"/>
-              </a:ext>
-            </a:extLst>
-          </a:blip>
-          <a:stretch>
-            <a:fillRect/>
-          </a:stretch>
-        </p:blipFill>
-        <p:spPr>
-          <a:xfrm>
-            <a:off x="14457892" y="20711887"/>
-            <a:ext cx="6233886" cy="6233886"/>
-          </a:xfrm>
-          <a:prstGeom prst="rect">
-            <a:avLst/>
-          </a:prstGeom>
-        </p:spPr>
-      </p:pic>
-      <p:pic>
-        <p:nvPicPr>
-          <p:cNvPr id="18" name="Picture 17" descr="runtime_optimizations.pdf"/>
-          <p:cNvPicPr>
-            <a:picLocks noChangeAspect="1"/>
-          </p:cNvPicPr>
-          <p:nvPr/>
-        </p:nvPicPr>
-        <p:blipFill>
-          <a:blip r:embed="rId8">
-            <a:extLst>
-              <a:ext uri="{28A0092B-C50C-407E-A947-70E740481C1C}">
-                <a14:useLocalDpi xmlns:a14="http://schemas.microsoft.com/office/drawing/2010/main" val="0"/>
-              </a:ext>
-            </a:extLst>
-          </a:blip>
-          <a:stretch>
-            <a:fillRect/>
-          </a:stretch>
-        </p:blipFill>
-        <p:spPr>
-          <a:xfrm>
-            <a:off x="28738288" y="8585199"/>
-            <a:ext cx="6662057" cy="6662057"/>
-          </a:xfrm>
-          <a:prstGeom prst="rect">
-            <a:avLst/>
-          </a:prstGeom>
-        </p:spPr>
-      </p:pic>
-      <p:pic>
-        <p:nvPicPr>
           <p:cNvPr id="1031" name="Picture 7"/>
           <p:cNvPicPr>
             <a:picLocks noChangeAspect="1" noChangeArrowheads="1"/>
@@ -4635,7 +4342,7 @@
           <p:nvPr/>
         </p:nvPicPr>
         <p:blipFill>
-          <a:blip r:embed="rId9">
+          <a:blip r:embed="rId4">
             <a:extLst>
               <a:ext uri="{28A0092B-C50C-407E-A947-70E740481C1C}">
                 <a14:useLocalDpi xmlns:a14="http://schemas.microsoft.com/office/drawing/2010/main" val="0"/>
@@ -4661,14 +4368,14 @@
           </a:ln>
           <a:effectLst/>
           <a:extLst>
-            <a:ext uri="{909E8E84-426E-40DD-AFC4-6F175D3DCCD1}">
+            <a:ext uri="{909E8E84-426E-40dd-AFC4-6F175D3DCCD1}">
               <a14:hiddenFill xmlns:a14="http://schemas.microsoft.com/office/drawing/2010/main">
                 <a:solidFill>
                   <a:schemeClr val="accent1"/>
                 </a:solidFill>
               </a14:hiddenFill>
             </a:ext>
-            <a:ext uri="{91240B29-F687-4F45-9708-019B960494DF}">
+            <a:ext uri="{91240B29-F687-4f45-9708-019B960494DF}">
               <a14:hiddenLine xmlns:a14="http://schemas.microsoft.com/office/drawing/2010/main" w="9525">
                 <a:solidFill>
                   <a:schemeClr val="tx1"/>
@@ -4678,7 +4385,7 @@
                 <a:tailEnd/>
               </a14:hiddenLine>
             </a:ext>
-            <a:ext uri="{AF507438-7753-43E0-B8FC-AC1667EBCBE1}">
+            <a:ext uri="{AF507438-7753-43e0-B8FC-AC1667EBCBE1}">
               <a14:hiddenEffects xmlns:a14="http://schemas.microsoft.com/office/drawing/2010/main">
                 <a:effectLst>
                   <a:outerShdw dist="35921" dir="2700000" algn="ctr" rotWithShape="0">
@@ -4690,6 +4397,156 @@
           </a:extLst>
         </p:spPr>
       </p:pic>
+      <p:pic>
+        <p:nvPicPr>
+          <p:cNvPr id="20" name="Picture 19" descr="batchsize_vs_latency3.pdf"/>
+          <p:cNvPicPr>
+            <a:picLocks noChangeAspect="1"/>
+          </p:cNvPicPr>
+          <p:nvPr/>
+        </p:nvPicPr>
+        <p:blipFill>
+          <a:blip r:embed="rId5">
+            <a:extLst>
+              <a:ext uri="{28A0092B-C50C-407E-A947-70E740481C1C}">
+                <a14:useLocalDpi xmlns:a14="http://schemas.microsoft.com/office/drawing/2010/main" val="0"/>
+              </a:ext>
+            </a:extLst>
+          </a:blip>
+          <a:stretch>
+            <a:fillRect/>
+          </a:stretch>
+        </p:blipFill>
+        <p:spPr>
+          <a:xfrm>
+            <a:off x="14012912" y="4800853"/>
+            <a:ext cx="7041185" cy="7041185"/>
+          </a:xfrm>
+          <a:prstGeom prst="rect">
+            <a:avLst/>
+          </a:prstGeom>
+        </p:spPr>
+      </p:pic>
+      <p:pic>
+        <p:nvPicPr>
+          <p:cNvPr id="22" name="Picture 21" descr="task_deser_micro.pdf"/>
+          <p:cNvPicPr>
+            <a:picLocks noChangeAspect="1"/>
+          </p:cNvPicPr>
+          <p:nvPr/>
+        </p:nvPicPr>
+        <p:blipFill>
+          <a:blip r:embed="rId6">
+            <a:extLst>
+              <a:ext uri="{28A0092B-C50C-407E-A947-70E740481C1C}">
+                <a14:useLocalDpi xmlns:a14="http://schemas.microsoft.com/office/drawing/2010/main" val="0"/>
+              </a:ext>
+            </a:extLst>
+          </a:blip>
+          <a:stretch>
+            <a:fillRect/>
+          </a:stretch>
+        </p:blipFill>
+        <p:spPr>
+          <a:xfrm>
+            <a:off x="23214112" y="8610684"/>
+            <a:ext cx="4851400" cy="6400800"/>
+          </a:xfrm>
+          <a:prstGeom prst="rect">
+            <a:avLst/>
+          </a:prstGeom>
+        </p:spPr>
+      </p:pic>
+      <p:pic>
+        <p:nvPicPr>
+          <p:cNvPr id="23" name="Picture 22" descr="runtime_optimizations.pdf"/>
+          <p:cNvPicPr>
+            <a:picLocks noChangeAspect="1"/>
+          </p:cNvPicPr>
+          <p:nvPr/>
+        </p:nvPicPr>
+        <p:blipFill>
+          <a:blip r:embed="rId7">
+            <a:extLst>
+              <a:ext uri="{28A0092B-C50C-407E-A947-70E740481C1C}">
+                <a14:useLocalDpi xmlns:a14="http://schemas.microsoft.com/office/drawing/2010/main" val="0"/>
+              </a:ext>
+            </a:extLst>
+          </a:blip>
+          <a:stretch>
+            <a:fillRect/>
+          </a:stretch>
+        </p:blipFill>
+        <p:spPr>
+          <a:xfrm>
+            <a:off x="29376029" y="8610684"/>
+            <a:ext cx="6400800" cy="6400800"/>
+          </a:xfrm>
+          <a:prstGeom prst="rect">
+            <a:avLst/>
+          </a:prstGeom>
+        </p:spPr>
+      </p:pic>
+      <p:pic>
+        <p:nvPicPr>
+          <p:cNvPr id="3" name="Picture 2" descr="6ms_time_breakdown.pdf"/>
+          <p:cNvPicPr>
+            <a:picLocks noChangeAspect="1"/>
+          </p:cNvPicPr>
+          <p:nvPr/>
+        </p:nvPicPr>
+        <p:blipFill>
+          <a:blip r:embed="rId8">
+            <a:extLst>
+              <a:ext uri="{28A0092B-C50C-407E-A947-70E740481C1C}">
+                <a14:useLocalDpi xmlns:a14="http://schemas.microsoft.com/office/drawing/2010/main" val="0"/>
+              </a:ext>
+            </a:extLst>
+          </a:blip>
+          <a:stretch>
+            <a:fillRect/>
+          </a:stretch>
+        </p:blipFill>
+        <p:spPr>
+          <a:xfrm>
+            <a:off x="13908277" y="11921787"/>
+            <a:ext cx="7356592" cy="7356592"/>
+          </a:xfrm>
+          <a:prstGeom prst="rect">
+            <a:avLst/>
+          </a:prstGeom>
+        </p:spPr>
+      </p:pic>
+      <p:pic>
+        <p:nvPicPr>
+          <p:cNvPr id="4" name="Picture 3" descr="cdf_e2e_times.pdf"/>
+          <p:cNvPicPr>
+            <a:picLocks noChangeAspect="1"/>
+          </p:cNvPicPr>
+          <p:nvPr/>
+        </p:nvPicPr>
+        <p:blipFill>
+          <a:blip r:embed="rId9">
+            <a:extLst>
+              <a:ext uri="{28A0092B-C50C-407E-A947-70E740481C1C}">
+                <a14:useLocalDpi xmlns:a14="http://schemas.microsoft.com/office/drawing/2010/main" val="0"/>
+              </a:ext>
+            </a:extLst>
+          </a:blip>
+          <a:stretch>
+            <a:fillRect/>
+          </a:stretch>
+        </p:blipFill>
+        <p:spPr>
+          <a:xfrm>
+            <a:off x="14135072" y="19905305"/>
+            <a:ext cx="7183448" cy="7183448"/>
+          </a:xfrm>
+          <a:prstGeom prst="rect">
+            <a:avLst/>
+          </a:prstGeom>
+        </p:spPr>
+      </p:pic>
     </p:spTree>
   </p:cSld>
   <p:clrMapOvr>
@@ -4698,7 +4555,7 @@
   <p:timing>
     <p:tnLst>
       <p:par>
-        <p:cTn id="1" dur="indefinite" restart="never" nodeType="tmRoot"/>
+        <p:cTn xmlns:p14="http://schemas.microsoft.com/office/powerpoint/2010/main" id="1" dur="indefinite" restart="never" nodeType="tmRoot"/>
       </p:par>
     </p:tnLst>
   </p:timing>

</xml_diff>

<commit_message>
Fixed Sec->Msec in poster and plot script
</commit_message>
<xml_diff>
--- a/poster/Poster.pptx
+++ b/poster/Poster.pptx
@@ -4365,7 +4365,7 @@
       </p:pic>
       <p:pic>
         <p:nvPicPr>
-          <p:cNvPr id="22" name="Picture 21" descr="task_deser_micro.pdf"/>
+          <p:cNvPr id="23" name="Picture 22" descr="runtime_optimizations.pdf"/>
           <p:cNvPicPr>
             <a:picLocks noChangeAspect="1"/>
           </p:cNvPicPr>
@@ -4373,36 +4373,6 @@
         </p:nvPicPr>
         <p:blipFill>
           <a:blip r:embed="rId5">
-            <a:extLst>
-              <a:ext uri="{28A0092B-C50C-407E-A947-70E740481C1C}">
-                <a14:useLocalDpi xmlns:a14="http://schemas.microsoft.com/office/drawing/2010/main" val="0"/>
-              </a:ext>
-            </a:extLst>
-          </a:blip>
-          <a:stretch>
-            <a:fillRect/>
-          </a:stretch>
-        </p:blipFill>
-        <p:spPr>
-          <a:xfrm>
-            <a:off x="23118318" y="8610684"/>
-            <a:ext cx="4851400" cy="6400800"/>
-          </a:xfrm>
-          <a:prstGeom prst="rect">
-            <a:avLst/>
-          </a:prstGeom>
-        </p:spPr>
-      </p:pic>
-      <p:pic>
-        <p:nvPicPr>
-          <p:cNvPr id="23" name="Picture 22" descr="runtime_optimizations.pdf"/>
-          <p:cNvPicPr>
-            <a:picLocks noChangeAspect="1"/>
-          </p:cNvPicPr>
-          <p:nvPr/>
-        </p:nvPicPr>
-        <p:blipFill>
-          <a:blip r:embed="rId6">
             <a:extLst>
               <a:ext uri="{28A0092B-C50C-407E-A947-70E740481C1C}">
                 <a14:useLocalDpi xmlns:a14="http://schemas.microsoft.com/office/drawing/2010/main" val="0"/>
@@ -4432,7 +4402,7 @@
           <p:nvPr/>
         </p:nvPicPr>
         <p:blipFill>
-          <a:blip r:embed="rId7">
+          <a:blip r:embed="rId6">
             <a:extLst>
               <a:ext uri="{28A0092B-C50C-407E-A947-70E740481C1C}">
                 <a14:useLocalDpi xmlns:a14="http://schemas.microsoft.com/office/drawing/2010/main" val="0"/>
@@ -4462,7 +4432,7 @@
           <p:nvPr/>
         </p:nvPicPr>
         <p:blipFill>
-          <a:blip r:embed="rId8">
+          <a:blip r:embed="rId7">
             <a:extLst>
               <a:ext uri="{28A0092B-C50C-407E-A947-70E740481C1C}">
                 <a14:useLocalDpi xmlns:a14="http://schemas.microsoft.com/office/drawing/2010/main" val="0"/>
@@ -4526,7 +4496,7 @@
           <p:nvPr/>
         </p:nvPicPr>
         <p:blipFill>
-          <a:blip r:embed="rId9">
+          <a:blip r:embed="rId8">
             <a:extLst>
               <a:ext uri="{28A0092B-C50C-407E-A947-70E740481C1C}">
                 <a14:useLocalDpi xmlns:a14="http://schemas.microsoft.com/office/drawing/2010/main" val="0"/>
@@ -4573,6 +4543,36 @@
           </a:p>
         </p:txBody>
       </p:sp>
+      <p:pic>
+        <p:nvPicPr>
+          <p:cNvPr id="7" name="Picture 6" descr="task_deser_micro.pdf"/>
+          <p:cNvPicPr>
+            <a:picLocks noChangeAspect="1"/>
+          </p:cNvPicPr>
+          <p:nvPr/>
+        </p:nvPicPr>
+        <p:blipFill>
+          <a:blip r:embed="rId9">
+            <a:extLst>
+              <a:ext uri="{28A0092B-C50C-407E-A947-70E740481C1C}">
+                <a14:useLocalDpi xmlns:a14="http://schemas.microsoft.com/office/drawing/2010/main" val="0"/>
+              </a:ext>
+            </a:extLst>
+          </a:blip>
+          <a:stretch>
+            <a:fillRect/>
+          </a:stretch>
+        </p:blipFill>
+        <p:spPr>
+          <a:xfrm>
+            <a:off x="23140862" y="8610685"/>
+            <a:ext cx="4851400" cy="6400800"/>
+          </a:xfrm>
+          <a:prstGeom prst="rect">
+            <a:avLst/>
+          </a:prstGeom>
+        </p:spPr>
+      </p:pic>
     </p:spTree>
   </p:cSld>
   <p:clrMapOvr>

</xml_diff>